<commit_message>
Modified with the new impervious bottom boundary condition.
</commit_message>
<xml_diff>
--- a/Materials/Richards_English.pptx
+++ b/Materials/Richards_English.pptx
@@ -221,7 +221,7 @@
           <a:p>
             <a:fld id="{4D0C6883-54F1-064A-A731-D2789FFABA37}" type="datetimeFigureOut">
               <a:rPr lang="it-IT" smtClean="0"/>
-              <a:t>27/10/2017</a:t>
+              <a:t>07/11/2017</a:t>
             </a:fld>
             <a:endParaRPr lang="en-GB"/>
           </a:p>
@@ -670,7 +670,7 @@
           <a:p>
             <a:fld id="{D3F618D5-3DB9-B146-87ED-A3BCB7C64B91}" type="datetimeFigureOut">
               <a:rPr lang="it-IT" smtClean="0"/>
-              <a:t>27/10/2017</a:t>
+              <a:t>07/11/2017</a:t>
             </a:fld>
             <a:endParaRPr lang="en-GB"/>
           </a:p>
@@ -840,7 +840,7 @@
           <a:p>
             <a:fld id="{D3F618D5-3DB9-B146-87ED-A3BCB7C64B91}" type="datetimeFigureOut">
               <a:rPr lang="it-IT" smtClean="0"/>
-              <a:t>27/10/2017</a:t>
+              <a:t>07/11/2017</a:t>
             </a:fld>
             <a:endParaRPr lang="en-GB"/>
           </a:p>
@@ -1020,7 +1020,7 @@
           <a:p>
             <a:fld id="{D3F618D5-3DB9-B146-87ED-A3BCB7C64B91}" type="datetimeFigureOut">
               <a:rPr lang="it-IT" smtClean="0"/>
-              <a:t>27/10/2017</a:t>
+              <a:t>07/11/2017</a:t>
             </a:fld>
             <a:endParaRPr lang="en-GB"/>
           </a:p>
@@ -1226,7 +1226,7 @@
           </a:ln>
           <a:extLst>
             <a:ext uri="{C572A759-6A51-4108-AA02-DFA0A04FC94B}">
-              <ma14:wrappingTextBoxFlag xmlns:ma14="http://schemas.microsoft.com/office/mac/drawingml/2011/main" xmlns="" val="1"/>
+              <ma14:wrappingTextBoxFlag xmlns="" xmlns:ma14="http://schemas.microsoft.com/office/mac/drawingml/2011/main" val="1"/>
             </a:ext>
           </a:extLst>
         </p:spPr>
@@ -1443,7 +1443,7 @@
           <a:p>
             <a:fld id="{D3F618D5-3DB9-B146-87ED-A3BCB7C64B91}" type="datetimeFigureOut">
               <a:rPr lang="it-IT" smtClean="0"/>
-              <a:t>27/10/2017</a:t>
+              <a:t>07/11/2017</a:t>
             </a:fld>
             <a:endParaRPr lang="en-GB"/>
           </a:p>
@@ -1689,7 +1689,7 @@
           <a:p>
             <a:fld id="{D3F618D5-3DB9-B146-87ED-A3BCB7C64B91}" type="datetimeFigureOut">
               <a:rPr lang="it-IT" smtClean="0"/>
-              <a:t>27/10/2017</a:t>
+              <a:t>07/11/2017</a:t>
             </a:fld>
             <a:endParaRPr lang="en-GB"/>
           </a:p>
@@ -1977,7 +1977,7 @@
           <a:p>
             <a:fld id="{D3F618D5-3DB9-B146-87ED-A3BCB7C64B91}" type="datetimeFigureOut">
               <a:rPr lang="it-IT" smtClean="0"/>
-              <a:t>27/10/2017</a:t>
+              <a:t>07/11/2017</a:t>
             </a:fld>
             <a:endParaRPr lang="en-GB"/>
           </a:p>
@@ -2399,7 +2399,7 @@
           <a:p>
             <a:fld id="{D3F618D5-3DB9-B146-87ED-A3BCB7C64B91}" type="datetimeFigureOut">
               <a:rPr lang="it-IT" smtClean="0"/>
-              <a:t>27/10/2017</a:t>
+              <a:t>07/11/2017</a:t>
             </a:fld>
             <a:endParaRPr lang="en-GB"/>
           </a:p>
@@ -2517,7 +2517,7 @@
           <a:p>
             <a:fld id="{D3F618D5-3DB9-B146-87ED-A3BCB7C64B91}" type="datetimeFigureOut">
               <a:rPr lang="it-IT" smtClean="0"/>
-              <a:t>27/10/2017</a:t>
+              <a:t>07/11/2017</a:t>
             </a:fld>
             <a:endParaRPr lang="en-GB"/>
           </a:p>
@@ -2612,7 +2612,7 @@
           <a:p>
             <a:fld id="{D3F618D5-3DB9-B146-87ED-A3BCB7C64B91}" type="datetimeFigureOut">
               <a:rPr lang="it-IT" smtClean="0"/>
-              <a:t>27/10/2017</a:t>
+              <a:t>07/11/2017</a:t>
             </a:fld>
             <a:endParaRPr lang="en-GB"/>
           </a:p>
@@ -2889,7 +2889,7 @@
           <a:p>
             <a:fld id="{D3F618D5-3DB9-B146-87ED-A3BCB7C64B91}" type="datetimeFigureOut">
               <a:rPr lang="it-IT" smtClean="0"/>
-              <a:t>27/10/2017</a:t>
+              <a:t>07/11/2017</a:t>
             </a:fld>
             <a:endParaRPr lang="en-GB"/>
           </a:p>
@@ -3142,7 +3142,7 @@
           <a:p>
             <a:fld id="{D3F618D5-3DB9-B146-87ED-A3BCB7C64B91}" type="datetimeFigureOut">
               <a:rPr lang="it-IT" smtClean="0"/>
-              <a:t>27/10/2017</a:t>
+              <a:t>07/11/2017</a:t>
             </a:fld>
             <a:endParaRPr lang="en-GB"/>
           </a:p>
@@ -3355,7 +3355,7 @@
           <a:p>
             <a:fld id="{D3F618D5-3DB9-B146-87ED-A3BCB7C64B91}" type="datetimeFigureOut">
               <a:rPr lang="it-IT" smtClean="0"/>
-              <a:t>27/10/2017</a:t>
+              <a:t>07/11/2017</a:t>
             </a:fld>
             <a:endParaRPr lang="en-GB"/>
           </a:p>
@@ -3750,7 +3750,7 @@
           </a:ln>
           <a:extLst>
             <a:ext uri="{C572A759-6A51-4108-AA02-DFA0A04FC94B}">
-              <ma14:wrappingTextBoxFlag xmlns:ma14="http://schemas.microsoft.com/office/mac/drawingml/2011/main" xmlns="" val="1"/>
+              <ma14:wrappingTextBoxFlag xmlns="" xmlns:ma14="http://schemas.microsoft.com/office/mac/drawingml/2011/main" val="1"/>
             </a:ext>
           </a:extLst>
         </p:spPr>
@@ -3850,7 +3850,7 @@
           </a:ln>
           <a:extLst>
             <a:ext uri="{C572A759-6A51-4108-AA02-DFA0A04FC94B}">
-              <ma14:wrappingTextBoxFlag xmlns:ma14="http://schemas.microsoft.com/office/mac/drawingml/2011/main" xmlns="" val="1"/>
+              <ma14:wrappingTextBoxFlag xmlns="" xmlns:ma14="http://schemas.microsoft.com/office/mac/drawingml/2011/main" val="1"/>
             </a:ext>
           </a:extLst>
         </p:spPr>
@@ -4027,7 +4027,7 @@
           </a:ln>
           <a:extLst>
             <a:ext uri="{C572A759-6A51-4108-AA02-DFA0A04FC94B}">
-              <ma14:wrappingTextBoxFlag xmlns:ma14="http://schemas.microsoft.com/office/mac/drawingml/2011/main" xmlns="" val="1"/>
+              <ma14:wrappingTextBoxFlag xmlns="" xmlns:ma14="http://schemas.microsoft.com/office/mac/drawingml/2011/main" val="1"/>
             </a:ext>
           </a:extLst>
         </p:spPr>
@@ -4091,7 +4091,7 @@
           </a:ln>
           <a:extLst>
             <a:ext uri="{C572A759-6A51-4108-AA02-DFA0A04FC94B}">
-              <ma14:wrappingTextBoxFlag xmlns:ma14="http://schemas.microsoft.com/office/mac/drawingml/2011/main" xmlns="" val="1"/>
+              <ma14:wrappingTextBoxFlag xmlns="" xmlns:ma14="http://schemas.microsoft.com/office/mac/drawingml/2011/main" val="1"/>
             </a:ext>
           </a:extLst>
         </p:spPr>
@@ -4261,7 +4261,6 @@
               <a:rPr lang="it-IT" sz="2000" dirty="0" smtClean="0"/>
               <a:t>.</a:t>
             </a:r>
-            <a:endParaRPr lang="it-IT" sz="2000" dirty="0" smtClean="0"/>
           </a:p>
         </p:txBody>
       </p:sp>
@@ -4489,7 +4488,7 @@
           </a:ln>
           <a:extLst>
             <a:ext uri="{C572A759-6A51-4108-AA02-DFA0A04FC94B}">
-              <ma14:wrappingTextBoxFlag xmlns:ma14="http://schemas.microsoft.com/office/mac/drawingml/2011/main" xmlns="" val="1"/>
+              <ma14:wrappingTextBoxFlag xmlns="" xmlns:ma14="http://schemas.microsoft.com/office/mac/drawingml/2011/main" val="1"/>
             </a:ext>
           </a:extLst>
         </p:spPr>
@@ -4553,7 +4552,7 @@
           </a:ln>
           <a:extLst>
             <a:ext uri="{C572A759-6A51-4108-AA02-DFA0A04FC94B}">
-              <ma14:wrappingTextBoxFlag xmlns:ma14="http://schemas.microsoft.com/office/mac/drawingml/2011/main" xmlns="" val="1"/>
+              <ma14:wrappingTextBoxFlag xmlns="" xmlns:ma14="http://schemas.microsoft.com/office/mac/drawingml/2011/main" val="1"/>
             </a:ext>
           </a:extLst>
         </p:spPr>
@@ -4719,7 +4718,7 @@
           </a:ln>
           <a:extLst>
             <a:ext uri="{C572A759-6A51-4108-AA02-DFA0A04FC94B}">
-              <ma14:wrappingTextBoxFlag xmlns:ma14="http://schemas.microsoft.com/office/mac/drawingml/2011/main" xmlns="" val="1"/>
+              <ma14:wrappingTextBoxFlag xmlns="" xmlns:ma14="http://schemas.microsoft.com/office/mac/drawingml/2011/main" val="1"/>
             </a:ext>
           </a:extLst>
         </p:spPr>
@@ -4783,7 +4782,7 @@
           </a:ln>
           <a:extLst>
             <a:ext uri="{C572A759-6A51-4108-AA02-DFA0A04FC94B}">
-              <ma14:wrappingTextBoxFlag xmlns:ma14="http://schemas.microsoft.com/office/mac/drawingml/2011/main" xmlns="" val="1"/>
+              <ma14:wrappingTextBoxFlag xmlns="" xmlns:ma14="http://schemas.microsoft.com/office/mac/drawingml/2011/main" val="1"/>
             </a:ext>
           </a:extLst>
         </p:spPr>
@@ -5330,7 +5329,7 @@
           </a:ln>
           <a:extLst>
             <a:ext uri="{C572A759-6A51-4108-AA02-DFA0A04FC94B}">
-              <ma14:wrappingTextBoxFlag xmlns:ma14="http://schemas.microsoft.com/office/mac/drawingml/2011/main" xmlns="" val="1"/>
+              <ma14:wrappingTextBoxFlag xmlns="" xmlns:ma14="http://schemas.microsoft.com/office/mac/drawingml/2011/main" val="1"/>
             </a:ext>
           </a:extLst>
         </p:spPr>
@@ -5394,7 +5393,7 @@
           </a:ln>
           <a:extLst>
             <a:ext uri="{C572A759-6A51-4108-AA02-DFA0A04FC94B}">
-              <ma14:wrappingTextBoxFlag xmlns:ma14="http://schemas.microsoft.com/office/mac/drawingml/2011/main" xmlns="" val="1"/>
+              <ma14:wrappingTextBoxFlag xmlns="" xmlns:ma14="http://schemas.microsoft.com/office/mac/drawingml/2011/main" val="1"/>
             </a:ext>
           </a:extLst>
         </p:spPr>
@@ -5654,7 +5653,7 @@
           </a:ln>
           <a:extLst>
             <a:ext uri="{C572A759-6A51-4108-AA02-DFA0A04FC94B}">
-              <ma14:wrappingTextBoxFlag xmlns:ma14="http://schemas.microsoft.com/office/mac/drawingml/2011/main" xmlns="" val="1"/>
+              <ma14:wrappingTextBoxFlag xmlns="" xmlns:ma14="http://schemas.microsoft.com/office/mac/drawingml/2011/main" val="1"/>
             </a:ext>
           </a:extLst>
         </p:spPr>
@@ -5718,7 +5717,7 @@
           </a:ln>
           <a:extLst>
             <a:ext uri="{C572A759-6A51-4108-AA02-DFA0A04FC94B}">
-              <ma14:wrappingTextBoxFlag xmlns:ma14="http://schemas.microsoft.com/office/mac/drawingml/2011/main" xmlns="" val="1"/>
+              <ma14:wrappingTextBoxFlag xmlns="" xmlns:ma14="http://schemas.microsoft.com/office/mac/drawingml/2011/main" val="1"/>
             </a:ext>
           </a:extLst>
         </p:spPr>
@@ -5956,7 +5955,7 @@
           </a:ln>
           <a:extLst>
             <a:ext uri="{C572A759-6A51-4108-AA02-DFA0A04FC94B}">
-              <ma14:wrappingTextBoxFlag xmlns:ma14="http://schemas.microsoft.com/office/mac/drawingml/2011/main" xmlns="" val="1"/>
+              <ma14:wrappingTextBoxFlag xmlns="" xmlns:ma14="http://schemas.microsoft.com/office/mac/drawingml/2011/main" val="1"/>
             </a:ext>
           </a:extLst>
         </p:spPr>
@@ -6020,7 +6019,7 @@
           </a:ln>
           <a:extLst>
             <a:ext uri="{C572A759-6A51-4108-AA02-DFA0A04FC94B}">
-              <ma14:wrappingTextBoxFlag xmlns:ma14="http://schemas.microsoft.com/office/mac/drawingml/2011/main" xmlns="" val="1"/>
+              <ma14:wrappingTextBoxFlag xmlns="" xmlns:ma14="http://schemas.microsoft.com/office/mac/drawingml/2011/main" val="1"/>
             </a:ext>
           </a:extLst>
         </p:spPr>
@@ -6387,7 +6386,7 @@
           </a:ln>
           <a:extLst>
             <a:ext uri="{C572A759-6A51-4108-AA02-DFA0A04FC94B}">
-              <ma14:wrappingTextBoxFlag xmlns:ma14="http://schemas.microsoft.com/office/mac/drawingml/2011/main" xmlns="" val="1"/>
+              <ma14:wrappingTextBoxFlag xmlns="" xmlns:ma14="http://schemas.microsoft.com/office/mac/drawingml/2011/main" val="1"/>
             </a:ext>
           </a:extLst>
         </p:spPr>
@@ -6451,7 +6450,7 @@
           </a:ln>
           <a:extLst>
             <a:ext uri="{C572A759-6A51-4108-AA02-DFA0A04FC94B}">
-              <ma14:wrappingTextBoxFlag xmlns:ma14="http://schemas.microsoft.com/office/mac/drawingml/2011/main" xmlns="" val="1"/>
+              <ma14:wrappingTextBoxFlag xmlns="" xmlns:ma14="http://schemas.microsoft.com/office/mac/drawingml/2011/main" val="1"/>
             </a:ext>
           </a:extLst>
         </p:spPr>
@@ -6818,7 +6817,7 @@
           </a:ln>
           <a:extLst>
             <a:ext uri="{C572A759-6A51-4108-AA02-DFA0A04FC94B}">
-              <ma14:wrappingTextBoxFlag xmlns:ma14="http://schemas.microsoft.com/office/mac/drawingml/2011/main" xmlns="" val="1"/>
+              <ma14:wrappingTextBoxFlag xmlns="" xmlns:ma14="http://schemas.microsoft.com/office/mac/drawingml/2011/main" val="1"/>
             </a:ext>
           </a:extLst>
         </p:spPr>
@@ -6882,7 +6881,7 @@
           </a:ln>
           <a:extLst>
             <a:ext uri="{C572A759-6A51-4108-AA02-DFA0A04FC94B}">
-              <ma14:wrappingTextBoxFlag xmlns:ma14="http://schemas.microsoft.com/office/mac/drawingml/2011/main" xmlns="" val="1"/>
+              <ma14:wrappingTextBoxFlag xmlns="" xmlns:ma14="http://schemas.microsoft.com/office/mac/drawingml/2011/main" val="1"/>
             </a:ext>
           </a:extLst>
         </p:spPr>
@@ -7237,7 +7236,7 @@
           </a:ln>
           <a:extLst>
             <a:ext uri="{C572A759-6A51-4108-AA02-DFA0A04FC94B}">
-              <ma14:wrappingTextBoxFlag xmlns:ma14="http://schemas.microsoft.com/office/mac/drawingml/2011/main" xmlns="" val="1"/>
+              <ma14:wrappingTextBoxFlag xmlns="" xmlns:ma14="http://schemas.microsoft.com/office/mac/drawingml/2011/main" val="1"/>
             </a:ext>
           </a:extLst>
         </p:spPr>
@@ -7301,7 +7300,7 @@
           </a:ln>
           <a:extLst>
             <a:ext uri="{C572A759-6A51-4108-AA02-DFA0A04FC94B}">
-              <ma14:wrappingTextBoxFlag xmlns:ma14="http://schemas.microsoft.com/office/mac/drawingml/2011/main" xmlns="" val="1"/>
+              <ma14:wrappingTextBoxFlag xmlns="" xmlns:ma14="http://schemas.microsoft.com/office/mac/drawingml/2011/main" val="1"/>
             </a:ext>
           </a:extLst>
         </p:spPr>
@@ -7580,7 +7579,7 @@
           </a:ln>
           <a:extLst>
             <a:ext uri="{C572A759-6A51-4108-AA02-DFA0A04FC94B}">
-              <ma14:wrappingTextBoxFlag xmlns:ma14="http://schemas.microsoft.com/office/mac/drawingml/2011/main" xmlns="" val="1"/>
+              <ma14:wrappingTextBoxFlag xmlns="" xmlns:ma14="http://schemas.microsoft.com/office/mac/drawingml/2011/main" val="1"/>
             </a:ext>
           </a:extLst>
         </p:spPr>
@@ -7644,7 +7643,7 @@
           </a:ln>
           <a:extLst>
             <a:ext uri="{C572A759-6A51-4108-AA02-DFA0A04FC94B}">
-              <ma14:wrappingTextBoxFlag xmlns:ma14="http://schemas.microsoft.com/office/mac/drawingml/2011/main" xmlns="" val="1"/>
+              <ma14:wrappingTextBoxFlag xmlns="" xmlns:ma14="http://schemas.microsoft.com/office/mac/drawingml/2011/main" val="1"/>
             </a:ext>
           </a:extLst>
         </p:spPr>
@@ -7892,7 +7891,7 @@
           </a:ln>
           <a:extLst>
             <a:ext uri="{C572A759-6A51-4108-AA02-DFA0A04FC94B}">
-              <ma14:wrappingTextBoxFlag xmlns:ma14="http://schemas.microsoft.com/office/mac/drawingml/2011/main" xmlns="" val="1"/>
+              <ma14:wrappingTextBoxFlag xmlns="" xmlns:ma14="http://schemas.microsoft.com/office/mac/drawingml/2011/main" val="1"/>
             </a:ext>
           </a:extLst>
         </p:spPr>
@@ -7956,7 +7955,7 @@
           </a:ln>
           <a:extLst>
             <a:ext uri="{C572A759-6A51-4108-AA02-DFA0A04FC94B}">
-              <ma14:wrappingTextBoxFlag xmlns:ma14="http://schemas.microsoft.com/office/mac/drawingml/2011/main" xmlns="" val="1"/>
+              <ma14:wrappingTextBoxFlag xmlns="" xmlns:ma14="http://schemas.microsoft.com/office/mac/drawingml/2011/main" val="1"/>
             </a:ext>
           </a:extLst>
         </p:spPr>
@@ -8122,7 +8121,7 @@
           </a:ln>
           <a:extLst>
             <a:ext uri="{C572A759-6A51-4108-AA02-DFA0A04FC94B}">
-              <ma14:wrappingTextBoxFlag xmlns:ma14="http://schemas.microsoft.com/office/mac/drawingml/2011/main" xmlns="" val="1"/>
+              <ma14:wrappingTextBoxFlag xmlns="" xmlns:ma14="http://schemas.microsoft.com/office/mac/drawingml/2011/main" val="1"/>
             </a:ext>
           </a:extLst>
         </p:spPr>
@@ -8186,7 +8185,7 @@
           </a:ln>
           <a:extLst>
             <a:ext uri="{C572A759-6A51-4108-AA02-DFA0A04FC94B}">
-              <ma14:wrappingTextBoxFlag xmlns:ma14="http://schemas.microsoft.com/office/mac/drawingml/2011/main" xmlns="" val="1"/>
+              <ma14:wrappingTextBoxFlag xmlns="" xmlns:ma14="http://schemas.microsoft.com/office/mac/drawingml/2011/main" val="1"/>
             </a:ext>
           </a:extLst>
         </p:spPr>
@@ -8434,7 +8433,7 @@
           </a:ln>
           <a:extLst>
             <a:ext uri="{C572A759-6A51-4108-AA02-DFA0A04FC94B}">
-              <ma14:wrappingTextBoxFlag xmlns:ma14="http://schemas.microsoft.com/office/mac/drawingml/2011/main" xmlns="" val="1"/>
+              <ma14:wrappingTextBoxFlag xmlns="" xmlns:ma14="http://schemas.microsoft.com/office/mac/drawingml/2011/main" val="1"/>
             </a:ext>
           </a:extLst>
         </p:spPr>
@@ -8498,7 +8497,7 @@
           </a:ln>
           <a:extLst>
             <a:ext uri="{C572A759-6A51-4108-AA02-DFA0A04FC94B}">
-              <ma14:wrappingTextBoxFlag xmlns:ma14="http://schemas.microsoft.com/office/mac/drawingml/2011/main" xmlns="" val="1"/>
+              <ma14:wrappingTextBoxFlag xmlns="" xmlns:ma14="http://schemas.microsoft.com/office/mac/drawingml/2011/main" val="1"/>
             </a:ext>
           </a:extLst>
         </p:spPr>
@@ -8746,7 +8745,7 @@
           </a:ln>
           <a:extLst>
             <a:ext uri="{C572A759-6A51-4108-AA02-DFA0A04FC94B}">
-              <ma14:wrappingTextBoxFlag xmlns:ma14="http://schemas.microsoft.com/office/mac/drawingml/2011/main" xmlns="" val="1"/>
+              <ma14:wrappingTextBoxFlag xmlns="" xmlns:ma14="http://schemas.microsoft.com/office/mac/drawingml/2011/main" val="1"/>
             </a:ext>
           </a:extLst>
         </p:spPr>
@@ -8810,7 +8809,7 @@
           </a:ln>
           <a:extLst>
             <a:ext uri="{C572A759-6A51-4108-AA02-DFA0A04FC94B}">
-              <ma14:wrappingTextBoxFlag xmlns:ma14="http://schemas.microsoft.com/office/mac/drawingml/2011/main" xmlns="" val="1"/>
+              <ma14:wrappingTextBoxFlag xmlns="" xmlns:ma14="http://schemas.microsoft.com/office/mac/drawingml/2011/main" val="1"/>
             </a:ext>
           </a:extLst>
         </p:spPr>
@@ -9058,7 +9057,7 @@
           </a:ln>
           <a:extLst>
             <a:ext uri="{C572A759-6A51-4108-AA02-DFA0A04FC94B}">
-              <ma14:wrappingTextBoxFlag xmlns:ma14="http://schemas.microsoft.com/office/mac/drawingml/2011/main" xmlns="" val="1"/>
+              <ma14:wrappingTextBoxFlag xmlns="" xmlns:ma14="http://schemas.microsoft.com/office/mac/drawingml/2011/main" val="1"/>
             </a:ext>
           </a:extLst>
         </p:spPr>
@@ -9122,7 +9121,7 @@
           </a:ln>
           <a:extLst>
             <a:ext uri="{C572A759-6A51-4108-AA02-DFA0A04FC94B}">
-              <ma14:wrappingTextBoxFlag xmlns:ma14="http://schemas.microsoft.com/office/mac/drawingml/2011/main" xmlns="" val="1"/>
+              <ma14:wrappingTextBoxFlag xmlns="" xmlns:ma14="http://schemas.microsoft.com/office/mac/drawingml/2011/main" val="1"/>
             </a:ext>
           </a:extLst>
         </p:spPr>
@@ -9317,7 +9316,7 @@
           </a:ln>
           <a:extLst>
             <a:ext uri="{C572A759-6A51-4108-AA02-DFA0A04FC94B}">
-              <ma14:wrappingTextBoxFlag xmlns:ma14="http://schemas.microsoft.com/office/mac/drawingml/2011/main" xmlns="" val="1"/>
+              <ma14:wrappingTextBoxFlag xmlns="" xmlns:ma14="http://schemas.microsoft.com/office/mac/drawingml/2011/main" val="1"/>
             </a:ext>
           </a:extLst>
         </p:spPr>
@@ -9381,7 +9380,7 @@
           </a:ln>
           <a:extLst>
             <a:ext uri="{C572A759-6A51-4108-AA02-DFA0A04FC94B}">
-              <ma14:wrappingTextBoxFlag xmlns:ma14="http://schemas.microsoft.com/office/mac/drawingml/2011/main" xmlns="" val="1"/>
+              <ma14:wrappingTextBoxFlag xmlns="" xmlns:ma14="http://schemas.microsoft.com/office/mac/drawingml/2011/main" val="1"/>
             </a:ext>
           </a:extLst>
         </p:spPr>
@@ -9856,7 +9855,7 @@
           </a:ln>
           <a:extLst>
             <a:ext uri="{C572A759-6A51-4108-AA02-DFA0A04FC94B}">
-              <ma14:wrappingTextBoxFlag xmlns:ma14="http://schemas.microsoft.com/office/mac/drawingml/2011/main" xmlns="" val="1"/>
+              <ma14:wrappingTextBoxFlag xmlns="" xmlns:ma14="http://schemas.microsoft.com/office/mac/drawingml/2011/main" val="1"/>
             </a:ext>
           </a:extLst>
         </p:spPr>
@@ -9920,7 +9919,7 @@
           </a:ln>
           <a:extLst>
             <a:ext uri="{C572A759-6A51-4108-AA02-DFA0A04FC94B}">
-              <ma14:wrappingTextBoxFlag xmlns:ma14="http://schemas.microsoft.com/office/mac/drawingml/2011/main" xmlns="" val="1"/>
+              <ma14:wrappingTextBoxFlag xmlns="" xmlns:ma14="http://schemas.microsoft.com/office/mac/drawingml/2011/main" val="1"/>
             </a:ext>
           </a:extLst>
         </p:spPr>
@@ -10190,7 +10189,7 @@
           </a:ln>
           <a:extLst>
             <a:ext uri="{C572A759-6A51-4108-AA02-DFA0A04FC94B}">
-              <ma14:wrappingTextBoxFlag xmlns:ma14="http://schemas.microsoft.com/office/mac/drawingml/2011/main" xmlns="" val="1"/>
+              <ma14:wrappingTextBoxFlag xmlns="" xmlns:ma14="http://schemas.microsoft.com/office/mac/drawingml/2011/main" val="1"/>
             </a:ext>
           </a:extLst>
         </p:spPr>
@@ -10254,7 +10253,7 @@
           </a:ln>
           <a:extLst>
             <a:ext uri="{C572A759-6A51-4108-AA02-DFA0A04FC94B}">
-              <ma14:wrappingTextBoxFlag xmlns:ma14="http://schemas.microsoft.com/office/mac/drawingml/2011/main" xmlns="" val="1"/>
+              <ma14:wrappingTextBoxFlag xmlns="" xmlns:ma14="http://schemas.microsoft.com/office/mac/drawingml/2011/main" val="1"/>
             </a:ext>
           </a:extLst>
         </p:spPr>
@@ -10597,7 +10596,7 @@
           </a:ln>
           <a:extLst>
             <a:ext uri="{C572A759-6A51-4108-AA02-DFA0A04FC94B}">
-              <ma14:wrappingTextBoxFlag xmlns:ma14="http://schemas.microsoft.com/office/mac/drawingml/2011/main" xmlns="" val="1"/>
+              <ma14:wrappingTextBoxFlag xmlns="" xmlns:ma14="http://schemas.microsoft.com/office/mac/drawingml/2011/main" val="1"/>
             </a:ext>
           </a:extLst>
         </p:spPr>
@@ -10661,7 +10660,7 @@
           </a:ln>
           <a:extLst>
             <a:ext uri="{C572A759-6A51-4108-AA02-DFA0A04FC94B}">
-              <ma14:wrappingTextBoxFlag xmlns:ma14="http://schemas.microsoft.com/office/mac/drawingml/2011/main" xmlns="" val="1"/>
+              <ma14:wrappingTextBoxFlag xmlns="" xmlns:ma14="http://schemas.microsoft.com/office/mac/drawingml/2011/main" val="1"/>
             </a:ext>
           </a:extLst>
         </p:spPr>
@@ -11003,7 +11002,7 @@
           </a:ln>
           <a:extLst>
             <a:ext uri="{C572A759-6A51-4108-AA02-DFA0A04FC94B}">
-              <ma14:wrappingTextBoxFlag xmlns:ma14="http://schemas.microsoft.com/office/mac/drawingml/2011/main" xmlns="" val="1"/>
+              <ma14:wrappingTextBoxFlag xmlns="" xmlns:ma14="http://schemas.microsoft.com/office/mac/drawingml/2011/main" val="1"/>
             </a:ext>
           </a:extLst>
         </p:spPr>
@@ -11067,7 +11066,7 @@
           </a:ln>
           <a:extLst>
             <a:ext uri="{C572A759-6A51-4108-AA02-DFA0A04FC94B}">
-              <ma14:wrappingTextBoxFlag xmlns:ma14="http://schemas.microsoft.com/office/mac/drawingml/2011/main" xmlns="" val="1"/>
+              <ma14:wrappingTextBoxFlag xmlns="" xmlns:ma14="http://schemas.microsoft.com/office/mac/drawingml/2011/main" val="1"/>
             </a:ext>
           </a:extLst>
         </p:spPr>
@@ -11738,7 +11737,7 @@
           </a:ln>
           <a:extLst>
             <a:ext uri="{C572A759-6A51-4108-AA02-DFA0A04FC94B}">
-              <ma14:wrappingTextBoxFlag xmlns:ma14="http://schemas.microsoft.com/office/mac/drawingml/2011/main" xmlns="" val="1"/>
+              <ma14:wrappingTextBoxFlag xmlns="" xmlns:ma14="http://schemas.microsoft.com/office/mac/drawingml/2011/main" val="1"/>
             </a:ext>
           </a:extLst>
         </p:spPr>
@@ -11802,7 +11801,7 @@
           </a:ln>
           <a:extLst>
             <a:ext uri="{C572A759-6A51-4108-AA02-DFA0A04FC94B}">
-              <ma14:wrappingTextBoxFlag xmlns:ma14="http://schemas.microsoft.com/office/mac/drawingml/2011/main" xmlns="" val="1"/>
+              <ma14:wrappingTextBoxFlag xmlns="" xmlns:ma14="http://schemas.microsoft.com/office/mac/drawingml/2011/main" val="1"/>
             </a:ext>
           </a:extLst>
         </p:spPr>
@@ -12417,7 +12416,7 @@
           </a:ln>
           <a:extLst>
             <a:ext uri="{C572A759-6A51-4108-AA02-DFA0A04FC94B}">
-              <ma14:wrappingTextBoxFlag xmlns:ma14="http://schemas.microsoft.com/office/mac/drawingml/2011/main" xmlns="" val="1"/>
+              <ma14:wrappingTextBoxFlag xmlns="" xmlns:ma14="http://schemas.microsoft.com/office/mac/drawingml/2011/main" val="1"/>
             </a:ext>
           </a:extLst>
         </p:spPr>
@@ -12481,7 +12480,7 @@
           </a:ln>
           <a:extLst>
             <a:ext uri="{C572A759-6A51-4108-AA02-DFA0A04FC94B}">
-              <ma14:wrappingTextBoxFlag xmlns:ma14="http://schemas.microsoft.com/office/mac/drawingml/2011/main" xmlns="" val="1"/>
+              <ma14:wrappingTextBoxFlag xmlns="" xmlns:ma14="http://schemas.microsoft.com/office/mac/drawingml/2011/main" val="1"/>
             </a:ext>
           </a:extLst>
         </p:spPr>
@@ -12929,7 +12928,7 @@
           </a:prstGeom>
           <a:extLst>
             <a:ext uri="{C572A759-6A51-4108-AA02-DFA0A04FC94B}">
-              <ma14:wrappingTextBoxFlag xmlns:ma14="http://schemas.microsoft.com/office/mac/drawingml/2011/main" xmlns="" val="1"/>
+              <ma14:wrappingTextBoxFlag xmlns="" xmlns:ma14="http://schemas.microsoft.com/office/mac/drawingml/2011/main" val="1"/>
             </a:ext>
           </a:extLst>
         </p:spPr>
@@ -12963,7 +12962,7 @@
           </a:ln>
           <a:extLst>
             <a:ext uri="{C572A759-6A51-4108-AA02-DFA0A04FC94B}">
-              <ma14:wrappingTextBoxFlag xmlns:ma14="http://schemas.microsoft.com/office/mac/drawingml/2011/main" xmlns="" val="1"/>
+              <ma14:wrappingTextBoxFlag xmlns="" xmlns:ma14="http://schemas.microsoft.com/office/mac/drawingml/2011/main" val="1"/>
             </a:ext>
           </a:extLst>
         </p:spPr>
@@ -13029,7 +13028,7 @@
           </a:ln>
           <a:extLst>
             <a:ext uri="{C572A759-6A51-4108-AA02-DFA0A04FC94B}">
-              <ma14:wrappingTextBoxFlag xmlns:ma14="http://schemas.microsoft.com/office/mac/drawingml/2011/main" xmlns="" val="1"/>
+              <ma14:wrappingTextBoxFlag xmlns="" xmlns:ma14="http://schemas.microsoft.com/office/mac/drawingml/2011/main" val="1"/>
             </a:ext>
           </a:extLst>
         </p:spPr>
@@ -13088,7 +13087,7 @@
           </a:ln>
           <a:extLst>
             <a:ext uri="{C572A759-6A51-4108-AA02-DFA0A04FC94B}">
-              <ma14:wrappingTextBoxFlag xmlns:ma14="http://schemas.microsoft.com/office/mac/drawingml/2011/main" xmlns="" val="1"/>
+              <ma14:wrappingTextBoxFlag xmlns="" xmlns:ma14="http://schemas.microsoft.com/office/mac/drawingml/2011/main" val="1"/>
             </a:ext>
           </a:extLst>
         </p:spPr>
@@ -13193,7 +13192,7 @@
           </a:ln>
           <a:extLst>
             <a:ext uri="{C572A759-6A51-4108-AA02-DFA0A04FC94B}">
-              <ma14:wrappingTextBoxFlag xmlns:ma14="http://schemas.microsoft.com/office/mac/drawingml/2011/main" xmlns="" val="1"/>
+              <ma14:wrappingTextBoxFlag xmlns="" xmlns:ma14="http://schemas.microsoft.com/office/mac/drawingml/2011/main" val="1"/>
             </a:ext>
           </a:extLst>
         </p:spPr>
@@ -13257,7 +13256,7 @@
           </a:ln>
           <a:extLst>
             <a:ext uri="{C572A759-6A51-4108-AA02-DFA0A04FC94B}">
-              <ma14:wrappingTextBoxFlag xmlns:ma14="http://schemas.microsoft.com/office/mac/drawingml/2011/main" xmlns="" val="1"/>
+              <ma14:wrappingTextBoxFlag xmlns="" xmlns:ma14="http://schemas.microsoft.com/office/mac/drawingml/2011/main" val="1"/>
             </a:ext>
           </a:extLst>
         </p:spPr>
@@ -13441,7 +13440,7 @@
           </a:ln>
           <a:extLst>
             <a:ext uri="{C572A759-6A51-4108-AA02-DFA0A04FC94B}">
-              <ma14:wrappingTextBoxFlag xmlns:ma14="http://schemas.microsoft.com/office/mac/drawingml/2011/main" xmlns="" val="1"/>
+              <ma14:wrappingTextBoxFlag xmlns="" xmlns:ma14="http://schemas.microsoft.com/office/mac/drawingml/2011/main" val="1"/>
             </a:ext>
           </a:extLst>
         </p:spPr>
@@ -13505,7 +13504,7 @@
           </a:ln>
           <a:extLst>
             <a:ext uri="{C572A759-6A51-4108-AA02-DFA0A04FC94B}">
-              <ma14:wrappingTextBoxFlag xmlns:ma14="http://schemas.microsoft.com/office/mac/drawingml/2011/main" xmlns="" val="1"/>
+              <ma14:wrappingTextBoxFlag xmlns="" xmlns:ma14="http://schemas.microsoft.com/office/mac/drawingml/2011/main" val="1"/>
             </a:ext>
           </a:extLst>
         </p:spPr>
@@ -13585,15 +13584,7 @@
             <a:pPr algn="ctr"/>
             <a:r>
               <a:rPr lang="it-IT" sz="2000" dirty="0" smtClean="0"/>
-              <a:t> </a:t>
-            </a:r>
-            <a:r>
-              <a:rPr lang="it-IT" sz="2000" dirty="0" smtClean="0"/>
-              <a:t>PARAMETERS </a:t>
-            </a:r>
-            <a:r>
-              <a:rPr lang="it-IT" sz="2000" dirty="0" smtClean="0"/>
-              <a:t>OF SWRC MODEL </a:t>
+              <a:t> PARAMETERS OF SWRC MODEL </a:t>
             </a:r>
             <a:r>
               <a:rPr lang="en-GB" sz="2000" dirty="0" smtClean="0"/>
@@ -13690,7 +13681,7 @@
           </a:ln>
           <a:extLst>
             <a:ext uri="{C572A759-6A51-4108-AA02-DFA0A04FC94B}">
-              <ma14:wrappingTextBoxFlag xmlns:ma14="http://schemas.microsoft.com/office/mac/drawingml/2011/main" xmlns="" val="1"/>
+              <ma14:wrappingTextBoxFlag xmlns="" xmlns:ma14="http://schemas.microsoft.com/office/mac/drawingml/2011/main" val="1"/>
             </a:ext>
           </a:extLst>
         </p:spPr>
@@ -13754,7 +13745,7 @@
           </a:ln>
           <a:extLst>
             <a:ext uri="{C572A759-6A51-4108-AA02-DFA0A04FC94B}">
-              <ma14:wrappingTextBoxFlag xmlns:ma14="http://schemas.microsoft.com/office/mac/drawingml/2011/main" xmlns="" val="1"/>
+              <ma14:wrappingTextBoxFlag xmlns="" xmlns:ma14="http://schemas.microsoft.com/office/mac/drawingml/2011/main" val="1"/>
             </a:ext>
           </a:extLst>
         </p:spPr>
@@ -13931,7 +13922,7 @@
           </a:ln>
           <a:extLst>
             <a:ext uri="{C572A759-6A51-4108-AA02-DFA0A04FC94B}">
-              <ma14:wrappingTextBoxFlag xmlns:ma14="http://schemas.microsoft.com/office/mac/drawingml/2011/main" xmlns="" val="1"/>
+              <ma14:wrappingTextBoxFlag xmlns="" xmlns:ma14="http://schemas.microsoft.com/office/mac/drawingml/2011/main" val="1"/>
             </a:ext>
           </a:extLst>
         </p:spPr>
@@ -13995,7 +13986,7 @@
           </a:ln>
           <a:extLst>
             <a:ext uri="{C572A759-6A51-4108-AA02-DFA0A04FC94B}">
-              <ma14:wrappingTextBoxFlag xmlns:ma14="http://schemas.microsoft.com/office/mac/drawingml/2011/main" xmlns="" val="1"/>
+              <ma14:wrappingTextBoxFlag xmlns="" xmlns:ma14="http://schemas.microsoft.com/office/mac/drawingml/2011/main" val="1"/>
             </a:ext>
           </a:extLst>
         </p:spPr>
@@ -14192,19 +14183,7 @@
           <a:p>
             <a:r>
               <a:rPr lang="it-IT" sz="2000" dirty="0" smtClean="0"/>
-              <a:t>RAINFALL HEIGTH  </a:t>
-            </a:r>
-            <a:r>
-              <a:rPr lang="it-IT" sz="2000" dirty="0" smtClean="0"/>
-              <a:t>HAS </a:t>
-            </a:r>
-            <a:r>
-              <a:rPr lang="it-IT" sz="2000" dirty="0" smtClean="0"/>
-              <a:t>TO BE EXPRESSED IN [mm</a:t>
-            </a:r>
-            <a:r>
-              <a:rPr lang="it-IT" sz="2000" dirty="0" smtClean="0"/>
-              <a:t>]</a:t>
+              <a:t>RAINFALL HEIGTH  HAS TO BE EXPRESSED IN [mm]</a:t>
             </a:r>
           </a:p>
           <a:p>
@@ -14306,7 +14285,7 @@
           </a:ln>
           <a:extLst>
             <a:ext uri="{C572A759-6A51-4108-AA02-DFA0A04FC94B}">
-              <ma14:wrappingTextBoxFlag xmlns:ma14="http://schemas.microsoft.com/office/mac/drawingml/2011/main" xmlns="" val="1"/>
+              <ma14:wrappingTextBoxFlag xmlns="" xmlns:ma14="http://schemas.microsoft.com/office/mac/drawingml/2011/main" val="1"/>
             </a:ext>
           </a:extLst>
         </p:spPr>
@@ -14370,7 +14349,7 @@
           </a:ln>
           <a:extLst>
             <a:ext uri="{C572A759-6A51-4108-AA02-DFA0A04FC94B}">
-              <ma14:wrappingTextBoxFlag xmlns:ma14="http://schemas.microsoft.com/office/mac/drawingml/2011/main" xmlns="" val="1"/>
+              <ma14:wrappingTextBoxFlag xmlns="" xmlns:ma14="http://schemas.microsoft.com/office/mac/drawingml/2011/main" val="1"/>
             </a:ext>
           </a:extLst>
         </p:spPr>
@@ -14536,7 +14515,7 @@
         </p:nvSpPr>
         <p:spPr>
           <a:xfrm>
-            <a:off x="781840" y="4890084"/>
+            <a:off x="781840" y="5284522"/>
             <a:ext cx="7580318" cy="400110"/>
           </a:xfrm>
           <a:prstGeom prst="rect">
@@ -14560,7 +14539,7 @@
       </p:sp>
       <p:pic>
         <p:nvPicPr>
-          <p:cNvPr id="7" name="Immagine 6"/>
+          <p:cNvPr id="3" name="Immagine 2"/>
           <p:cNvPicPr>
             <a:picLocks noChangeAspect="1"/>
           </p:cNvPicPr>
@@ -14580,8 +14559,8 @@
         </p:blipFill>
         <p:spPr>
           <a:xfrm>
-            <a:off x="498100" y="2933629"/>
-            <a:ext cx="7426531" cy="1566651"/>
+            <a:off x="897643" y="2882896"/>
+            <a:ext cx="7456854" cy="2132691"/>
           </a:xfrm>
           <a:prstGeom prst="rect">
             <a:avLst/>
@@ -14645,7 +14624,7 @@
           </a:ln>
           <a:extLst>
             <a:ext uri="{C572A759-6A51-4108-AA02-DFA0A04FC94B}">
-              <ma14:wrappingTextBoxFlag xmlns:ma14="http://schemas.microsoft.com/office/mac/drawingml/2011/main" xmlns="" val="1"/>
+              <ma14:wrappingTextBoxFlag xmlns="" xmlns:ma14="http://schemas.microsoft.com/office/mac/drawingml/2011/main" val="1"/>
             </a:ext>
           </a:extLst>
         </p:spPr>
@@ -14709,7 +14688,7 @@
           </a:ln>
           <a:extLst>
             <a:ext uri="{C572A759-6A51-4108-AA02-DFA0A04FC94B}">
-              <ma14:wrappingTextBoxFlag xmlns:ma14="http://schemas.microsoft.com/office/mac/drawingml/2011/main" xmlns="" val="1"/>
+              <ma14:wrappingTextBoxFlag xmlns="" xmlns:ma14="http://schemas.microsoft.com/office/mac/drawingml/2011/main" val="1"/>
             </a:ext>
           </a:extLst>
         </p:spPr>

</xml_diff>

<commit_message>
Modified the slide about the initial condition input file.
</commit_message>
<xml_diff>
--- a/Materials/Richards_English.pptx
+++ b/Materials/Richards_English.pptx
@@ -221,7 +221,7 @@
           <a:p>
             <a:fld id="{4D0C6883-54F1-064A-A731-D2789FFABA37}" type="datetimeFigureOut">
               <a:rPr lang="it-IT" smtClean="0"/>
-              <a:t>07/11/2017</a:t>
+              <a:t>08/11/2017</a:t>
             </a:fld>
             <a:endParaRPr lang="en-GB"/>
           </a:p>
@@ -670,7 +670,7 @@
           <a:p>
             <a:fld id="{D3F618D5-3DB9-B146-87ED-A3BCB7C64B91}" type="datetimeFigureOut">
               <a:rPr lang="it-IT" smtClean="0"/>
-              <a:t>07/11/2017</a:t>
+              <a:t>08/11/2017</a:t>
             </a:fld>
             <a:endParaRPr lang="en-GB"/>
           </a:p>
@@ -840,7 +840,7 @@
           <a:p>
             <a:fld id="{D3F618D5-3DB9-B146-87ED-A3BCB7C64B91}" type="datetimeFigureOut">
               <a:rPr lang="it-IT" smtClean="0"/>
-              <a:t>07/11/2017</a:t>
+              <a:t>08/11/2017</a:t>
             </a:fld>
             <a:endParaRPr lang="en-GB"/>
           </a:p>
@@ -1020,7 +1020,7 @@
           <a:p>
             <a:fld id="{D3F618D5-3DB9-B146-87ED-A3BCB7C64B91}" type="datetimeFigureOut">
               <a:rPr lang="it-IT" smtClean="0"/>
-              <a:t>07/11/2017</a:t>
+              <a:t>08/11/2017</a:t>
             </a:fld>
             <a:endParaRPr lang="en-GB"/>
           </a:p>
@@ -1226,7 +1226,7 @@
           </a:ln>
           <a:extLst>
             <a:ext uri="{C572A759-6A51-4108-AA02-DFA0A04FC94B}">
-              <ma14:wrappingTextBoxFlag xmlns="" xmlns:ma14="http://schemas.microsoft.com/office/mac/drawingml/2011/main" val="1"/>
+              <ma14:wrappingTextBoxFlag xmlns:ma14="http://schemas.microsoft.com/office/mac/drawingml/2011/main" xmlns="" val="1"/>
             </a:ext>
           </a:extLst>
         </p:spPr>
@@ -1443,7 +1443,7 @@
           <a:p>
             <a:fld id="{D3F618D5-3DB9-B146-87ED-A3BCB7C64B91}" type="datetimeFigureOut">
               <a:rPr lang="it-IT" smtClean="0"/>
-              <a:t>07/11/2017</a:t>
+              <a:t>08/11/2017</a:t>
             </a:fld>
             <a:endParaRPr lang="en-GB"/>
           </a:p>
@@ -1689,7 +1689,7 @@
           <a:p>
             <a:fld id="{D3F618D5-3DB9-B146-87ED-A3BCB7C64B91}" type="datetimeFigureOut">
               <a:rPr lang="it-IT" smtClean="0"/>
-              <a:t>07/11/2017</a:t>
+              <a:t>08/11/2017</a:t>
             </a:fld>
             <a:endParaRPr lang="en-GB"/>
           </a:p>
@@ -1977,7 +1977,7 @@
           <a:p>
             <a:fld id="{D3F618D5-3DB9-B146-87ED-A3BCB7C64B91}" type="datetimeFigureOut">
               <a:rPr lang="it-IT" smtClean="0"/>
-              <a:t>07/11/2017</a:t>
+              <a:t>08/11/2017</a:t>
             </a:fld>
             <a:endParaRPr lang="en-GB"/>
           </a:p>
@@ -2399,7 +2399,7 @@
           <a:p>
             <a:fld id="{D3F618D5-3DB9-B146-87ED-A3BCB7C64B91}" type="datetimeFigureOut">
               <a:rPr lang="it-IT" smtClean="0"/>
-              <a:t>07/11/2017</a:t>
+              <a:t>08/11/2017</a:t>
             </a:fld>
             <a:endParaRPr lang="en-GB"/>
           </a:p>
@@ -2517,7 +2517,7 @@
           <a:p>
             <a:fld id="{D3F618D5-3DB9-B146-87ED-A3BCB7C64B91}" type="datetimeFigureOut">
               <a:rPr lang="it-IT" smtClean="0"/>
-              <a:t>07/11/2017</a:t>
+              <a:t>08/11/2017</a:t>
             </a:fld>
             <a:endParaRPr lang="en-GB"/>
           </a:p>
@@ -2612,7 +2612,7 @@
           <a:p>
             <a:fld id="{D3F618D5-3DB9-B146-87ED-A3BCB7C64B91}" type="datetimeFigureOut">
               <a:rPr lang="it-IT" smtClean="0"/>
-              <a:t>07/11/2017</a:t>
+              <a:t>08/11/2017</a:t>
             </a:fld>
             <a:endParaRPr lang="en-GB"/>
           </a:p>
@@ -2889,7 +2889,7 @@
           <a:p>
             <a:fld id="{D3F618D5-3DB9-B146-87ED-A3BCB7C64B91}" type="datetimeFigureOut">
               <a:rPr lang="it-IT" smtClean="0"/>
-              <a:t>07/11/2017</a:t>
+              <a:t>08/11/2017</a:t>
             </a:fld>
             <a:endParaRPr lang="en-GB"/>
           </a:p>
@@ -3142,7 +3142,7 @@
           <a:p>
             <a:fld id="{D3F618D5-3DB9-B146-87ED-A3BCB7C64B91}" type="datetimeFigureOut">
               <a:rPr lang="it-IT" smtClean="0"/>
-              <a:t>07/11/2017</a:t>
+              <a:t>08/11/2017</a:t>
             </a:fld>
             <a:endParaRPr lang="en-GB"/>
           </a:p>
@@ -3355,7 +3355,7 @@
           <a:p>
             <a:fld id="{D3F618D5-3DB9-B146-87ED-A3BCB7C64B91}" type="datetimeFigureOut">
               <a:rPr lang="it-IT" smtClean="0"/>
-              <a:t>07/11/2017</a:t>
+              <a:t>08/11/2017</a:t>
             </a:fld>
             <a:endParaRPr lang="en-GB"/>
           </a:p>
@@ -3750,7 +3750,7 @@
           </a:ln>
           <a:extLst>
             <a:ext uri="{C572A759-6A51-4108-AA02-DFA0A04FC94B}">
-              <ma14:wrappingTextBoxFlag xmlns="" xmlns:ma14="http://schemas.microsoft.com/office/mac/drawingml/2011/main" val="1"/>
+              <ma14:wrappingTextBoxFlag xmlns:ma14="http://schemas.microsoft.com/office/mac/drawingml/2011/main" xmlns="" val="1"/>
             </a:ext>
           </a:extLst>
         </p:spPr>
@@ -3850,7 +3850,7 @@
           </a:ln>
           <a:extLst>
             <a:ext uri="{C572A759-6A51-4108-AA02-DFA0A04FC94B}">
-              <ma14:wrappingTextBoxFlag xmlns="" xmlns:ma14="http://schemas.microsoft.com/office/mac/drawingml/2011/main" val="1"/>
+              <ma14:wrappingTextBoxFlag xmlns:ma14="http://schemas.microsoft.com/office/mac/drawingml/2011/main" xmlns="" val="1"/>
             </a:ext>
           </a:extLst>
         </p:spPr>
@@ -4027,7 +4027,7 @@
           </a:ln>
           <a:extLst>
             <a:ext uri="{C572A759-6A51-4108-AA02-DFA0A04FC94B}">
-              <ma14:wrappingTextBoxFlag xmlns="" xmlns:ma14="http://schemas.microsoft.com/office/mac/drawingml/2011/main" val="1"/>
+              <ma14:wrappingTextBoxFlag xmlns:ma14="http://schemas.microsoft.com/office/mac/drawingml/2011/main" xmlns="" val="1"/>
             </a:ext>
           </a:extLst>
         </p:spPr>
@@ -4091,7 +4091,7 @@
           </a:ln>
           <a:extLst>
             <a:ext uri="{C572A759-6A51-4108-AA02-DFA0A04FC94B}">
-              <ma14:wrappingTextBoxFlag xmlns="" xmlns:ma14="http://schemas.microsoft.com/office/mac/drawingml/2011/main" val="1"/>
+              <ma14:wrappingTextBoxFlag xmlns:ma14="http://schemas.microsoft.com/office/mac/drawingml/2011/main" xmlns="" val="1"/>
             </a:ext>
           </a:extLst>
         </p:spPr>
@@ -4488,7 +4488,7 @@
           </a:ln>
           <a:extLst>
             <a:ext uri="{C572A759-6A51-4108-AA02-DFA0A04FC94B}">
-              <ma14:wrappingTextBoxFlag xmlns="" xmlns:ma14="http://schemas.microsoft.com/office/mac/drawingml/2011/main" val="1"/>
+              <ma14:wrappingTextBoxFlag xmlns:ma14="http://schemas.microsoft.com/office/mac/drawingml/2011/main" xmlns="" val="1"/>
             </a:ext>
           </a:extLst>
         </p:spPr>
@@ -4552,7 +4552,7 @@
           </a:ln>
           <a:extLst>
             <a:ext uri="{C572A759-6A51-4108-AA02-DFA0A04FC94B}">
-              <ma14:wrappingTextBoxFlag xmlns="" xmlns:ma14="http://schemas.microsoft.com/office/mac/drawingml/2011/main" val="1"/>
+              <ma14:wrappingTextBoxFlag xmlns:ma14="http://schemas.microsoft.com/office/mac/drawingml/2011/main" xmlns="" val="1"/>
             </a:ext>
           </a:extLst>
         </p:spPr>
@@ -4718,7 +4718,7 @@
           </a:ln>
           <a:extLst>
             <a:ext uri="{C572A759-6A51-4108-AA02-DFA0A04FC94B}">
-              <ma14:wrappingTextBoxFlag xmlns="" xmlns:ma14="http://schemas.microsoft.com/office/mac/drawingml/2011/main" val="1"/>
+              <ma14:wrappingTextBoxFlag xmlns:ma14="http://schemas.microsoft.com/office/mac/drawingml/2011/main" xmlns="" val="1"/>
             </a:ext>
           </a:extLst>
         </p:spPr>
@@ -4782,7 +4782,7 @@
           </a:ln>
           <a:extLst>
             <a:ext uri="{C572A759-6A51-4108-AA02-DFA0A04FC94B}">
-              <ma14:wrappingTextBoxFlag xmlns="" xmlns:ma14="http://schemas.microsoft.com/office/mac/drawingml/2011/main" val="1"/>
+              <ma14:wrappingTextBoxFlag xmlns:ma14="http://schemas.microsoft.com/office/mac/drawingml/2011/main" xmlns="" val="1"/>
             </a:ext>
           </a:extLst>
         </p:spPr>
@@ -5329,7 +5329,7 @@
           </a:ln>
           <a:extLst>
             <a:ext uri="{C572A759-6A51-4108-AA02-DFA0A04FC94B}">
-              <ma14:wrappingTextBoxFlag xmlns="" xmlns:ma14="http://schemas.microsoft.com/office/mac/drawingml/2011/main" val="1"/>
+              <ma14:wrappingTextBoxFlag xmlns:ma14="http://schemas.microsoft.com/office/mac/drawingml/2011/main" xmlns="" val="1"/>
             </a:ext>
           </a:extLst>
         </p:spPr>
@@ -5393,7 +5393,7 @@
           </a:ln>
           <a:extLst>
             <a:ext uri="{C572A759-6A51-4108-AA02-DFA0A04FC94B}">
-              <ma14:wrappingTextBoxFlag xmlns="" xmlns:ma14="http://schemas.microsoft.com/office/mac/drawingml/2011/main" val="1"/>
+              <ma14:wrappingTextBoxFlag xmlns:ma14="http://schemas.microsoft.com/office/mac/drawingml/2011/main" xmlns="" val="1"/>
             </a:ext>
           </a:extLst>
         </p:spPr>
@@ -5653,7 +5653,7 @@
           </a:ln>
           <a:extLst>
             <a:ext uri="{C572A759-6A51-4108-AA02-DFA0A04FC94B}">
-              <ma14:wrappingTextBoxFlag xmlns="" xmlns:ma14="http://schemas.microsoft.com/office/mac/drawingml/2011/main" val="1"/>
+              <ma14:wrappingTextBoxFlag xmlns:ma14="http://schemas.microsoft.com/office/mac/drawingml/2011/main" xmlns="" val="1"/>
             </a:ext>
           </a:extLst>
         </p:spPr>
@@ -5717,7 +5717,7 @@
           </a:ln>
           <a:extLst>
             <a:ext uri="{C572A759-6A51-4108-AA02-DFA0A04FC94B}">
-              <ma14:wrappingTextBoxFlag xmlns="" xmlns:ma14="http://schemas.microsoft.com/office/mac/drawingml/2011/main" val="1"/>
+              <ma14:wrappingTextBoxFlag xmlns:ma14="http://schemas.microsoft.com/office/mac/drawingml/2011/main" xmlns="" val="1"/>
             </a:ext>
           </a:extLst>
         </p:spPr>
@@ -5955,7 +5955,7 @@
           </a:ln>
           <a:extLst>
             <a:ext uri="{C572A759-6A51-4108-AA02-DFA0A04FC94B}">
-              <ma14:wrappingTextBoxFlag xmlns="" xmlns:ma14="http://schemas.microsoft.com/office/mac/drawingml/2011/main" val="1"/>
+              <ma14:wrappingTextBoxFlag xmlns:ma14="http://schemas.microsoft.com/office/mac/drawingml/2011/main" xmlns="" val="1"/>
             </a:ext>
           </a:extLst>
         </p:spPr>
@@ -6019,7 +6019,7 @@
           </a:ln>
           <a:extLst>
             <a:ext uri="{C572A759-6A51-4108-AA02-DFA0A04FC94B}">
-              <ma14:wrappingTextBoxFlag xmlns="" xmlns:ma14="http://schemas.microsoft.com/office/mac/drawingml/2011/main" val="1"/>
+              <ma14:wrappingTextBoxFlag xmlns:ma14="http://schemas.microsoft.com/office/mac/drawingml/2011/main" xmlns="" val="1"/>
             </a:ext>
           </a:extLst>
         </p:spPr>
@@ -6386,7 +6386,7 @@
           </a:ln>
           <a:extLst>
             <a:ext uri="{C572A759-6A51-4108-AA02-DFA0A04FC94B}">
-              <ma14:wrappingTextBoxFlag xmlns="" xmlns:ma14="http://schemas.microsoft.com/office/mac/drawingml/2011/main" val="1"/>
+              <ma14:wrappingTextBoxFlag xmlns:ma14="http://schemas.microsoft.com/office/mac/drawingml/2011/main" xmlns="" val="1"/>
             </a:ext>
           </a:extLst>
         </p:spPr>
@@ -6450,7 +6450,7 @@
           </a:ln>
           <a:extLst>
             <a:ext uri="{C572A759-6A51-4108-AA02-DFA0A04FC94B}">
-              <ma14:wrappingTextBoxFlag xmlns="" xmlns:ma14="http://schemas.microsoft.com/office/mac/drawingml/2011/main" val="1"/>
+              <ma14:wrappingTextBoxFlag xmlns:ma14="http://schemas.microsoft.com/office/mac/drawingml/2011/main" xmlns="" val="1"/>
             </a:ext>
           </a:extLst>
         </p:spPr>
@@ -6817,7 +6817,7 @@
           </a:ln>
           <a:extLst>
             <a:ext uri="{C572A759-6A51-4108-AA02-DFA0A04FC94B}">
-              <ma14:wrappingTextBoxFlag xmlns="" xmlns:ma14="http://schemas.microsoft.com/office/mac/drawingml/2011/main" val="1"/>
+              <ma14:wrappingTextBoxFlag xmlns:ma14="http://schemas.microsoft.com/office/mac/drawingml/2011/main" xmlns="" val="1"/>
             </a:ext>
           </a:extLst>
         </p:spPr>
@@ -6881,7 +6881,7 @@
           </a:ln>
           <a:extLst>
             <a:ext uri="{C572A759-6A51-4108-AA02-DFA0A04FC94B}">
-              <ma14:wrappingTextBoxFlag xmlns="" xmlns:ma14="http://schemas.microsoft.com/office/mac/drawingml/2011/main" val="1"/>
+              <ma14:wrappingTextBoxFlag xmlns:ma14="http://schemas.microsoft.com/office/mac/drawingml/2011/main" xmlns="" val="1"/>
             </a:ext>
           </a:extLst>
         </p:spPr>
@@ -7236,7 +7236,7 @@
           </a:ln>
           <a:extLst>
             <a:ext uri="{C572A759-6A51-4108-AA02-DFA0A04FC94B}">
-              <ma14:wrappingTextBoxFlag xmlns="" xmlns:ma14="http://schemas.microsoft.com/office/mac/drawingml/2011/main" val="1"/>
+              <ma14:wrappingTextBoxFlag xmlns:ma14="http://schemas.microsoft.com/office/mac/drawingml/2011/main" xmlns="" val="1"/>
             </a:ext>
           </a:extLst>
         </p:spPr>
@@ -7300,7 +7300,7 @@
           </a:ln>
           <a:extLst>
             <a:ext uri="{C572A759-6A51-4108-AA02-DFA0A04FC94B}">
-              <ma14:wrappingTextBoxFlag xmlns="" xmlns:ma14="http://schemas.microsoft.com/office/mac/drawingml/2011/main" val="1"/>
+              <ma14:wrappingTextBoxFlag xmlns:ma14="http://schemas.microsoft.com/office/mac/drawingml/2011/main" xmlns="" val="1"/>
             </a:ext>
           </a:extLst>
         </p:spPr>
@@ -7579,7 +7579,7 @@
           </a:ln>
           <a:extLst>
             <a:ext uri="{C572A759-6A51-4108-AA02-DFA0A04FC94B}">
-              <ma14:wrappingTextBoxFlag xmlns="" xmlns:ma14="http://schemas.microsoft.com/office/mac/drawingml/2011/main" val="1"/>
+              <ma14:wrappingTextBoxFlag xmlns:ma14="http://schemas.microsoft.com/office/mac/drawingml/2011/main" xmlns="" val="1"/>
             </a:ext>
           </a:extLst>
         </p:spPr>
@@ -7643,7 +7643,7 @@
           </a:ln>
           <a:extLst>
             <a:ext uri="{C572A759-6A51-4108-AA02-DFA0A04FC94B}">
-              <ma14:wrappingTextBoxFlag xmlns="" xmlns:ma14="http://schemas.microsoft.com/office/mac/drawingml/2011/main" val="1"/>
+              <ma14:wrappingTextBoxFlag xmlns:ma14="http://schemas.microsoft.com/office/mac/drawingml/2011/main" xmlns="" val="1"/>
             </a:ext>
           </a:extLst>
         </p:spPr>
@@ -7891,7 +7891,7 @@
           </a:ln>
           <a:extLst>
             <a:ext uri="{C572A759-6A51-4108-AA02-DFA0A04FC94B}">
-              <ma14:wrappingTextBoxFlag xmlns="" xmlns:ma14="http://schemas.microsoft.com/office/mac/drawingml/2011/main" val="1"/>
+              <ma14:wrappingTextBoxFlag xmlns:ma14="http://schemas.microsoft.com/office/mac/drawingml/2011/main" xmlns="" val="1"/>
             </a:ext>
           </a:extLst>
         </p:spPr>
@@ -7955,7 +7955,7 @@
           </a:ln>
           <a:extLst>
             <a:ext uri="{C572A759-6A51-4108-AA02-DFA0A04FC94B}">
-              <ma14:wrappingTextBoxFlag xmlns="" xmlns:ma14="http://schemas.microsoft.com/office/mac/drawingml/2011/main" val="1"/>
+              <ma14:wrappingTextBoxFlag xmlns:ma14="http://schemas.microsoft.com/office/mac/drawingml/2011/main" xmlns="" val="1"/>
             </a:ext>
           </a:extLst>
         </p:spPr>
@@ -8121,7 +8121,7 @@
           </a:ln>
           <a:extLst>
             <a:ext uri="{C572A759-6A51-4108-AA02-DFA0A04FC94B}">
-              <ma14:wrappingTextBoxFlag xmlns="" xmlns:ma14="http://schemas.microsoft.com/office/mac/drawingml/2011/main" val="1"/>
+              <ma14:wrappingTextBoxFlag xmlns:ma14="http://schemas.microsoft.com/office/mac/drawingml/2011/main" xmlns="" val="1"/>
             </a:ext>
           </a:extLst>
         </p:spPr>
@@ -8185,7 +8185,7 @@
           </a:ln>
           <a:extLst>
             <a:ext uri="{C572A759-6A51-4108-AA02-DFA0A04FC94B}">
-              <ma14:wrappingTextBoxFlag xmlns="" xmlns:ma14="http://schemas.microsoft.com/office/mac/drawingml/2011/main" val="1"/>
+              <ma14:wrappingTextBoxFlag xmlns:ma14="http://schemas.microsoft.com/office/mac/drawingml/2011/main" xmlns="" val="1"/>
             </a:ext>
           </a:extLst>
         </p:spPr>
@@ -8433,7 +8433,7 @@
           </a:ln>
           <a:extLst>
             <a:ext uri="{C572A759-6A51-4108-AA02-DFA0A04FC94B}">
-              <ma14:wrappingTextBoxFlag xmlns="" xmlns:ma14="http://schemas.microsoft.com/office/mac/drawingml/2011/main" val="1"/>
+              <ma14:wrappingTextBoxFlag xmlns:ma14="http://schemas.microsoft.com/office/mac/drawingml/2011/main" xmlns="" val="1"/>
             </a:ext>
           </a:extLst>
         </p:spPr>
@@ -8497,7 +8497,7 @@
           </a:ln>
           <a:extLst>
             <a:ext uri="{C572A759-6A51-4108-AA02-DFA0A04FC94B}">
-              <ma14:wrappingTextBoxFlag xmlns="" xmlns:ma14="http://schemas.microsoft.com/office/mac/drawingml/2011/main" val="1"/>
+              <ma14:wrappingTextBoxFlag xmlns:ma14="http://schemas.microsoft.com/office/mac/drawingml/2011/main" xmlns="" val="1"/>
             </a:ext>
           </a:extLst>
         </p:spPr>
@@ -8745,7 +8745,7 @@
           </a:ln>
           <a:extLst>
             <a:ext uri="{C572A759-6A51-4108-AA02-DFA0A04FC94B}">
-              <ma14:wrappingTextBoxFlag xmlns="" xmlns:ma14="http://schemas.microsoft.com/office/mac/drawingml/2011/main" val="1"/>
+              <ma14:wrappingTextBoxFlag xmlns:ma14="http://schemas.microsoft.com/office/mac/drawingml/2011/main" xmlns="" val="1"/>
             </a:ext>
           </a:extLst>
         </p:spPr>
@@ -8809,7 +8809,7 @@
           </a:ln>
           <a:extLst>
             <a:ext uri="{C572A759-6A51-4108-AA02-DFA0A04FC94B}">
-              <ma14:wrappingTextBoxFlag xmlns="" xmlns:ma14="http://schemas.microsoft.com/office/mac/drawingml/2011/main" val="1"/>
+              <ma14:wrappingTextBoxFlag xmlns:ma14="http://schemas.microsoft.com/office/mac/drawingml/2011/main" xmlns="" val="1"/>
             </a:ext>
           </a:extLst>
         </p:spPr>
@@ -9057,7 +9057,7 @@
           </a:ln>
           <a:extLst>
             <a:ext uri="{C572A759-6A51-4108-AA02-DFA0A04FC94B}">
-              <ma14:wrappingTextBoxFlag xmlns="" xmlns:ma14="http://schemas.microsoft.com/office/mac/drawingml/2011/main" val="1"/>
+              <ma14:wrappingTextBoxFlag xmlns:ma14="http://schemas.microsoft.com/office/mac/drawingml/2011/main" xmlns="" val="1"/>
             </a:ext>
           </a:extLst>
         </p:spPr>
@@ -9121,7 +9121,7 @@
           </a:ln>
           <a:extLst>
             <a:ext uri="{C572A759-6A51-4108-AA02-DFA0A04FC94B}">
-              <ma14:wrappingTextBoxFlag xmlns="" xmlns:ma14="http://schemas.microsoft.com/office/mac/drawingml/2011/main" val="1"/>
+              <ma14:wrappingTextBoxFlag xmlns:ma14="http://schemas.microsoft.com/office/mac/drawingml/2011/main" xmlns="" val="1"/>
             </a:ext>
           </a:extLst>
         </p:spPr>
@@ -9268,35 +9268,6 @@
           <a:chExt cx="0" cy="0"/>
         </a:xfrm>
       </p:grpSpPr>
-      <p:pic>
-        <p:nvPicPr>
-          <p:cNvPr id="3" name="Immagine 2"/>
-          <p:cNvPicPr>
-            <a:picLocks noChangeAspect="1"/>
-          </p:cNvPicPr>
-          <p:nvPr/>
-        </p:nvPicPr>
-        <p:blipFill rotWithShape="1">
-          <a:blip r:embed="rId2">
-            <a:extLst>
-              <a:ext uri="{28A0092B-C50C-407E-A947-70E740481C1C}">
-                <a14:useLocalDpi xmlns:a14="http://schemas.microsoft.com/office/drawing/2010/main" val="0"/>
-              </a:ext>
-            </a:extLst>
-          </a:blip>
-          <a:srcRect b="4657"/>
-          <a:stretch/>
-        </p:blipFill>
-        <p:spPr>
-          <a:xfrm>
-            <a:off x="2832844" y="2638140"/>
-            <a:ext cx="3218329" cy="3754334"/>
-          </a:xfrm>
-          <a:prstGeom prst="rect">
-            <a:avLst/>
-          </a:prstGeom>
-        </p:spPr>
-      </p:pic>
       <p:sp>
         <p:nvSpPr>
           <p:cNvPr id="154" name="Shape 154"/>
@@ -9316,7 +9287,7 @@
           </a:ln>
           <a:extLst>
             <a:ext uri="{C572A759-6A51-4108-AA02-DFA0A04FC94B}">
-              <ma14:wrappingTextBoxFlag xmlns="" xmlns:ma14="http://schemas.microsoft.com/office/mac/drawingml/2011/main" val="1"/>
+              <ma14:wrappingTextBoxFlag xmlns:ma14="http://schemas.microsoft.com/office/mac/drawingml/2011/main" xmlns="" val="1"/>
             </a:ext>
           </a:extLst>
         </p:spPr>
@@ -9380,7 +9351,7 @@
           </a:ln>
           <a:extLst>
             <a:ext uri="{C572A759-6A51-4108-AA02-DFA0A04FC94B}">
-              <ma14:wrappingTextBoxFlag xmlns="" xmlns:ma14="http://schemas.microsoft.com/office/mac/drawingml/2011/main" val="1"/>
+              <ma14:wrappingTextBoxFlag xmlns:ma14="http://schemas.microsoft.com/office/mac/drawingml/2011/main" xmlns="" val="1"/>
             </a:ext>
           </a:extLst>
         </p:spPr>
@@ -9478,326 +9449,36 @@
           </a:p>
         </p:txBody>
       </p:sp>
-      <p:sp>
-        <p:nvSpPr>
-          <p:cNvPr id="6" name="CasellaDiTesto 5"/>
-          <p:cNvSpPr txBox="1"/>
-          <p:nvPr/>
-        </p:nvSpPr>
-        <p:spPr>
-          <a:xfrm>
-            <a:off x="1098167" y="1510555"/>
-            <a:ext cx="2895600" cy="707886"/>
-          </a:xfrm>
-          <a:prstGeom prst="rect">
-            <a:avLst/>
-          </a:prstGeom>
-          <a:noFill/>
-        </p:spPr>
-        <p:txBody>
-          <a:bodyPr wrap="square" rtlCol="0">
-            <a:spAutoFit/>
-          </a:bodyPr>
-          <a:lstStyle/>
-          <a:p>
-            <a:r>
-              <a:rPr lang="it-IT" sz="2000" dirty="0" smtClean="0"/>
-              <a:t>DEPTH [m]</a:t>
-            </a:r>
-          </a:p>
-          <a:p>
-            <a:endParaRPr lang="it-IT" sz="2000" dirty="0"/>
-          </a:p>
-        </p:txBody>
-      </p:sp>
-      <p:sp>
-        <p:nvSpPr>
-          <p:cNvPr id="7" name="CasellaDiTesto 6"/>
-          <p:cNvSpPr txBox="1"/>
-          <p:nvPr/>
-        </p:nvSpPr>
-        <p:spPr>
-          <a:xfrm>
-            <a:off x="5997386" y="1489549"/>
-            <a:ext cx="2895602" cy="707886"/>
-          </a:xfrm>
-          <a:prstGeom prst="rect">
-            <a:avLst/>
-          </a:prstGeom>
-          <a:noFill/>
-        </p:spPr>
-        <p:txBody>
-          <a:bodyPr wrap="square" rtlCol="0">
-            <a:spAutoFit/>
-          </a:bodyPr>
-          <a:lstStyle/>
-          <a:p>
-            <a:r>
-              <a:rPr lang="it-IT" sz="2000" dirty="0" smtClean="0"/>
-              <a:t>WATER PRESSURE [m]</a:t>
-            </a:r>
-          </a:p>
-          <a:p>
-            <a:endParaRPr lang="it-IT" sz="2000" dirty="0"/>
-          </a:p>
-        </p:txBody>
-      </p:sp>
-      <p:sp>
-        <p:nvSpPr>
-          <p:cNvPr id="8" name="Rettangolo 7"/>
-          <p:cNvSpPr/>
-          <p:nvPr/>
-        </p:nvSpPr>
-        <p:spPr>
-          <a:xfrm>
-            <a:off x="4419600" y="2545981"/>
-            <a:ext cx="2209800" cy="3846493"/>
-          </a:xfrm>
-          <a:prstGeom prst="rect">
-            <a:avLst/>
-          </a:prstGeom>
-          <a:noFill/>
-          <a:ln w="50800">
-            <a:solidFill>
-              <a:srgbClr val="00B050"/>
-            </a:solidFill>
-          </a:ln>
-        </p:spPr>
-        <p:style>
-          <a:lnRef idx="2">
-            <a:schemeClr val="accent1">
-              <a:shade val="50000"/>
-            </a:schemeClr>
-          </a:lnRef>
-          <a:fillRef idx="1">
-            <a:schemeClr val="accent1"/>
-          </a:fillRef>
-          <a:effectRef idx="0">
-            <a:schemeClr val="accent1"/>
-          </a:effectRef>
-          <a:fontRef idx="minor">
-            <a:schemeClr val="lt1"/>
-          </a:fontRef>
-        </p:style>
-        <p:txBody>
-          <a:bodyPr rtlCol="0" anchor="ctr"/>
-          <a:lstStyle/>
-          <a:p>
-            <a:pPr algn="ctr"/>
-            <a:endParaRPr lang="it-IT" dirty="0"/>
-          </a:p>
-        </p:txBody>
-      </p:sp>
-      <p:sp>
-        <p:nvSpPr>
-          <p:cNvPr id="9" name="Rettangolo 8"/>
-          <p:cNvSpPr/>
-          <p:nvPr/>
-        </p:nvSpPr>
-        <p:spPr>
-          <a:xfrm>
-            <a:off x="5943600" y="1346116"/>
-            <a:ext cx="2519082" cy="620974"/>
-          </a:xfrm>
-          <a:prstGeom prst="rect">
-            <a:avLst/>
-          </a:prstGeom>
-          <a:noFill/>
-          <a:ln w="50800">
-            <a:solidFill>
-              <a:srgbClr val="00B050"/>
-            </a:solidFill>
-          </a:ln>
-        </p:spPr>
-        <p:style>
-          <a:lnRef idx="2">
-            <a:schemeClr val="accent1">
-              <a:shade val="50000"/>
-            </a:schemeClr>
-          </a:lnRef>
-          <a:fillRef idx="1">
-            <a:schemeClr val="accent1"/>
-          </a:fillRef>
-          <a:effectRef idx="0">
-            <a:schemeClr val="accent1"/>
-          </a:effectRef>
-          <a:fontRef idx="minor">
-            <a:schemeClr val="lt1"/>
-          </a:fontRef>
-        </p:style>
-        <p:txBody>
-          <a:bodyPr rtlCol="0" anchor="ctr"/>
-          <a:lstStyle/>
-          <a:p>
-            <a:pPr algn="ctr"/>
-            <a:endParaRPr lang="it-IT" dirty="0"/>
-          </a:p>
-        </p:txBody>
-      </p:sp>
-      <p:cxnSp>
-        <p:nvCxnSpPr>
-          <p:cNvPr id="10" name="Connettore 2 9"/>
-          <p:cNvCxnSpPr/>
-          <p:nvPr/>
-        </p:nvCxnSpPr>
-        <p:spPr>
-          <a:xfrm flipH="1">
-            <a:off x="5943600" y="1967090"/>
-            <a:ext cx="685800" cy="578891"/>
-          </a:xfrm>
-          <a:prstGeom prst="straightConnector1">
-            <a:avLst/>
-          </a:prstGeom>
-          <a:ln w="57150">
-            <a:solidFill>
-              <a:srgbClr val="00B050"/>
-            </a:solidFill>
-            <a:tailEnd type="arrow"/>
-          </a:ln>
-        </p:spPr>
-        <p:style>
-          <a:lnRef idx="1">
-            <a:schemeClr val="accent1"/>
-          </a:lnRef>
-          <a:fillRef idx="0">
-            <a:schemeClr val="accent1"/>
-          </a:fillRef>
-          <a:effectRef idx="0">
-            <a:schemeClr val="accent1"/>
-          </a:effectRef>
-          <a:fontRef idx="minor">
-            <a:schemeClr val="tx1"/>
-          </a:fontRef>
-        </p:style>
-      </p:cxnSp>
-      <p:sp>
-        <p:nvSpPr>
-          <p:cNvPr id="11" name="Rettangolo 10"/>
-          <p:cNvSpPr/>
-          <p:nvPr/>
-        </p:nvSpPr>
-        <p:spPr>
-          <a:xfrm>
-            <a:off x="2057400" y="2559530"/>
-            <a:ext cx="2209800" cy="3846493"/>
-          </a:xfrm>
-          <a:prstGeom prst="rect">
-            <a:avLst/>
-          </a:prstGeom>
-          <a:noFill/>
-          <a:ln w="50800">
-            <a:solidFill>
-              <a:srgbClr val="FF0000"/>
-            </a:solidFill>
-          </a:ln>
-        </p:spPr>
-        <p:style>
-          <a:lnRef idx="2">
-            <a:schemeClr val="accent1">
-              <a:shade val="50000"/>
-            </a:schemeClr>
-          </a:lnRef>
-          <a:fillRef idx="1">
-            <a:schemeClr val="accent1"/>
-          </a:fillRef>
-          <a:effectRef idx="0">
-            <a:schemeClr val="accent1"/>
-          </a:effectRef>
-          <a:fontRef idx="minor">
-            <a:schemeClr val="lt1"/>
-          </a:fontRef>
-        </p:style>
-        <p:txBody>
-          <a:bodyPr rtlCol="0" anchor="ctr"/>
-          <a:lstStyle/>
-          <a:p>
-            <a:pPr algn="ctr"/>
-            <a:endParaRPr lang="it-IT" dirty="0"/>
-          </a:p>
-        </p:txBody>
-      </p:sp>
-      <p:sp>
-        <p:nvSpPr>
-          <p:cNvPr id="12" name="Rettangolo 11"/>
-          <p:cNvSpPr/>
-          <p:nvPr/>
-        </p:nvSpPr>
-        <p:spPr>
-          <a:xfrm>
-            <a:off x="685800" y="1371039"/>
-            <a:ext cx="2743200" cy="620974"/>
-          </a:xfrm>
-          <a:prstGeom prst="rect">
-            <a:avLst/>
-          </a:prstGeom>
-          <a:noFill/>
-          <a:ln w="50800">
-            <a:solidFill>
-              <a:srgbClr val="FF0000"/>
-            </a:solidFill>
-          </a:ln>
-        </p:spPr>
-        <p:style>
-          <a:lnRef idx="2">
-            <a:schemeClr val="accent1">
-              <a:shade val="50000"/>
-            </a:schemeClr>
-          </a:lnRef>
-          <a:fillRef idx="1">
-            <a:schemeClr val="accent1"/>
-          </a:fillRef>
-          <a:effectRef idx="0">
-            <a:schemeClr val="accent1"/>
-          </a:effectRef>
-          <a:fontRef idx="minor">
-            <a:schemeClr val="lt1"/>
-          </a:fontRef>
-        </p:style>
-        <p:txBody>
-          <a:bodyPr rtlCol="0" anchor="ctr"/>
-          <a:lstStyle/>
-          <a:p>
-            <a:pPr algn="ctr"/>
-            <a:endParaRPr lang="it-IT" dirty="0"/>
-          </a:p>
-        </p:txBody>
-      </p:sp>
-      <p:cxnSp>
-        <p:nvCxnSpPr>
-          <p:cNvPr id="13" name="Connettore 2 12"/>
-          <p:cNvCxnSpPr/>
-          <p:nvPr/>
-        </p:nvCxnSpPr>
-        <p:spPr>
-          <a:xfrm>
-            <a:off x="1905000" y="1980639"/>
-            <a:ext cx="1066800" cy="539184"/>
-          </a:xfrm>
-          <a:prstGeom prst="straightConnector1">
-            <a:avLst/>
-          </a:prstGeom>
-          <a:ln w="57150">
-            <a:solidFill>
-              <a:srgbClr val="FF0000"/>
-            </a:solidFill>
-            <a:tailEnd type="arrow"/>
-          </a:ln>
-        </p:spPr>
-        <p:style>
-          <a:lnRef idx="1">
-            <a:schemeClr val="accent1"/>
-          </a:lnRef>
-          <a:fillRef idx="0">
-            <a:schemeClr val="accent1"/>
-          </a:fillRef>
-          <a:effectRef idx="0">
-            <a:schemeClr val="accent1"/>
-          </a:effectRef>
-          <a:fontRef idx="minor">
-            <a:schemeClr val="tx1"/>
-          </a:fontRef>
-        </p:style>
-      </p:cxnSp>
+      <p:pic>
+        <p:nvPicPr>
+          <p:cNvPr id="4" name="Immagine 3"/>
+          <p:cNvPicPr>
+            <a:picLocks noChangeAspect="1"/>
+          </p:cNvPicPr>
+          <p:nvPr/>
+        </p:nvPicPr>
+        <p:blipFill>
+          <a:blip r:embed="rId2">
+            <a:extLst>
+              <a:ext uri="{28A0092B-C50C-407E-A947-70E740481C1C}">
+                <a14:useLocalDpi xmlns:a14="http://schemas.microsoft.com/office/drawing/2010/main" val="0"/>
+              </a:ext>
+            </a:extLst>
+          </a:blip>
+          <a:stretch>
+            <a:fillRect/>
+          </a:stretch>
+        </p:blipFill>
+        <p:spPr>
+          <a:xfrm>
+            <a:off x="3101787" y="1535869"/>
+            <a:ext cx="2940423" cy="4615575"/>
+          </a:xfrm>
+          <a:prstGeom prst="rect">
+            <a:avLst/>
+          </a:prstGeom>
+        </p:spPr>
+      </p:pic>
     </p:spTree>
     <p:extLst>
       <p:ext uri="{BB962C8B-B14F-4D97-AF65-F5344CB8AC3E}">
@@ -9855,7 +9536,7 @@
           </a:ln>
           <a:extLst>
             <a:ext uri="{C572A759-6A51-4108-AA02-DFA0A04FC94B}">
-              <ma14:wrappingTextBoxFlag xmlns="" xmlns:ma14="http://schemas.microsoft.com/office/mac/drawingml/2011/main" val="1"/>
+              <ma14:wrappingTextBoxFlag xmlns:ma14="http://schemas.microsoft.com/office/mac/drawingml/2011/main" xmlns="" val="1"/>
             </a:ext>
           </a:extLst>
         </p:spPr>
@@ -9919,7 +9600,7 @@
           </a:ln>
           <a:extLst>
             <a:ext uri="{C572A759-6A51-4108-AA02-DFA0A04FC94B}">
-              <ma14:wrappingTextBoxFlag xmlns="" xmlns:ma14="http://schemas.microsoft.com/office/mac/drawingml/2011/main" val="1"/>
+              <ma14:wrappingTextBoxFlag xmlns:ma14="http://schemas.microsoft.com/office/mac/drawingml/2011/main" xmlns="" val="1"/>
             </a:ext>
           </a:extLst>
         </p:spPr>
@@ -10189,7 +9870,7 @@
           </a:ln>
           <a:extLst>
             <a:ext uri="{C572A759-6A51-4108-AA02-DFA0A04FC94B}">
-              <ma14:wrappingTextBoxFlag xmlns="" xmlns:ma14="http://schemas.microsoft.com/office/mac/drawingml/2011/main" val="1"/>
+              <ma14:wrappingTextBoxFlag xmlns:ma14="http://schemas.microsoft.com/office/mac/drawingml/2011/main" xmlns="" val="1"/>
             </a:ext>
           </a:extLst>
         </p:spPr>
@@ -10253,7 +9934,7 @@
           </a:ln>
           <a:extLst>
             <a:ext uri="{C572A759-6A51-4108-AA02-DFA0A04FC94B}">
-              <ma14:wrappingTextBoxFlag xmlns="" xmlns:ma14="http://schemas.microsoft.com/office/mac/drawingml/2011/main" val="1"/>
+              <ma14:wrappingTextBoxFlag xmlns:ma14="http://schemas.microsoft.com/office/mac/drawingml/2011/main" xmlns="" val="1"/>
             </a:ext>
           </a:extLst>
         </p:spPr>
@@ -10596,7 +10277,7 @@
           </a:ln>
           <a:extLst>
             <a:ext uri="{C572A759-6A51-4108-AA02-DFA0A04FC94B}">
-              <ma14:wrappingTextBoxFlag xmlns="" xmlns:ma14="http://schemas.microsoft.com/office/mac/drawingml/2011/main" val="1"/>
+              <ma14:wrappingTextBoxFlag xmlns:ma14="http://schemas.microsoft.com/office/mac/drawingml/2011/main" xmlns="" val="1"/>
             </a:ext>
           </a:extLst>
         </p:spPr>
@@ -10660,7 +10341,7 @@
           </a:ln>
           <a:extLst>
             <a:ext uri="{C572A759-6A51-4108-AA02-DFA0A04FC94B}">
-              <ma14:wrappingTextBoxFlag xmlns="" xmlns:ma14="http://schemas.microsoft.com/office/mac/drawingml/2011/main" val="1"/>
+              <ma14:wrappingTextBoxFlag xmlns:ma14="http://schemas.microsoft.com/office/mac/drawingml/2011/main" xmlns="" val="1"/>
             </a:ext>
           </a:extLst>
         </p:spPr>
@@ -11002,7 +10683,7 @@
           </a:ln>
           <a:extLst>
             <a:ext uri="{C572A759-6A51-4108-AA02-DFA0A04FC94B}">
-              <ma14:wrappingTextBoxFlag xmlns="" xmlns:ma14="http://schemas.microsoft.com/office/mac/drawingml/2011/main" val="1"/>
+              <ma14:wrappingTextBoxFlag xmlns:ma14="http://schemas.microsoft.com/office/mac/drawingml/2011/main" xmlns="" val="1"/>
             </a:ext>
           </a:extLst>
         </p:spPr>
@@ -11066,7 +10747,7 @@
           </a:ln>
           <a:extLst>
             <a:ext uri="{C572A759-6A51-4108-AA02-DFA0A04FC94B}">
-              <ma14:wrappingTextBoxFlag xmlns="" xmlns:ma14="http://schemas.microsoft.com/office/mac/drawingml/2011/main" val="1"/>
+              <ma14:wrappingTextBoxFlag xmlns:ma14="http://schemas.microsoft.com/office/mac/drawingml/2011/main" xmlns="" val="1"/>
             </a:ext>
           </a:extLst>
         </p:spPr>
@@ -11737,7 +11418,7 @@
           </a:ln>
           <a:extLst>
             <a:ext uri="{C572A759-6A51-4108-AA02-DFA0A04FC94B}">
-              <ma14:wrappingTextBoxFlag xmlns="" xmlns:ma14="http://schemas.microsoft.com/office/mac/drawingml/2011/main" val="1"/>
+              <ma14:wrappingTextBoxFlag xmlns:ma14="http://schemas.microsoft.com/office/mac/drawingml/2011/main" xmlns="" val="1"/>
             </a:ext>
           </a:extLst>
         </p:spPr>
@@ -11801,7 +11482,7 @@
           </a:ln>
           <a:extLst>
             <a:ext uri="{C572A759-6A51-4108-AA02-DFA0A04FC94B}">
-              <ma14:wrappingTextBoxFlag xmlns="" xmlns:ma14="http://schemas.microsoft.com/office/mac/drawingml/2011/main" val="1"/>
+              <ma14:wrappingTextBoxFlag xmlns:ma14="http://schemas.microsoft.com/office/mac/drawingml/2011/main" xmlns="" val="1"/>
             </a:ext>
           </a:extLst>
         </p:spPr>
@@ -12416,7 +12097,7 @@
           </a:ln>
           <a:extLst>
             <a:ext uri="{C572A759-6A51-4108-AA02-DFA0A04FC94B}">
-              <ma14:wrappingTextBoxFlag xmlns="" xmlns:ma14="http://schemas.microsoft.com/office/mac/drawingml/2011/main" val="1"/>
+              <ma14:wrappingTextBoxFlag xmlns:ma14="http://schemas.microsoft.com/office/mac/drawingml/2011/main" xmlns="" val="1"/>
             </a:ext>
           </a:extLst>
         </p:spPr>
@@ -12480,7 +12161,7 @@
           </a:ln>
           <a:extLst>
             <a:ext uri="{C572A759-6A51-4108-AA02-DFA0A04FC94B}">
-              <ma14:wrappingTextBoxFlag xmlns="" xmlns:ma14="http://schemas.microsoft.com/office/mac/drawingml/2011/main" val="1"/>
+              <ma14:wrappingTextBoxFlag xmlns:ma14="http://schemas.microsoft.com/office/mac/drawingml/2011/main" xmlns="" val="1"/>
             </a:ext>
           </a:extLst>
         </p:spPr>
@@ -12928,7 +12609,7 @@
           </a:prstGeom>
           <a:extLst>
             <a:ext uri="{C572A759-6A51-4108-AA02-DFA0A04FC94B}">
-              <ma14:wrappingTextBoxFlag xmlns="" xmlns:ma14="http://schemas.microsoft.com/office/mac/drawingml/2011/main" val="1"/>
+              <ma14:wrappingTextBoxFlag xmlns:ma14="http://schemas.microsoft.com/office/mac/drawingml/2011/main" xmlns="" val="1"/>
             </a:ext>
           </a:extLst>
         </p:spPr>
@@ -12962,7 +12643,7 @@
           </a:ln>
           <a:extLst>
             <a:ext uri="{C572A759-6A51-4108-AA02-DFA0A04FC94B}">
-              <ma14:wrappingTextBoxFlag xmlns="" xmlns:ma14="http://schemas.microsoft.com/office/mac/drawingml/2011/main" val="1"/>
+              <ma14:wrappingTextBoxFlag xmlns:ma14="http://schemas.microsoft.com/office/mac/drawingml/2011/main" xmlns="" val="1"/>
             </a:ext>
           </a:extLst>
         </p:spPr>
@@ -13028,7 +12709,7 @@
           </a:ln>
           <a:extLst>
             <a:ext uri="{C572A759-6A51-4108-AA02-DFA0A04FC94B}">
-              <ma14:wrappingTextBoxFlag xmlns="" xmlns:ma14="http://schemas.microsoft.com/office/mac/drawingml/2011/main" val="1"/>
+              <ma14:wrappingTextBoxFlag xmlns:ma14="http://schemas.microsoft.com/office/mac/drawingml/2011/main" xmlns="" val="1"/>
             </a:ext>
           </a:extLst>
         </p:spPr>
@@ -13087,7 +12768,7 @@
           </a:ln>
           <a:extLst>
             <a:ext uri="{C572A759-6A51-4108-AA02-DFA0A04FC94B}">
-              <ma14:wrappingTextBoxFlag xmlns="" xmlns:ma14="http://schemas.microsoft.com/office/mac/drawingml/2011/main" val="1"/>
+              <ma14:wrappingTextBoxFlag xmlns:ma14="http://schemas.microsoft.com/office/mac/drawingml/2011/main" xmlns="" val="1"/>
             </a:ext>
           </a:extLst>
         </p:spPr>
@@ -13192,7 +12873,7 @@
           </a:ln>
           <a:extLst>
             <a:ext uri="{C572A759-6A51-4108-AA02-DFA0A04FC94B}">
-              <ma14:wrappingTextBoxFlag xmlns="" xmlns:ma14="http://schemas.microsoft.com/office/mac/drawingml/2011/main" val="1"/>
+              <ma14:wrappingTextBoxFlag xmlns:ma14="http://schemas.microsoft.com/office/mac/drawingml/2011/main" xmlns="" val="1"/>
             </a:ext>
           </a:extLst>
         </p:spPr>
@@ -13256,7 +12937,7 @@
           </a:ln>
           <a:extLst>
             <a:ext uri="{C572A759-6A51-4108-AA02-DFA0A04FC94B}">
-              <ma14:wrappingTextBoxFlag xmlns="" xmlns:ma14="http://schemas.microsoft.com/office/mac/drawingml/2011/main" val="1"/>
+              <ma14:wrappingTextBoxFlag xmlns:ma14="http://schemas.microsoft.com/office/mac/drawingml/2011/main" xmlns="" val="1"/>
             </a:ext>
           </a:extLst>
         </p:spPr>
@@ -13440,7 +13121,7 @@
           </a:ln>
           <a:extLst>
             <a:ext uri="{C572A759-6A51-4108-AA02-DFA0A04FC94B}">
-              <ma14:wrappingTextBoxFlag xmlns="" xmlns:ma14="http://schemas.microsoft.com/office/mac/drawingml/2011/main" val="1"/>
+              <ma14:wrappingTextBoxFlag xmlns:ma14="http://schemas.microsoft.com/office/mac/drawingml/2011/main" xmlns="" val="1"/>
             </a:ext>
           </a:extLst>
         </p:spPr>
@@ -13504,7 +13185,7 @@
           </a:ln>
           <a:extLst>
             <a:ext uri="{C572A759-6A51-4108-AA02-DFA0A04FC94B}">
-              <ma14:wrappingTextBoxFlag xmlns="" xmlns:ma14="http://schemas.microsoft.com/office/mac/drawingml/2011/main" val="1"/>
+              <ma14:wrappingTextBoxFlag xmlns:ma14="http://schemas.microsoft.com/office/mac/drawingml/2011/main" xmlns="" val="1"/>
             </a:ext>
           </a:extLst>
         </p:spPr>
@@ -13681,7 +13362,7 @@
           </a:ln>
           <a:extLst>
             <a:ext uri="{C572A759-6A51-4108-AA02-DFA0A04FC94B}">
-              <ma14:wrappingTextBoxFlag xmlns="" xmlns:ma14="http://schemas.microsoft.com/office/mac/drawingml/2011/main" val="1"/>
+              <ma14:wrappingTextBoxFlag xmlns:ma14="http://schemas.microsoft.com/office/mac/drawingml/2011/main" xmlns="" val="1"/>
             </a:ext>
           </a:extLst>
         </p:spPr>
@@ -13745,7 +13426,7 @@
           </a:ln>
           <a:extLst>
             <a:ext uri="{C572A759-6A51-4108-AA02-DFA0A04FC94B}">
-              <ma14:wrappingTextBoxFlag xmlns="" xmlns:ma14="http://schemas.microsoft.com/office/mac/drawingml/2011/main" val="1"/>
+              <ma14:wrappingTextBoxFlag xmlns:ma14="http://schemas.microsoft.com/office/mac/drawingml/2011/main" xmlns="" val="1"/>
             </a:ext>
           </a:extLst>
         </p:spPr>
@@ -13922,7 +13603,7 @@
           </a:ln>
           <a:extLst>
             <a:ext uri="{C572A759-6A51-4108-AA02-DFA0A04FC94B}">
-              <ma14:wrappingTextBoxFlag xmlns="" xmlns:ma14="http://schemas.microsoft.com/office/mac/drawingml/2011/main" val="1"/>
+              <ma14:wrappingTextBoxFlag xmlns:ma14="http://schemas.microsoft.com/office/mac/drawingml/2011/main" xmlns="" val="1"/>
             </a:ext>
           </a:extLst>
         </p:spPr>
@@ -13986,7 +13667,7 @@
           </a:ln>
           <a:extLst>
             <a:ext uri="{C572A759-6A51-4108-AA02-DFA0A04FC94B}">
-              <ma14:wrappingTextBoxFlag xmlns="" xmlns:ma14="http://schemas.microsoft.com/office/mac/drawingml/2011/main" val="1"/>
+              <ma14:wrappingTextBoxFlag xmlns:ma14="http://schemas.microsoft.com/office/mac/drawingml/2011/main" xmlns="" val="1"/>
             </a:ext>
           </a:extLst>
         </p:spPr>
@@ -14285,7 +13966,7 @@
           </a:ln>
           <a:extLst>
             <a:ext uri="{C572A759-6A51-4108-AA02-DFA0A04FC94B}">
-              <ma14:wrappingTextBoxFlag xmlns="" xmlns:ma14="http://schemas.microsoft.com/office/mac/drawingml/2011/main" val="1"/>
+              <ma14:wrappingTextBoxFlag xmlns:ma14="http://schemas.microsoft.com/office/mac/drawingml/2011/main" xmlns="" val="1"/>
             </a:ext>
           </a:extLst>
         </p:spPr>
@@ -14349,7 +14030,7 @@
           </a:ln>
           <a:extLst>
             <a:ext uri="{C572A759-6A51-4108-AA02-DFA0A04FC94B}">
-              <ma14:wrappingTextBoxFlag xmlns="" xmlns:ma14="http://schemas.microsoft.com/office/mac/drawingml/2011/main" val="1"/>
+              <ma14:wrappingTextBoxFlag xmlns:ma14="http://schemas.microsoft.com/office/mac/drawingml/2011/main" xmlns="" val="1"/>
             </a:ext>
           </a:extLst>
         </p:spPr>
@@ -14624,7 +14305,7 @@
           </a:ln>
           <a:extLst>
             <a:ext uri="{C572A759-6A51-4108-AA02-DFA0A04FC94B}">
-              <ma14:wrappingTextBoxFlag xmlns="" xmlns:ma14="http://schemas.microsoft.com/office/mac/drawingml/2011/main" val="1"/>
+              <ma14:wrappingTextBoxFlag xmlns:ma14="http://schemas.microsoft.com/office/mac/drawingml/2011/main" xmlns="" val="1"/>
             </a:ext>
           </a:extLst>
         </p:spPr>
@@ -14688,7 +14369,7 @@
           </a:ln>
           <a:extLst>
             <a:ext uri="{C572A759-6A51-4108-AA02-DFA0A04FC94B}">
-              <ma14:wrappingTextBoxFlag xmlns="" xmlns:ma14="http://schemas.microsoft.com/office/mac/drawingml/2011/main" val="1"/>
+              <ma14:wrappingTextBoxFlag xmlns:ma14="http://schemas.microsoft.com/office/mac/drawingml/2011/main" xmlns="" val="1"/>
             </a:ext>
           </a:extLst>
         </p:spPr>

</xml_diff>

<commit_message>
The presentation is now aligned with the recent modifications concerning output printing.
</commit_message>
<xml_diff>
--- a/Materials/Richards_English.pptx
+++ b/Materials/Richards_English.pptx
@@ -221,7 +221,7 @@
           <a:p>
             <a:fld id="{4D0C6883-54F1-064A-A731-D2789FFABA37}" type="datetimeFigureOut">
               <a:rPr lang="it-IT" smtClean="0"/>
-              <a:t>08/11/2017</a:t>
+              <a:t>13/11/2017</a:t>
             </a:fld>
             <a:endParaRPr lang="en-GB"/>
           </a:p>
@@ -670,7 +670,7 @@
           <a:p>
             <a:fld id="{D3F618D5-3DB9-B146-87ED-A3BCB7C64B91}" type="datetimeFigureOut">
               <a:rPr lang="it-IT" smtClean="0"/>
-              <a:t>08/11/2017</a:t>
+              <a:t>13/11/2017</a:t>
             </a:fld>
             <a:endParaRPr lang="en-GB"/>
           </a:p>
@@ -840,7 +840,7 @@
           <a:p>
             <a:fld id="{D3F618D5-3DB9-B146-87ED-A3BCB7C64B91}" type="datetimeFigureOut">
               <a:rPr lang="it-IT" smtClean="0"/>
-              <a:t>08/11/2017</a:t>
+              <a:t>13/11/2017</a:t>
             </a:fld>
             <a:endParaRPr lang="en-GB"/>
           </a:p>
@@ -1020,7 +1020,7 @@
           <a:p>
             <a:fld id="{D3F618D5-3DB9-B146-87ED-A3BCB7C64B91}" type="datetimeFigureOut">
               <a:rPr lang="it-IT" smtClean="0"/>
-              <a:t>08/11/2017</a:t>
+              <a:t>13/11/2017</a:t>
             </a:fld>
             <a:endParaRPr lang="en-GB"/>
           </a:p>
@@ -1226,7 +1226,7 @@
           </a:ln>
           <a:extLst>
             <a:ext uri="{C572A759-6A51-4108-AA02-DFA0A04FC94B}">
-              <ma14:wrappingTextBoxFlag xmlns:ma14="http://schemas.microsoft.com/office/mac/drawingml/2011/main" xmlns="" val="1"/>
+              <ma14:wrappingTextBoxFlag xmlns="" xmlns:ma14="http://schemas.microsoft.com/office/mac/drawingml/2011/main" val="1"/>
             </a:ext>
           </a:extLst>
         </p:spPr>
@@ -1443,7 +1443,7 @@
           <a:p>
             <a:fld id="{D3F618D5-3DB9-B146-87ED-A3BCB7C64B91}" type="datetimeFigureOut">
               <a:rPr lang="it-IT" smtClean="0"/>
-              <a:t>08/11/2017</a:t>
+              <a:t>13/11/2017</a:t>
             </a:fld>
             <a:endParaRPr lang="en-GB"/>
           </a:p>
@@ -1689,7 +1689,7 @@
           <a:p>
             <a:fld id="{D3F618D5-3DB9-B146-87ED-A3BCB7C64B91}" type="datetimeFigureOut">
               <a:rPr lang="it-IT" smtClean="0"/>
-              <a:t>08/11/2017</a:t>
+              <a:t>13/11/2017</a:t>
             </a:fld>
             <a:endParaRPr lang="en-GB"/>
           </a:p>
@@ -1977,7 +1977,7 @@
           <a:p>
             <a:fld id="{D3F618D5-3DB9-B146-87ED-A3BCB7C64B91}" type="datetimeFigureOut">
               <a:rPr lang="it-IT" smtClean="0"/>
-              <a:t>08/11/2017</a:t>
+              <a:t>13/11/2017</a:t>
             </a:fld>
             <a:endParaRPr lang="en-GB"/>
           </a:p>
@@ -2399,7 +2399,7 @@
           <a:p>
             <a:fld id="{D3F618D5-3DB9-B146-87ED-A3BCB7C64B91}" type="datetimeFigureOut">
               <a:rPr lang="it-IT" smtClean="0"/>
-              <a:t>08/11/2017</a:t>
+              <a:t>13/11/2017</a:t>
             </a:fld>
             <a:endParaRPr lang="en-GB"/>
           </a:p>
@@ -2517,7 +2517,7 @@
           <a:p>
             <a:fld id="{D3F618D5-3DB9-B146-87ED-A3BCB7C64B91}" type="datetimeFigureOut">
               <a:rPr lang="it-IT" smtClean="0"/>
-              <a:t>08/11/2017</a:t>
+              <a:t>13/11/2017</a:t>
             </a:fld>
             <a:endParaRPr lang="en-GB"/>
           </a:p>
@@ -2612,7 +2612,7 @@
           <a:p>
             <a:fld id="{D3F618D5-3DB9-B146-87ED-A3BCB7C64B91}" type="datetimeFigureOut">
               <a:rPr lang="it-IT" smtClean="0"/>
-              <a:t>08/11/2017</a:t>
+              <a:t>13/11/2017</a:t>
             </a:fld>
             <a:endParaRPr lang="en-GB"/>
           </a:p>
@@ -2889,7 +2889,7 @@
           <a:p>
             <a:fld id="{D3F618D5-3DB9-B146-87ED-A3BCB7C64B91}" type="datetimeFigureOut">
               <a:rPr lang="it-IT" smtClean="0"/>
-              <a:t>08/11/2017</a:t>
+              <a:t>13/11/2017</a:t>
             </a:fld>
             <a:endParaRPr lang="en-GB"/>
           </a:p>
@@ -3142,7 +3142,7 @@
           <a:p>
             <a:fld id="{D3F618D5-3DB9-B146-87ED-A3BCB7C64B91}" type="datetimeFigureOut">
               <a:rPr lang="it-IT" smtClean="0"/>
-              <a:t>08/11/2017</a:t>
+              <a:t>13/11/2017</a:t>
             </a:fld>
             <a:endParaRPr lang="en-GB"/>
           </a:p>
@@ -3355,7 +3355,7 @@
           <a:p>
             <a:fld id="{D3F618D5-3DB9-B146-87ED-A3BCB7C64B91}" type="datetimeFigureOut">
               <a:rPr lang="it-IT" smtClean="0"/>
-              <a:t>08/11/2017</a:t>
+              <a:t>13/11/2017</a:t>
             </a:fld>
             <a:endParaRPr lang="en-GB"/>
           </a:p>
@@ -3750,7 +3750,7 @@
           </a:ln>
           <a:extLst>
             <a:ext uri="{C572A759-6A51-4108-AA02-DFA0A04FC94B}">
-              <ma14:wrappingTextBoxFlag xmlns:ma14="http://schemas.microsoft.com/office/mac/drawingml/2011/main" xmlns="" val="1"/>
+              <ma14:wrappingTextBoxFlag xmlns="" xmlns:ma14="http://schemas.microsoft.com/office/mac/drawingml/2011/main" val="1"/>
             </a:ext>
           </a:extLst>
         </p:spPr>
@@ -3850,7 +3850,7 @@
           </a:ln>
           <a:extLst>
             <a:ext uri="{C572A759-6A51-4108-AA02-DFA0A04FC94B}">
-              <ma14:wrappingTextBoxFlag xmlns:ma14="http://schemas.microsoft.com/office/mac/drawingml/2011/main" xmlns="" val="1"/>
+              <ma14:wrappingTextBoxFlag xmlns="" xmlns:ma14="http://schemas.microsoft.com/office/mac/drawingml/2011/main" val="1"/>
             </a:ext>
           </a:extLst>
         </p:spPr>
@@ -4027,7 +4027,7 @@
           </a:ln>
           <a:extLst>
             <a:ext uri="{C572A759-6A51-4108-AA02-DFA0A04FC94B}">
-              <ma14:wrappingTextBoxFlag xmlns:ma14="http://schemas.microsoft.com/office/mac/drawingml/2011/main" xmlns="" val="1"/>
+              <ma14:wrappingTextBoxFlag xmlns="" xmlns:ma14="http://schemas.microsoft.com/office/mac/drawingml/2011/main" val="1"/>
             </a:ext>
           </a:extLst>
         </p:spPr>
@@ -4091,7 +4091,7 @@
           </a:ln>
           <a:extLst>
             <a:ext uri="{C572A759-6A51-4108-AA02-DFA0A04FC94B}">
-              <ma14:wrappingTextBoxFlag xmlns:ma14="http://schemas.microsoft.com/office/mac/drawingml/2011/main" xmlns="" val="1"/>
+              <ma14:wrappingTextBoxFlag xmlns="" xmlns:ma14="http://schemas.microsoft.com/office/mac/drawingml/2011/main" val="1"/>
             </a:ext>
           </a:extLst>
         </p:spPr>
@@ -4488,7 +4488,7 @@
           </a:ln>
           <a:extLst>
             <a:ext uri="{C572A759-6A51-4108-AA02-DFA0A04FC94B}">
-              <ma14:wrappingTextBoxFlag xmlns:ma14="http://schemas.microsoft.com/office/mac/drawingml/2011/main" xmlns="" val="1"/>
+              <ma14:wrappingTextBoxFlag xmlns="" xmlns:ma14="http://schemas.microsoft.com/office/mac/drawingml/2011/main" val="1"/>
             </a:ext>
           </a:extLst>
         </p:spPr>
@@ -4552,7 +4552,7 @@
           </a:ln>
           <a:extLst>
             <a:ext uri="{C572A759-6A51-4108-AA02-DFA0A04FC94B}">
-              <ma14:wrappingTextBoxFlag xmlns:ma14="http://schemas.microsoft.com/office/mac/drawingml/2011/main" xmlns="" val="1"/>
+              <ma14:wrappingTextBoxFlag xmlns="" xmlns:ma14="http://schemas.microsoft.com/office/mac/drawingml/2011/main" val="1"/>
             </a:ext>
           </a:extLst>
         </p:spPr>
@@ -4718,7 +4718,7 @@
           </a:ln>
           <a:extLst>
             <a:ext uri="{C572A759-6A51-4108-AA02-DFA0A04FC94B}">
-              <ma14:wrappingTextBoxFlag xmlns:ma14="http://schemas.microsoft.com/office/mac/drawingml/2011/main" xmlns="" val="1"/>
+              <ma14:wrappingTextBoxFlag xmlns="" xmlns:ma14="http://schemas.microsoft.com/office/mac/drawingml/2011/main" val="1"/>
             </a:ext>
           </a:extLst>
         </p:spPr>
@@ -4782,7 +4782,7 @@
           </a:ln>
           <a:extLst>
             <a:ext uri="{C572A759-6A51-4108-AA02-DFA0A04FC94B}">
-              <ma14:wrappingTextBoxFlag xmlns:ma14="http://schemas.microsoft.com/office/mac/drawingml/2011/main" xmlns="" val="1"/>
+              <ma14:wrappingTextBoxFlag xmlns="" xmlns:ma14="http://schemas.microsoft.com/office/mac/drawingml/2011/main" val="1"/>
             </a:ext>
           </a:extLst>
         </p:spPr>
@@ -5329,7 +5329,7 @@
           </a:ln>
           <a:extLst>
             <a:ext uri="{C572A759-6A51-4108-AA02-DFA0A04FC94B}">
-              <ma14:wrappingTextBoxFlag xmlns:ma14="http://schemas.microsoft.com/office/mac/drawingml/2011/main" xmlns="" val="1"/>
+              <ma14:wrappingTextBoxFlag xmlns="" xmlns:ma14="http://schemas.microsoft.com/office/mac/drawingml/2011/main" val="1"/>
             </a:ext>
           </a:extLst>
         </p:spPr>
@@ -5393,7 +5393,7 @@
           </a:ln>
           <a:extLst>
             <a:ext uri="{C572A759-6A51-4108-AA02-DFA0A04FC94B}">
-              <ma14:wrappingTextBoxFlag xmlns:ma14="http://schemas.microsoft.com/office/mac/drawingml/2011/main" xmlns="" val="1"/>
+              <ma14:wrappingTextBoxFlag xmlns="" xmlns:ma14="http://schemas.microsoft.com/office/mac/drawingml/2011/main" val="1"/>
             </a:ext>
           </a:extLst>
         </p:spPr>
@@ -5653,7 +5653,7 @@
           </a:ln>
           <a:extLst>
             <a:ext uri="{C572A759-6A51-4108-AA02-DFA0A04FC94B}">
-              <ma14:wrappingTextBoxFlag xmlns:ma14="http://schemas.microsoft.com/office/mac/drawingml/2011/main" xmlns="" val="1"/>
+              <ma14:wrappingTextBoxFlag xmlns="" xmlns:ma14="http://schemas.microsoft.com/office/mac/drawingml/2011/main" val="1"/>
             </a:ext>
           </a:extLst>
         </p:spPr>
@@ -5717,7 +5717,7 @@
           </a:ln>
           <a:extLst>
             <a:ext uri="{C572A759-6A51-4108-AA02-DFA0A04FC94B}">
-              <ma14:wrappingTextBoxFlag xmlns:ma14="http://schemas.microsoft.com/office/mac/drawingml/2011/main" xmlns="" val="1"/>
+              <ma14:wrappingTextBoxFlag xmlns="" xmlns:ma14="http://schemas.microsoft.com/office/mac/drawingml/2011/main" val="1"/>
             </a:ext>
           </a:extLst>
         </p:spPr>
@@ -5955,7 +5955,7 @@
           </a:ln>
           <a:extLst>
             <a:ext uri="{C572A759-6A51-4108-AA02-DFA0A04FC94B}">
-              <ma14:wrappingTextBoxFlag xmlns:ma14="http://schemas.microsoft.com/office/mac/drawingml/2011/main" xmlns="" val="1"/>
+              <ma14:wrappingTextBoxFlag xmlns="" xmlns:ma14="http://schemas.microsoft.com/office/mac/drawingml/2011/main" val="1"/>
             </a:ext>
           </a:extLst>
         </p:spPr>
@@ -6019,7 +6019,7 @@
           </a:ln>
           <a:extLst>
             <a:ext uri="{C572A759-6A51-4108-AA02-DFA0A04FC94B}">
-              <ma14:wrappingTextBoxFlag xmlns:ma14="http://schemas.microsoft.com/office/mac/drawingml/2011/main" xmlns="" val="1"/>
+              <ma14:wrappingTextBoxFlag xmlns="" xmlns:ma14="http://schemas.microsoft.com/office/mac/drawingml/2011/main" val="1"/>
             </a:ext>
           </a:extLst>
         </p:spPr>
@@ -6386,7 +6386,7 @@
           </a:ln>
           <a:extLst>
             <a:ext uri="{C572A759-6A51-4108-AA02-DFA0A04FC94B}">
-              <ma14:wrappingTextBoxFlag xmlns:ma14="http://schemas.microsoft.com/office/mac/drawingml/2011/main" xmlns="" val="1"/>
+              <ma14:wrappingTextBoxFlag xmlns="" xmlns:ma14="http://schemas.microsoft.com/office/mac/drawingml/2011/main" val="1"/>
             </a:ext>
           </a:extLst>
         </p:spPr>
@@ -6450,7 +6450,7 @@
           </a:ln>
           <a:extLst>
             <a:ext uri="{C572A759-6A51-4108-AA02-DFA0A04FC94B}">
-              <ma14:wrappingTextBoxFlag xmlns:ma14="http://schemas.microsoft.com/office/mac/drawingml/2011/main" xmlns="" val="1"/>
+              <ma14:wrappingTextBoxFlag xmlns="" xmlns:ma14="http://schemas.microsoft.com/office/mac/drawingml/2011/main" val="1"/>
             </a:ext>
           </a:extLst>
         </p:spPr>
@@ -6817,7 +6817,7 @@
           </a:ln>
           <a:extLst>
             <a:ext uri="{C572A759-6A51-4108-AA02-DFA0A04FC94B}">
-              <ma14:wrappingTextBoxFlag xmlns:ma14="http://schemas.microsoft.com/office/mac/drawingml/2011/main" xmlns="" val="1"/>
+              <ma14:wrappingTextBoxFlag xmlns="" xmlns:ma14="http://schemas.microsoft.com/office/mac/drawingml/2011/main" val="1"/>
             </a:ext>
           </a:extLst>
         </p:spPr>
@@ -6881,7 +6881,7 @@
           </a:ln>
           <a:extLst>
             <a:ext uri="{C572A759-6A51-4108-AA02-DFA0A04FC94B}">
-              <ma14:wrappingTextBoxFlag xmlns:ma14="http://schemas.microsoft.com/office/mac/drawingml/2011/main" xmlns="" val="1"/>
+              <ma14:wrappingTextBoxFlag xmlns="" xmlns:ma14="http://schemas.microsoft.com/office/mac/drawingml/2011/main" val="1"/>
             </a:ext>
           </a:extLst>
         </p:spPr>
@@ -7236,7 +7236,7 @@
           </a:ln>
           <a:extLst>
             <a:ext uri="{C572A759-6A51-4108-AA02-DFA0A04FC94B}">
-              <ma14:wrappingTextBoxFlag xmlns:ma14="http://schemas.microsoft.com/office/mac/drawingml/2011/main" xmlns="" val="1"/>
+              <ma14:wrappingTextBoxFlag xmlns="" xmlns:ma14="http://schemas.microsoft.com/office/mac/drawingml/2011/main" val="1"/>
             </a:ext>
           </a:extLst>
         </p:spPr>
@@ -7300,7 +7300,7 @@
           </a:ln>
           <a:extLst>
             <a:ext uri="{C572A759-6A51-4108-AA02-DFA0A04FC94B}">
-              <ma14:wrappingTextBoxFlag xmlns:ma14="http://schemas.microsoft.com/office/mac/drawingml/2011/main" xmlns="" val="1"/>
+              <ma14:wrappingTextBoxFlag xmlns="" xmlns:ma14="http://schemas.microsoft.com/office/mac/drawingml/2011/main" val="1"/>
             </a:ext>
           </a:extLst>
         </p:spPr>
@@ -7579,7 +7579,7 @@
           </a:ln>
           <a:extLst>
             <a:ext uri="{C572A759-6A51-4108-AA02-DFA0A04FC94B}">
-              <ma14:wrappingTextBoxFlag xmlns:ma14="http://schemas.microsoft.com/office/mac/drawingml/2011/main" xmlns="" val="1"/>
+              <ma14:wrappingTextBoxFlag xmlns="" xmlns:ma14="http://schemas.microsoft.com/office/mac/drawingml/2011/main" val="1"/>
             </a:ext>
           </a:extLst>
         </p:spPr>
@@ -7643,7 +7643,7 @@
           </a:ln>
           <a:extLst>
             <a:ext uri="{C572A759-6A51-4108-AA02-DFA0A04FC94B}">
-              <ma14:wrappingTextBoxFlag xmlns:ma14="http://schemas.microsoft.com/office/mac/drawingml/2011/main" xmlns="" val="1"/>
+              <ma14:wrappingTextBoxFlag xmlns="" xmlns:ma14="http://schemas.microsoft.com/office/mac/drawingml/2011/main" val="1"/>
             </a:ext>
           </a:extLst>
         </p:spPr>
@@ -7891,7 +7891,7 @@
           </a:ln>
           <a:extLst>
             <a:ext uri="{C572A759-6A51-4108-AA02-DFA0A04FC94B}">
-              <ma14:wrappingTextBoxFlag xmlns:ma14="http://schemas.microsoft.com/office/mac/drawingml/2011/main" xmlns="" val="1"/>
+              <ma14:wrappingTextBoxFlag xmlns="" xmlns:ma14="http://schemas.microsoft.com/office/mac/drawingml/2011/main" val="1"/>
             </a:ext>
           </a:extLst>
         </p:spPr>
@@ -7955,7 +7955,7 @@
           </a:ln>
           <a:extLst>
             <a:ext uri="{C572A759-6A51-4108-AA02-DFA0A04FC94B}">
-              <ma14:wrappingTextBoxFlag xmlns:ma14="http://schemas.microsoft.com/office/mac/drawingml/2011/main" xmlns="" val="1"/>
+              <ma14:wrappingTextBoxFlag xmlns="" xmlns:ma14="http://schemas.microsoft.com/office/mac/drawingml/2011/main" val="1"/>
             </a:ext>
           </a:extLst>
         </p:spPr>
@@ -8121,7 +8121,7 @@
           </a:ln>
           <a:extLst>
             <a:ext uri="{C572A759-6A51-4108-AA02-DFA0A04FC94B}">
-              <ma14:wrappingTextBoxFlag xmlns:ma14="http://schemas.microsoft.com/office/mac/drawingml/2011/main" xmlns="" val="1"/>
+              <ma14:wrappingTextBoxFlag xmlns="" xmlns:ma14="http://schemas.microsoft.com/office/mac/drawingml/2011/main" val="1"/>
             </a:ext>
           </a:extLst>
         </p:spPr>
@@ -8185,7 +8185,7 @@
           </a:ln>
           <a:extLst>
             <a:ext uri="{C572A759-6A51-4108-AA02-DFA0A04FC94B}">
-              <ma14:wrappingTextBoxFlag xmlns:ma14="http://schemas.microsoft.com/office/mac/drawingml/2011/main" xmlns="" val="1"/>
+              <ma14:wrappingTextBoxFlag xmlns="" xmlns:ma14="http://schemas.microsoft.com/office/mac/drawingml/2011/main" val="1"/>
             </a:ext>
           </a:extLst>
         </p:spPr>
@@ -8433,7 +8433,7 @@
           </a:ln>
           <a:extLst>
             <a:ext uri="{C572A759-6A51-4108-AA02-DFA0A04FC94B}">
-              <ma14:wrappingTextBoxFlag xmlns:ma14="http://schemas.microsoft.com/office/mac/drawingml/2011/main" xmlns="" val="1"/>
+              <ma14:wrappingTextBoxFlag xmlns="" xmlns:ma14="http://schemas.microsoft.com/office/mac/drawingml/2011/main" val="1"/>
             </a:ext>
           </a:extLst>
         </p:spPr>
@@ -8497,7 +8497,7 @@
           </a:ln>
           <a:extLst>
             <a:ext uri="{C572A759-6A51-4108-AA02-DFA0A04FC94B}">
-              <ma14:wrappingTextBoxFlag xmlns:ma14="http://schemas.microsoft.com/office/mac/drawingml/2011/main" xmlns="" val="1"/>
+              <ma14:wrappingTextBoxFlag xmlns="" xmlns:ma14="http://schemas.microsoft.com/office/mac/drawingml/2011/main" val="1"/>
             </a:ext>
           </a:extLst>
         </p:spPr>
@@ -8745,7 +8745,7 @@
           </a:ln>
           <a:extLst>
             <a:ext uri="{C572A759-6A51-4108-AA02-DFA0A04FC94B}">
-              <ma14:wrappingTextBoxFlag xmlns:ma14="http://schemas.microsoft.com/office/mac/drawingml/2011/main" xmlns="" val="1"/>
+              <ma14:wrappingTextBoxFlag xmlns="" xmlns:ma14="http://schemas.microsoft.com/office/mac/drawingml/2011/main" val="1"/>
             </a:ext>
           </a:extLst>
         </p:spPr>
@@ -8809,7 +8809,7 @@
           </a:ln>
           <a:extLst>
             <a:ext uri="{C572A759-6A51-4108-AA02-DFA0A04FC94B}">
-              <ma14:wrappingTextBoxFlag xmlns:ma14="http://schemas.microsoft.com/office/mac/drawingml/2011/main" xmlns="" val="1"/>
+              <ma14:wrappingTextBoxFlag xmlns="" xmlns:ma14="http://schemas.microsoft.com/office/mac/drawingml/2011/main" val="1"/>
             </a:ext>
           </a:extLst>
         </p:spPr>
@@ -9057,7 +9057,7 @@
           </a:ln>
           <a:extLst>
             <a:ext uri="{C572A759-6A51-4108-AA02-DFA0A04FC94B}">
-              <ma14:wrappingTextBoxFlag xmlns:ma14="http://schemas.microsoft.com/office/mac/drawingml/2011/main" xmlns="" val="1"/>
+              <ma14:wrappingTextBoxFlag xmlns="" xmlns:ma14="http://schemas.microsoft.com/office/mac/drawingml/2011/main" val="1"/>
             </a:ext>
           </a:extLst>
         </p:spPr>
@@ -9121,7 +9121,7 @@
           </a:ln>
           <a:extLst>
             <a:ext uri="{C572A759-6A51-4108-AA02-DFA0A04FC94B}">
-              <ma14:wrappingTextBoxFlag xmlns:ma14="http://schemas.microsoft.com/office/mac/drawingml/2011/main" xmlns="" val="1"/>
+              <ma14:wrappingTextBoxFlag xmlns="" xmlns:ma14="http://schemas.microsoft.com/office/mac/drawingml/2011/main" val="1"/>
             </a:ext>
           </a:extLst>
         </p:spPr>
@@ -9287,7 +9287,7 @@
           </a:ln>
           <a:extLst>
             <a:ext uri="{C572A759-6A51-4108-AA02-DFA0A04FC94B}">
-              <ma14:wrappingTextBoxFlag xmlns:ma14="http://schemas.microsoft.com/office/mac/drawingml/2011/main" xmlns="" val="1"/>
+              <ma14:wrappingTextBoxFlag xmlns="" xmlns:ma14="http://schemas.microsoft.com/office/mac/drawingml/2011/main" val="1"/>
             </a:ext>
           </a:extLst>
         </p:spPr>
@@ -9351,7 +9351,7 @@
           </a:ln>
           <a:extLst>
             <a:ext uri="{C572A759-6A51-4108-AA02-DFA0A04FC94B}">
-              <ma14:wrappingTextBoxFlag xmlns:ma14="http://schemas.microsoft.com/office/mac/drawingml/2011/main" xmlns="" val="1"/>
+              <ma14:wrappingTextBoxFlag xmlns="" xmlns:ma14="http://schemas.microsoft.com/office/mac/drawingml/2011/main" val="1"/>
             </a:ext>
           </a:extLst>
         </p:spPr>
@@ -9536,7 +9536,7 @@
           </a:ln>
           <a:extLst>
             <a:ext uri="{C572A759-6A51-4108-AA02-DFA0A04FC94B}">
-              <ma14:wrappingTextBoxFlag xmlns:ma14="http://schemas.microsoft.com/office/mac/drawingml/2011/main" xmlns="" val="1"/>
+              <ma14:wrappingTextBoxFlag xmlns="" xmlns:ma14="http://schemas.microsoft.com/office/mac/drawingml/2011/main" val="1"/>
             </a:ext>
           </a:extLst>
         </p:spPr>
@@ -9600,7 +9600,7 @@
           </a:ln>
           <a:extLst>
             <a:ext uri="{C572A759-6A51-4108-AA02-DFA0A04FC94B}">
-              <ma14:wrappingTextBoxFlag xmlns:ma14="http://schemas.microsoft.com/office/mac/drawingml/2011/main" xmlns="" val="1"/>
+              <ma14:wrappingTextBoxFlag xmlns="" xmlns:ma14="http://schemas.microsoft.com/office/mac/drawingml/2011/main" val="1"/>
             </a:ext>
           </a:extLst>
         </p:spPr>
@@ -9870,7 +9870,7 @@
           </a:ln>
           <a:extLst>
             <a:ext uri="{C572A759-6A51-4108-AA02-DFA0A04FC94B}">
-              <ma14:wrappingTextBoxFlag xmlns:ma14="http://schemas.microsoft.com/office/mac/drawingml/2011/main" xmlns="" val="1"/>
+              <ma14:wrappingTextBoxFlag xmlns="" xmlns:ma14="http://schemas.microsoft.com/office/mac/drawingml/2011/main" val="1"/>
             </a:ext>
           </a:extLst>
         </p:spPr>
@@ -9934,7 +9934,7 @@
           </a:ln>
           <a:extLst>
             <a:ext uri="{C572A759-6A51-4108-AA02-DFA0A04FC94B}">
-              <ma14:wrappingTextBoxFlag xmlns:ma14="http://schemas.microsoft.com/office/mac/drawingml/2011/main" xmlns="" val="1"/>
+              <ma14:wrappingTextBoxFlag xmlns="" xmlns:ma14="http://schemas.microsoft.com/office/mac/drawingml/2011/main" val="1"/>
             </a:ext>
           </a:extLst>
         </p:spPr>
@@ -10277,7 +10277,7 @@
           </a:ln>
           <a:extLst>
             <a:ext uri="{C572A759-6A51-4108-AA02-DFA0A04FC94B}">
-              <ma14:wrappingTextBoxFlag xmlns:ma14="http://schemas.microsoft.com/office/mac/drawingml/2011/main" xmlns="" val="1"/>
+              <ma14:wrappingTextBoxFlag xmlns="" xmlns:ma14="http://schemas.microsoft.com/office/mac/drawingml/2011/main" val="1"/>
             </a:ext>
           </a:extLst>
         </p:spPr>
@@ -10341,7 +10341,7 @@
           </a:ln>
           <a:extLst>
             <a:ext uri="{C572A759-6A51-4108-AA02-DFA0A04FC94B}">
-              <ma14:wrappingTextBoxFlag xmlns:ma14="http://schemas.microsoft.com/office/mac/drawingml/2011/main" xmlns="" val="1"/>
+              <ma14:wrappingTextBoxFlag xmlns="" xmlns:ma14="http://schemas.microsoft.com/office/mac/drawingml/2011/main" val="1"/>
             </a:ext>
           </a:extLst>
         </p:spPr>
@@ -10664,6 +10664,36 @@
           <a:chExt cx="0" cy="0"/>
         </a:xfrm>
       </p:grpSpPr>
+      <p:pic>
+        <p:nvPicPr>
+          <p:cNvPr id="3" name="Immagine 2"/>
+          <p:cNvPicPr>
+            <a:picLocks noChangeAspect="1"/>
+          </p:cNvPicPr>
+          <p:nvPr/>
+        </p:nvPicPr>
+        <p:blipFill>
+          <a:blip r:embed="rId2">
+            <a:extLst>
+              <a:ext uri="{28A0092B-C50C-407E-A947-70E740481C1C}">
+                <a14:useLocalDpi xmlns:a14="http://schemas.microsoft.com/office/drawing/2010/main" val="0"/>
+              </a:ext>
+            </a:extLst>
+          </a:blip>
+          <a:stretch>
+            <a:fillRect/>
+          </a:stretch>
+        </p:blipFill>
+        <p:spPr>
+          <a:xfrm>
+            <a:off x="660820" y="3396165"/>
+            <a:ext cx="5130380" cy="2185831"/>
+          </a:xfrm>
+          <a:prstGeom prst="rect">
+            <a:avLst/>
+          </a:prstGeom>
+        </p:spPr>
+      </p:pic>
       <p:sp>
         <p:nvSpPr>
           <p:cNvPr id="154" name="Shape 154"/>
@@ -10683,7 +10713,7 @@
           </a:ln>
           <a:extLst>
             <a:ext uri="{C572A759-6A51-4108-AA02-DFA0A04FC94B}">
-              <ma14:wrappingTextBoxFlag xmlns:ma14="http://schemas.microsoft.com/office/mac/drawingml/2011/main" xmlns="" val="1"/>
+              <ma14:wrappingTextBoxFlag xmlns="" xmlns:ma14="http://schemas.microsoft.com/office/mac/drawingml/2011/main" val="1"/>
             </a:ext>
           </a:extLst>
         </p:spPr>
@@ -10747,7 +10777,7 @@
           </a:ln>
           <a:extLst>
             <a:ext uri="{C572A759-6A51-4108-AA02-DFA0A04FC94B}">
-              <ma14:wrappingTextBoxFlag xmlns:ma14="http://schemas.microsoft.com/office/mac/drawingml/2011/main" xmlns="" val="1"/>
+              <ma14:wrappingTextBoxFlag xmlns="" xmlns:ma14="http://schemas.microsoft.com/office/mac/drawingml/2011/main" val="1"/>
             </a:ext>
           </a:extLst>
         </p:spPr>
@@ -10826,36 +10856,6 @@
           </a:p>
         </p:txBody>
       </p:sp>
-      <p:pic>
-        <p:nvPicPr>
-          <p:cNvPr id="10" name="Segnaposto contenuto 3"/>
-          <p:cNvPicPr>
-            <a:picLocks noChangeAspect="1"/>
-          </p:cNvPicPr>
-          <p:nvPr/>
-        </p:nvPicPr>
-        <p:blipFill>
-          <a:blip r:embed="rId2">
-            <a:extLst>
-              <a:ext uri="{28A0092B-C50C-407E-A947-70E740481C1C}">
-                <a14:useLocalDpi xmlns:a14="http://schemas.microsoft.com/office/drawing/2010/main" val="0"/>
-              </a:ext>
-            </a:extLst>
-          </a:blip>
-          <a:stretch>
-            <a:fillRect/>
-          </a:stretch>
-        </p:blipFill>
-        <p:spPr>
-          <a:xfrm>
-            <a:off x="381000" y="3016626"/>
-            <a:ext cx="6646459" cy="2401177"/>
-          </a:xfrm>
-          <a:prstGeom prst="rect">
-            <a:avLst/>
-          </a:prstGeom>
-        </p:spPr>
-      </p:pic>
       <p:sp>
         <p:nvSpPr>
           <p:cNvPr id="11" name="CasellaDiTesto 10"/>
@@ -10864,7 +10864,7 @@
         </p:nvSpPr>
         <p:spPr>
           <a:xfrm>
-            <a:off x="4572000" y="1111626"/>
+            <a:off x="484188" y="1111626"/>
             <a:ext cx="4038600" cy="707886"/>
           </a:xfrm>
           <a:prstGeom prst="rect">
@@ -10895,7 +10895,7 @@
         </p:nvSpPr>
         <p:spPr>
           <a:xfrm>
-            <a:off x="3853981" y="2940426"/>
+            <a:off x="398069" y="3135729"/>
             <a:ext cx="3537419" cy="569893"/>
           </a:xfrm>
           <a:prstGeom prst="rect">
@@ -10941,7 +10941,7 @@
         </p:nvSpPr>
         <p:spPr>
           <a:xfrm>
-            <a:off x="4419600" y="1111626"/>
+            <a:off x="331788" y="1111626"/>
             <a:ext cx="4191000" cy="1219200"/>
           </a:xfrm>
           <a:prstGeom prst="rect">
@@ -10987,7 +10987,7 @@
         </p:nvCxnSpPr>
         <p:spPr>
           <a:xfrm>
-            <a:off x="5791200" y="2407026"/>
+            <a:off x="1703388" y="2407026"/>
             <a:ext cx="0" cy="609600"/>
           </a:xfrm>
           <a:prstGeom prst="straightConnector1">
@@ -11130,7 +11130,7 @@
         <p:spPr>
           <a:xfrm>
             <a:off x="1981200" y="3778626"/>
-            <a:ext cx="4419600" cy="1600200"/>
+            <a:ext cx="4419600" cy="1803370"/>
           </a:xfrm>
           <a:prstGeom prst="rect">
             <a:avLst/>
@@ -11257,8 +11257,8 @@
         </p:nvSpPr>
         <p:spPr>
           <a:xfrm>
-            <a:off x="304800" y="3778626"/>
-            <a:ext cx="1616497" cy="1567033"/>
+            <a:off x="376516" y="3778626"/>
+            <a:ext cx="1616497" cy="1803370"/>
           </a:xfrm>
           <a:prstGeom prst="rect">
             <a:avLst/>
@@ -11371,7 +11371,7 @@
       </p:grpSpPr>
       <p:pic>
         <p:nvPicPr>
-          <p:cNvPr id="3" name="Immagine 2"/>
+          <p:cNvPr id="4" name="Immagine 3"/>
           <p:cNvPicPr>
             <a:picLocks noChangeAspect="1"/>
           </p:cNvPicPr>
@@ -11391,8 +11391,8 @@
         </p:blipFill>
         <p:spPr>
           <a:xfrm>
-            <a:off x="428100" y="3042386"/>
-            <a:ext cx="7103371" cy="2303273"/>
+            <a:off x="468985" y="3140210"/>
+            <a:ext cx="4746844" cy="2216426"/>
           </a:xfrm>
           <a:prstGeom prst="rect">
             <a:avLst/>
@@ -11418,7 +11418,7 @@
           </a:ln>
           <a:extLst>
             <a:ext uri="{C572A759-6A51-4108-AA02-DFA0A04FC94B}">
-              <ma14:wrappingTextBoxFlag xmlns:ma14="http://schemas.microsoft.com/office/mac/drawingml/2011/main" xmlns="" val="1"/>
+              <ma14:wrappingTextBoxFlag xmlns="" xmlns:ma14="http://schemas.microsoft.com/office/mac/drawingml/2011/main" val="1"/>
             </a:ext>
           </a:extLst>
         </p:spPr>
@@ -11482,7 +11482,7 @@
           </a:ln>
           <a:extLst>
             <a:ext uri="{C572A759-6A51-4108-AA02-DFA0A04FC94B}">
-              <ma14:wrappingTextBoxFlag xmlns:ma14="http://schemas.microsoft.com/office/mac/drawingml/2011/main" xmlns="" val="1"/>
+              <ma14:wrappingTextBoxFlag xmlns="" xmlns:ma14="http://schemas.microsoft.com/office/mac/drawingml/2011/main" val="1"/>
             </a:ext>
           </a:extLst>
         </p:spPr>
@@ -11569,7 +11569,7 @@
         </p:nvSpPr>
         <p:spPr>
           <a:xfrm>
-            <a:off x="4572000" y="1111626"/>
+            <a:off x="1039987" y="1039910"/>
             <a:ext cx="4038600" cy="707886"/>
           </a:xfrm>
           <a:prstGeom prst="rect">
@@ -11600,7 +11600,7 @@
         </p:nvSpPr>
         <p:spPr>
           <a:xfrm>
-            <a:off x="3853981" y="2940426"/>
+            <a:off x="321968" y="2868710"/>
             <a:ext cx="3537419" cy="569893"/>
           </a:xfrm>
           <a:prstGeom prst="rect">
@@ -11646,7 +11646,7 @@
         </p:nvSpPr>
         <p:spPr>
           <a:xfrm>
-            <a:off x="4419600" y="1111626"/>
+            <a:off x="887587" y="1039910"/>
             <a:ext cx="4191000" cy="1219200"/>
           </a:xfrm>
           <a:prstGeom prst="rect">
@@ -11692,7 +11692,7 @@
         </p:nvCxnSpPr>
         <p:spPr>
           <a:xfrm>
-            <a:off x="5791200" y="2407026"/>
+            <a:off x="2259187" y="2335310"/>
             <a:ext cx="0" cy="609600"/>
           </a:xfrm>
           <a:prstGeom prst="straightConnector1">
@@ -11838,8 +11838,8 @@
         </p:nvSpPr>
         <p:spPr>
           <a:xfrm>
-            <a:off x="1981200" y="3778626"/>
-            <a:ext cx="4419600" cy="1600200"/>
+            <a:off x="1981200" y="3510319"/>
+            <a:ext cx="4419600" cy="1868507"/>
           </a:xfrm>
           <a:prstGeom prst="rect">
             <a:avLst/>
@@ -12002,8 +12002,8 @@
         </p:nvSpPr>
         <p:spPr>
           <a:xfrm>
-            <a:off x="304800" y="3778626"/>
-            <a:ext cx="1616497" cy="1567033"/>
+            <a:off x="304800" y="3510320"/>
+            <a:ext cx="1616497" cy="1835340"/>
           </a:xfrm>
           <a:prstGeom prst="rect">
             <a:avLst/>
@@ -12097,7 +12097,7 @@
           </a:ln>
           <a:extLst>
             <a:ext uri="{C572A759-6A51-4108-AA02-DFA0A04FC94B}">
-              <ma14:wrappingTextBoxFlag xmlns:ma14="http://schemas.microsoft.com/office/mac/drawingml/2011/main" xmlns="" val="1"/>
+              <ma14:wrappingTextBoxFlag xmlns="" xmlns:ma14="http://schemas.microsoft.com/office/mac/drawingml/2011/main" val="1"/>
             </a:ext>
           </a:extLst>
         </p:spPr>
@@ -12161,7 +12161,7 @@
           </a:ln>
           <a:extLst>
             <a:ext uri="{C572A759-6A51-4108-AA02-DFA0A04FC94B}">
-              <ma14:wrappingTextBoxFlag xmlns:ma14="http://schemas.microsoft.com/office/mac/drawingml/2011/main" xmlns="" val="1"/>
+              <ma14:wrappingTextBoxFlag xmlns="" xmlns:ma14="http://schemas.microsoft.com/office/mac/drawingml/2011/main" val="1"/>
             </a:ext>
           </a:extLst>
         </p:spPr>
@@ -12609,7 +12609,7 @@
           </a:prstGeom>
           <a:extLst>
             <a:ext uri="{C572A759-6A51-4108-AA02-DFA0A04FC94B}">
-              <ma14:wrappingTextBoxFlag xmlns:ma14="http://schemas.microsoft.com/office/mac/drawingml/2011/main" xmlns="" val="1"/>
+              <ma14:wrappingTextBoxFlag xmlns="" xmlns:ma14="http://schemas.microsoft.com/office/mac/drawingml/2011/main" val="1"/>
             </a:ext>
           </a:extLst>
         </p:spPr>
@@ -12643,7 +12643,7 @@
           </a:ln>
           <a:extLst>
             <a:ext uri="{C572A759-6A51-4108-AA02-DFA0A04FC94B}">
-              <ma14:wrappingTextBoxFlag xmlns:ma14="http://schemas.microsoft.com/office/mac/drawingml/2011/main" xmlns="" val="1"/>
+              <ma14:wrappingTextBoxFlag xmlns="" xmlns:ma14="http://schemas.microsoft.com/office/mac/drawingml/2011/main" val="1"/>
             </a:ext>
           </a:extLst>
         </p:spPr>
@@ -12709,7 +12709,7 @@
           </a:ln>
           <a:extLst>
             <a:ext uri="{C572A759-6A51-4108-AA02-DFA0A04FC94B}">
-              <ma14:wrappingTextBoxFlag xmlns:ma14="http://schemas.microsoft.com/office/mac/drawingml/2011/main" xmlns="" val="1"/>
+              <ma14:wrappingTextBoxFlag xmlns="" xmlns:ma14="http://schemas.microsoft.com/office/mac/drawingml/2011/main" val="1"/>
             </a:ext>
           </a:extLst>
         </p:spPr>
@@ -12768,7 +12768,7 @@
           </a:ln>
           <a:extLst>
             <a:ext uri="{C572A759-6A51-4108-AA02-DFA0A04FC94B}">
-              <ma14:wrappingTextBoxFlag xmlns:ma14="http://schemas.microsoft.com/office/mac/drawingml/2011/main" xmlns="" val="1"/>
+              <ma14:wrappingTextBoxFlag xmlns="" xmlns:ma14="http://schemas.microsoft.com/office/mac/drawingml/2011/main" val="1"/>
             </a:ext>
           </a:extLst>
         </p:spPr>
@@ -12873,7 +12873,7 @@
           </a:ln>
           <a:extLst>
             <a:ext uri="{C572A759-6A51-4108-AA02-DFA0A04FC94B}">
-              <ma14:wrappingTextBoxFlag xmlns:ma14="http://schemas.microsoft.com/office/mac/drawingml/2011/main" xmlns="" val="1"/>
+              <ma14:wrappingTextBoxFlag xmlns="" xmlns:ma14="http://schemas.microsoft.com/office/mac/drawingml/2011/main" val="1"/>
             </a:ext>
           </a:extLst>
         </p:spPr>
@@ -12937,7 +12937,7 @@
           </a:ln>
           <a:extLst>
             <a:ext uri="{C572A759-6A51-4108-AA02-DFA0A04FC94B}">
-              <ma14:wrappingTextBoxFlag xmlns:ma14="http://schemas.microsoft.com/office/mac/drawingml/2011/main" xmlns="" val="1"/>
+              <ma14:wrappingTextBoxFlag xmlns="" xmlns:ma14="http://schemas.microsoft.com/office/mac/drawingml/2011/main" val="1"/>
             </a:ext>
           </a:extLst>
         </p:spPr>
@@ -13121,7 +13121,7 @@
           </a:ln>
           <a:extLst>
             <a:ext uri="{C572A759-6A51-4108-AA02-DFA0A04FC94B}">
-              <ma14:wrappingTextBoxFlag xmlns:ma14="http://schemas.microsoft.com/office/mac/drawingml/2011/main" xmlns="" val="1"/>
+              <ma14:wrappingTextBoxFlag xmlns="" xmlns:ma14="http://schemas.microsoft.com/office/mac/drawingml/2011/main" val="1"/>
             </a:ext>
           </a:extLst>
         </p:spPr>
@@ -13185,7 +13185,7 @@
           </a:ln>
           <a:extLst>
             <a:ext uri="{C572A759-6A51-4108-AA02-DFA0A04FC94B}">
-              <ma14:wrappingTextBoxFlag xmlns:ma14="http://schemas.microsoft.com/office/mac/drawingml/2011/main" xmlns="" val="1"/>
+              <ma14:wrappingTextBoxFlag xmlns="" xmlns:ma14="http://schemas.microsoft.com/office/mac/drawingml/2011/main" val="1"/>
             </a:ext>
           </a:extLst>
         </p:spPr>
@@ -13362,7 +13362,7 @@
           </a:ln>
           <a:extLst>
             <a:ext uri="{C572A759-6A51-4108-AA02-DFA0A04FC94B}">
-              <ma14:wrappingTextBoxFlag xmlns:ma14="http://schemas.microsoft.com/office/mac/drawingml/2011/main" xmlns="" val="1"/>
+              <ma14:wrappingTextBoxFlag xmlns="" xmlns:ma14="http://schemas.microsoft.com/office/mac/drawingml/2011/main" val="1"/>
             </a:ext>
           </a:extLst>
         </p:spPr>
@@ -13426,7 +13426,7 @@
           </a:ln>
           <a:extLst>
             <a:ext uri="{C572A759-6A51-4108-AA02-DFA0A04FC94B}">
-              <ma14:wrappingTextBoxFlag xmlns:ma14="http://schemas.microsoft.com/office/mac/drawingml/2011/main" xmlns="" val="1"/>
+              <ma14:wrappingTextBoxFlag xmlns="" xmlns:ma14="http://schemas.microsoft.com/office/mac/drawingml/2011/main" val="1"/>
             </a:ext>
           </a:extLst>
         </p:spPr>
@@ -13603,7 +13603,7 @@
           </a:ln>
           <a:extLst>
             <a:ext uri="{C572A759-6A51-4108-AA02-DFA0A04FC94B}">
-              <ma14:wrappingTextBoxFlag xmlns:ma14="http://schemas.microsoft.com/office/mac/drawingml/2011/main" xmlns="" val="1"/>
+              <ma14:wrappingTextBoxFlag xmlns="" xmlns:ma14="http://schemas.microsoft.com/office/mac/drawingml/2011/main" val="1"/>
             </a:ext>
           </a:extLst>
         </p:spPr>
@@ -13667,7 +13667,7 @@
           </a:ln>
           <a:extLst>
             <a:ext uri="{C572A759-6A51-4108-AA02-DFA0A04FC94B}">
-              <ma14:wrappingTextBoxFlag xmlns:ma14="http://schemas.microsoft.com/office/mac/drawingml/2011/main" xmlns="" val="1"/>
+              <ma14:wrappingTextBoxFlag xmlns="" xmlns:ma14="http://schemas.microsoft.com/office/mac/drawingml/2011/main" val="1"/>
             </a:ext>
           </a:extLst>
         </p:spPr>
@@ -13966,7 +13966,7 @@
           </a:ln>
           <a:extLst>
             <a:ext uri="{C572A759-6A51-4108-AA02-DFA0A04FC94B}">
-              <ma14:wrappingTextBoxFlag xmlns:ma14="http://schemas.microsoft.com/office/mac/drawingml/2011/main" xmlns="" val="1"/>
+              <ma14:wrappingTextBoxFlag xmlns="" xmlns:ma14="http://schemas.microsoft.com/office/mac/drawingml/2011/main" val="1"/>
             </a:ext>
           </a:extLst>
         </p:spPr>
@@ -14030,7 +14030,7 @@
           </a:ln>
           <a:extLst>
             <a:ext uri="{C572A759-6A51-4108-AA02-DFA0A04FC94B}">
-              <ma14:wrappingTextBoxFlag xmlns:ma14="http://schemas.microsoft.com/office/mac/drawingml/2011/main" xmlns="" val="1"/>
+              <ma14:wrappingTextBoxFlag xmlns="" xmlns:ma14="http://schemas.microsoft.com/office/mac/drawingml/2011/main" val="1"/>
             </a:ext>
           </a:extLst>
         </p:spPr>
@@ -14305,7 +14305,7 @@
           </a:ln>
           <a:extLst>
             <a:ext uri="{C572A759-6A51-4108-AA02-DFA0A04FC94B}">
-              <ma14:wrappingTextBoxFlag xmlns:ma14="http://schemas.microsoft.com/office/mac/drawingml/2011/main" xmlns="" val="1"/>
+              <ma14:wrappingTextBoxFlag xmlns="" xmlns:ma14="http://schemas.microsoft.com/office/mac/drawingml/2011/main" val="1"/>
             </a:ext>
           </a:extLst>
         </p:spPr>
@@ -14369,7 +14369,7 @@
           </a:ln>
           <a:extLst>
             <a:ext uri="{C572A759-6A51-4108-AA02-DFA0A04FC94B}">
-              <ma14:wrappingTextBoxFlag xmlns:ma14="http://schemas.microsoft.com/office/mac/drawingml/2011/main" xmlns="" val="1"/>
+              <ma14:wrappingTextBoxFlag xmlns="" xmlns:ma14="http://schemas.microsoft.com/office/mac/drawingml/2011/main" val="1"/>
             </a:ext>
           </a:extLst>
         </p:spPr>

</xml_diff>

<commit_message>
Added some slides about the source/sink term, and modified those needed to be amanded.
</commit_message>
<xml_diff>
--- a/Materials/Richards_English.pptx
+++ b/Materials/Richards_English.pptx
@@ -5,7 +5,7 @@
     <p:sldMasterId id="2147483648" r:id="rId1"/>
   </p:sldMasterIdLst>
   <p:notesMasterIdLst>
-    <p:notesMasterId r:id="rId32"/>
+    <p:notesMasterId r:id="rId35"/>
   </p:notesMasterIdLst>
   <p:sldIdLst>
     <p:sldId id="285" r:id="rId2"/>
@@ -29,15 +29,18 @@
     <p:sldId id="334" r:id="rId20"/>
     <p:sldId id="335" r:id="rId21"/>
     <p:sldId id="336" r:id="rId22"/>
-    <p:sldId id="337" r:id="rId23"/>
-    <p:sldId id="338" r:id="rId24"/>
-    <p:sldId id="339" r:id="rId25"/>
-    <p:sldId id="340" r:id="rId26"/>
-    <p:sldId id="341" r:id="rId27"/>
-    <p:sldId id="342" r:id="rId28"/>
-    <p:sldId id="343" r:id="rId29"/>
-    <p:sldId id="345" r:id="rId30"/>
-    <p:sldId id="273" r:id="rId31"/>
+    <p:sldId id="359" r:id="rId23"/>
+    <p:sldId id="337" r:id="rId24"/>
+    <p:sldId id="338" r:id="rId25"/>
+    <p:sldId id="339" r:id="rId26"/>
+    <p:sldId id="340" r:id="rId27"/>
+    <p:sldId id="357" r:id="rId28"/>
+    <p:sldId id="358" r:id="rId29"/>
+    <p:sldId id="341" r:id="rId30"/>
+    <p:sldId id="342" r:id="rId31"/>
+    <p:sldId id="343" r:id="rId32"/>
+    <p:sldId id="345" r:id="rId33"/>
+    <p:sldId id="273" r:id="rId34"/>
   </p:sldIdLst>
   <p:sldSz cx="9144000" cy="6858000" type="screen4x3"/>
   <p:notesSz cx="6858000" cy="9144000"/>
@@ -221,7 +224,7 @@
           <a:p>
             <a:fld id="{4D0C6883-54F1-064A-A731-D2789FFABA37}" type="datetimeFigureOut">
               <a:rPr lang="it-IT" smtClean="0"/>
-              <a:t>13/11/2017</a:t>
+              <a:t>14/11/2017</a:t>
             </a:fld>
             <a:endParaRPr lang="en-GB"/>
           </a:p>
@@ -670,7 +673,7 @@
           <a:p>
             <a:fld id="{D3F618D5-3DB9-B146-87ED-A3BCB7C64B91}" type="datetimeFigureOut">
               <a:rPr lang="it-IT" smtClean="0"/>
-              <a:t>13/11/2017</a:t>
+              <a:t>14/11/2017</a:t>
             </a:fld>
             <a:endParaRPr lang="en-GB"/>
           </a:p>
@@ -840,7 +843,7 @@
           <a:p>
             <a:fld id="{D3F618D5-3DB9-B146-87ED-A3BCB7C64B91}" type="datetimeFigureOut">
               <a:rPr lang="it-IT" smtClean="0"/>
-              <a:t>13/11/2017</a:t>
+              <a:t>14/11/2017</a:t>
             </a:fld>
             <a:endParaRPr lang="en-GB"/>
           </a:p>
@@ -1020,7 +1023,7 @@
           <a:p>
             <a:fld id="{D3F618D5-3DB9-B146-87ED-A3BCB7C64B91}" type="datetimeFigureOut">
               <a:rPr lang="it-IT" smtClean="0"/>
-              <a:t>13/11/2017</a:t>
+              <a:t>14/11/2017</a:t>
             </a:fld>
             <a:endParaRPr lang="en-GB"/>
           </a:p>
@@ -1443,7 +1446,7 @@
           <a:p>
             <a:fld id="{D3F618D5-3DB9-B146-87ED-A3BCB7C64B91}" type="datetimeFigureOut">
               <a:rPr lang="it-IT" smtClean="0"/>
-              <a:t>13/11/2017</a:t>
+              <a:t>14/11/2017</a:t>
             </a:fld>
             <a:endParaRPr lang="en-GB"/>
           </a:p>
@@ -1689,7 +1692,7 @@
           <a:p>
             <a:fld id="{D3F618D5-3DB9-B146-87ED-A3BCB7C64B91}" type="datetimeFigureOut">
               <a:rPr lang="it-IT" smtClean="0"/>
-              <a:t>13/11/2017</a:t>
+              <a:t>14/11/2017</a:t>
             </a:fld>
             <a:endParaRPr lang="en-GB"/>
           </a:p>
@@ -1977,7 +1980,7 @@
           <a:p>
             <a:fld id="{D3F618D5-3DB9-B146-87ED-A3BCB7C64B91}" type="datetimeFigureOut">
               <a:rPr lang="it-IT" smtClean="0"/>
-              <a:t>13/11/2017</a:t>
+              <a:t>14/11/2017</a:t>
             </a:fld>
             <a:endParaRPr lang="en-GB"/>
           </a:p>
@@ -2399,7 +2402,7 @@
           <a:p>
             <a:fld id="{D3F618D5-3DB9-B146-87ED-A3BCB7C64B91}" type="datetimeFigureOut">
               <a:rPr lang="it-IT" smtClean="0"/>
-              <a:t>13/11/2017</a:t>
+              <a:t>14/11/2017</a:t>
             </a:fld>
             <a:endParaRPr lang="en-GB"/>
           </a:p>
@@ -2517,7 +2520,7 @@
           <a:p>
             <a:fld id="{D3F618D5-3DB9-B146-87ED-A3BCB7C64B91}" type="datetimeFigureOut">
               <a:rPr lang="it-IT" smtClean="0"/>
-              <a:t>13/11/2017</a:t>
+              <a:t>14/11/2017</a:t>
             </a:fld>
             <a:endParaRPr lang="en-GB"/>
           </a:p>
@@ -2612,7 +2615,7 @@
           <a:p>
             <a:fld id="{D3F618D5-3DB9-B146-87ED-A3BCB7C64B91}" type="datetimeFigureOut">
               <a:rPr lang="it-IT" smtClean="0"/>
-              <a:t>13/11/2017</a:t>
+              <a:t>14/11/2017</a:t>
             </a:fld>
             <a:endParaRPr lang="en-GB"/>
           </a:p>
@@ -2889,7 +2892,7 @@
           <a:p>
             <a:fld id="{D3F618D5-3DB9-B146-87ED-A3BCB7C64B91}" type="datetimeFigureOut">
               <a:rPr lang="it-IT" smtClean="0"/>
-              <a:t>13/11/2017</a:t>
+              <a:t>14/11/2017</a:t>
             </a:fld>
             <a:endParaRPr lang="en-GB"/>
           </a:p>
@@ -3142,7 +3145,7 @@
           <a:p>
             <a:fld id="{D3F618D5-3DB9-B146-87ED-A3BCB7C64B91}" type="datetimeFigureOut">
               <a:rPr lang="it-IT" smtClean="0"/>
-              <a:t>13/11/2017</a:t>
+              <a:t>14/11/2017</a:t>
             </a:fld>
             <a:endParaRPr lang="en-GB"/>
           </a:p>
@@ -3355,7 +3358,7 @@
           <a:p>
             <a:fld id="{D3F618D5-3DB9-B146-87ED-A3BCB7C64B91}" type="datetimeFigureOut">
               <a:rPr lang="it-IT" smtClean="0"/>
-              <a:t>13/11/2017</a:t>
+              <a:t>14/11/2017</a:t>
             </a:fld>
             <a:endParaRPr lang="en-GB"/>
           </a:p>
@@ -8036,7 +8039,7 @@
       </p:sp>
       <p:pic>
         <p:nvPicPr>
-          <p:cNvPr id="3" name="Immagine 2"/>
+          <p:cNvPr id="4" name="Immagine 3"/>
           <p:cNvPicPr>
             <a:picLocks noChangeAspect="1"/>
           </p:cNvPicPr>
@@ -8056,8 +8059,8 @@
         </p:blipFill>
         <p:spPr>
           <a:xfrm>
-            <a:off x="143522" y="1532966"/>
-            <a:ext cx="8915414" cy="3845858"/>
+            <a:off x="0" y="1506071"/>
+            <a:ext cx="9138901" cy="3729317"/>
           </a:xfrm>
           <a:prstGeom prst="rect">
             <a:avLst/>
@@ -8890,7 +8893,7 @@
       </p:sp>
       <p:sp>
         <p:nvSpPr>
-          <p:cNvPr id="5" name="Titolo 1"/>
+          <p:cNvPr id="6" name="Titolo 1"/>
           <p:cNvSpPr txBox="1">
             <a:spLocks/>
           </p:cNvSpPr>
@@ -8898,7 +8901,7 @@
         </p:nvSpPr>
         <p:spPr>
           <a:xfrm>
-            <a:off x="457200" y="1371600"/>
+            <a:off x="533400" y="1697265"/>
             <a:ext cx="8229600" cy="1143000"/>
           </a:xfrm>
           <a:prstGeom prst="rect">
@@ -8906,11 +8909,11 @@
           </a:prstGeom>
         </p:spPr>
         <p:txBody>
-          <a:bodyPr>
+          <a:bodyPr vert="horz" lIns="91440" tIns="45720" rIns="91440" bIns="45720" rtlCol="0" anchor="ctr">
             <a:noAutofit/>
           </a:bodyPr>
           <a:lstStyle>
-            <a:lvl1pPr algn="ctr" defTabSz="457200" rtl="0" eaLnBrk="1" latinLnBrk="0" hangingPunct="1">
+            <a:lvl1pPr algn="ctr" defTabSz="914400" rtl="0" eaLnBrk="1" latinLnBrk="0" hangingPunct="1">
               <a:spcBef>
                 <a:spcPct val="0"/>
               </a:spcBef>
@@ -8928,7 +8931,11 @@
           <a:p>
             <a:r>
               <a:rPr lang="it-IT" sz="2000" dirty="0" smtClean="0"/>
-              <a:t>PATH OF THE OUTPUT FOLDER</a:t>
+              <a:t>FILE PATH FOR THE </a:t>
+            </a:r>
+            <a:r>
+              <a:rPr lang="it-IT" sz="2000" dirty="0" smtClean="0"/>
+              <a:t>SOURCE/SINK TERM</a:t>
             </a:r>
             <a:endParaRPr lang="it-IT" sz="2000" dirty="0"/>
           </a:p>
@@ -8942,8 +8949,8 @@
         </p:nvCxnSpPr>
         <p:spPr>
           <a:xfrm>
-            <a:off x="4314825" y="2115671"/>
-            <a:ext cx="0" cy="911464"/>
+            <a:off x="7273688" y="2460796"/>
+            <a:ext cx="0" cy="1045935"/>
           </a:xfrm>
           <a:prstGeom prst="straightConnector1">
             <a:avLst/>
@@ -8992,8 +8999,8 @@
         </p:blipFill>
         <p:spPr>
           <a:xfrm>
-            <a:off x="2065692" y="3219420"/>
-            <a:ext cx="5369595" cy="814698"/>
+            <a:off x="424600" y="3544629"/>
+            <a:ext cx="8447200" cy="807840"/>
           </a:xfrm>
           <a:prstGeom prst="rect">
             <a:avLst/>
@@ -9003,7 +9010,7 @@
     </p:spTree>
     <p:extLst>
       <p:ext uri="{BB962C8B-B14F-4D97-AF65-F5344CB8AC3E}">
-        <p14:creationId xmlns:p14="http://schemas.microsoft.com/office/powerpoint/2010/main" val="414435941"/>
+        <p14:creationId xmlns:p14="http://schemas.microsoft.com/office/powerpoint/2010/main" val="2447935455"/>
       </p:ext>
     </p:extLst>
   </p:cSld>
@@ -9194,15 +9201,97 @@
             <a:pPr algn="ctr"/>
             <a:r>
               <a:rPr lang="en-GB" sz="2000" dirty="0" smtClean="0"/>
-              <a:t>.sim file: connect </a:t>
+              <a:t>.sim file: parameters </a:t>
             </a:r>
             <a:endParaRPr lang="en-GB" sz="2000" dirty="0"/>
           </a:p>
         </p:txBody>
       </p:sp>
+      <p:sp>
+        <p:nvSpPr>
+          <p:cNvPr id="5" name="Titolo 1"/>
+          <p:cNvSpPr txBox="1">
+            <a:spLocks/>
+          </p:cNvSpPr>
+          <p:nvPr/>
+        </p:nvSpPr>
+        <p:spPr>
+          <a:xfrm>
+            <a:off x="457200" y="1371600"/>
+            <a:ext cx="8229600" cy="1143000"/>
+          </a:xfrm>
+          <a:prstGeom prst="rect">
+            <a:avLst/>
+          </a:prstGeom>
+        </p:spPr>
+        <p:txBody>
+          <a:bodyPr>
+            <a:noAutofit/>
+          </a:bodyPr>
+          <a:lstStyle>
+            <a:lvl1pPr algn="ctr" defTabSz="457200" rtl="0" eaLnBrk="1" latinLnBrk="0" hangingPunct="1">
+              <a:spcBef>
+                <a:spcPct val="0"/>
+              </a:spcBef>
+              <a:buNone/>
+              <a:defRPr sz="4400" kern="1200">
+                <a:solidFill>
+                  <a:schemeClr val="tx1"/>
+                </a:solidFill>
+                <a:latin typeface="+mj-lt"/>
+                <a:ea typeface="+mj-ea"/>
+                <a:cs typeface="+mj-cs"/>
+              </a:defRPr>
+            </a:lvl1pPr>
+          </a:lstStyle>
+          <a:p>
+            <a:r>
+              <a:rPr lang="it-IT" sz="2000" dirty="0" smtClean="0"/>
+              <a:t>PATH OF THE OUTPUT FOLDER</a:t>
+            </a:r>
+            <a:endParaRPr lang="it-IT" sz="2000" dirty="0"/>
+          </a:p>
+        </p:txBody>
+      </p:sp>
+      <p:cxnSp>
+        <p:nvCxnSpPr>
+          <p:cNvPr id="7" name="Connettore 2 6"/>
+          <p:cNvCxnSpPr/>
+          <p:nvPr/>
+        </p:nvCxnSpPr>
+        <p:spPr>
+          <a:xfrm>
+            <a:off x="4314825" y="2115671"/>
+            <a:ext cx="0" cy="911464"/>
+          </a:xfrm>
+          <a:prstGeom prst="straightConnector1">
+            <a:avLst/>
+          </a:prstGeom>
+          <a:ln w="57150">
+            <a:solidFill>
+              <a:srgbClr val="FF0000"/>
+            </a:solidFill>
+            <a:tailEnd type="arrow"/>
+          </a:ln>
+        </p:spPr>
+        <p:style>
+          <a:lnRef idx="1">
+            <a:schemeClr val="accent1"/>
+          </a:lnRef>
+          <a:fillRef idx="0">
+            <a:schemeClr val="accent1"/>
+          </a:fillRef>
+          <a:effectRef idx="0">
+            <a:schemeClr val="accent1"/>
+          </a:effectRef>
+          <a:fontRef idx="minor">
+            <a:schemeClr val="tx1"/>
+          </a:fontRef>
+        </p:style>
+      </p:cxnSp>
       <p:pic>
         <p:nvPicPr>
-          <p:cNvPr id="5" name="Segnaposto contenuto 3"/>
+          <p:cNvPr id="3" name="Immagine 2"/>
           <p:cNvPicPr>
             <a:picLocks noChangeAspect="1"/>
           </p:cNvPicPr>
@@ -9222,8 +9311,8 @@
         </p:blipFill>
         <p:spPr>
           <a:xfrm>
-            <a:off x="821004" y="1649505"/>
-            <a:ext cx="7501990" cy="3810000"/>
+            <a:off x="2065692" y="3219420"/>
+            <a:ext cx="5369595" cy="814698"/>
           </a:xfrm>
           <a:prstGeom prst="rect">
             <a:avLst/>
@@ -9233,7 +9322,7 @@
     </p:spTree>
     <p:extLst>
       <p:ext uri="{BB962C8B-B14F-4D97-AF65-F5344CB8AC3E}">
-        <p14:creationId xmlns:p14="http://schemas.microsoft.com/office/powerpoint/2010/main" val="4270181486"/>
+        <p14:creationId xmlns:p14="http://schemas.microsoft.com/office/powerpoint/2010/main" val="414435941"/>
       </p:ext>
     </p:extLst>
   </p:cSld>
@@ -9408,7 +9497,7 @@
         <p:spPr>
           <a:xfrm>
             <a:off x="1708712" y="524867"/>
-            <a:ext cx="5726575" cy="707886"/>
+            <a:ext cx="5726575" cy="400110"/>
           </a:xfrm>
           <a:prstGeom prst="rect">
             <a:avLst/>
@@ -9423,27 +9512,8 @@
           <a:p>
             <a:pPr algn="ctr"/>
             <a:r>
-              <a:rPr lang="it-IT" sz="2000" dirty="0" smtClean="0"/>
-              <a:t>INPUT </a:t>
-            </a:r>
-            <a:r>
-              <a:rPr lang="it-IT" sz="2000" dirty="0"/>
-              <a:t>FILE </a:t>
-            </a:r>
-            <a:r>
-              <a:rPr lang="it-IT" sz="2000" dirty="0" smtClean="0"/>
-              <a:t>FOR</a:t>
-            </a:r>
-            <a:r>
-              <a:rPr lang="it-IT" sz="2000" dirty="0"/>
-              <a:t/>
-            </a:r>
-            <a:br>
-              <a:rPr lang="it-IT" sz="2000" dirty="0"/>
-            </a:br>
-            <a:r>
-              <a:rPr lang="it-IT" sz="2000" dirty="0" smtClean="0"/>
-              <a:t>THE INITIAL CONDITION</a:t>
+              <a:rPr lang="en-GB" sz="2000" dirty="0" smtClean="0"/>
+              <a:t>.sim file: connect </a:t>
             </a:r>
             <a:endParaRPr lang="en-GB" sz="2000" dirty="0"/>
           </a:p>
@@ -9451,7 +9521,7 @@
       </p:sp>
       <p:pic>
         <p:nvPicPr>
-          <p:cNvPr id="4" name="Immagine 3"/>
+          <p:cNvPr id="3" name="Immagine 2"/>
           <p:cNvPicPr>
             <a:picLocks noChangeAspect="1"/>
           </p:cNvPicPr>
@@ -9471,8 +9541,8 @@
         </p:blipFill>
         <p:spPr>
           <a:xfrm>
-            <a:off x="3101787" y="1535869"/>
-            <a:ext cx="2940423" cy="4615575"/>
+            <a:off x="1054756" y="1344706"/>
+            <a:ext cx="7103126" cy="4209261"/>
           </a:xfrm>
           <a:prstGeom prst="rect">
             <a:avLst/>
@@ -9482,7 +9552,7 @@
     </p:spTree>
     <p:extLst>
       <p:ext uri="{BB962C8B-B14F-4D97-AF65-F5344CB8AC3E}">
-        <p14:creationId xmlns:p14="http://schemas.microsoft.com/office/powerpoint/2010/main" val="187457067"/>
+        <p14:creationId xmlns:p14="http://schemas.microsoft.com/office/powerpoint/2010/main" val="4270181486"/>
       </p:ext>
     </p:extLst>
   </p:cSld>
@@ -9698,125 +9768,40 @@
           </a:p>
         </p:txBody>
       </p:sp>
-      <p:sp>
-        <p:nvSpPr>
-          <p:cNvPr id="15" name="CasellaDiTesto 14"/>
-          <p:cNvSpPr txBox="1"/>
-          <p:nvPr/>
-        </p:nvSpPr>
-        <p:spPr>
-          <a:xfrm>
-            <a:off x="228600" y="1905000"/>
-            <a:ext cx="7315200" cy="1692771"/>
-          </a:xfrm>
-          <a:prstGeom prst="rect">
-            <a:avLst/>
-          </a:prstGeom>
-          <a:noFill/>
-        </p:spPr>
-        <p:txBody>
-          <a:bodyPr wrap="square" rtlCol="0">
-            <a:spAutoFit/>
-          </a:bodyPr>
-          <a:lstStyle/>
-          <a:p>
-            <a:pPr algn="just"/>
-            <a:r>
-              <a:rPr lang="it-IT" sz="2000" dirty="0" smtClean="0"/>
-              <a:t>THE FIRST LINE REFERS TO THE DEEPEST LAYER.</a:t>
-            </a:r>
-          </a:p>
-          <a:p>
-            <a:pPr algn="just"/>
-            <a:endParaRPr lang="it-IT" sz="2000" dirty="0" smtClean="0"/>
-          </a:p>
-          <a:p>
-            <a:pPr algn="just"/>
-            <a:r>
-              <a:rPr lang="it-IT" sz="2000" dirty="0" smtClean="0"/>
-              <a:t>THE DEPTH OF THE DEEPEST LAYER IS ALWAYS SMALLER THAN  </a:t>
-            </a:r>
-            <a:r>
-              <a:rPr lang="it-IT" sz="2000" i="1" dirty="0" err="1" smtClean="0">
-                <a:solidFill>
-                  <a:srgbClr val="0070C0"/>
-                </a:solidFill>
-              </a:rPr>
-              <a:t>spaceBottom</a:t>
-            </a:r>
-            <a:endParaRPr lang="it-IT" sz="2000" i="1" dirty="0" smtClean="0">
-              <a:solidFill>
-                <a:srgbClr val="0070C0"/>
-              </a:solidFill>
-            </a:endParaRPr>
-          </a:p>
-          <a:p>
-            <a:pPr algn="just"/>
-            <a:endParaRPr lang="it-IT" sz="2400" i="1" dirty="0">
-              <a:solidFill>
-                <a:srgbClr val="0070C0"/>
-              </a:solidFill>
-            </a:endParaRPr>
-          </a:p>
-        </p:txBody>
-      </p:sp>
-      <p:sp>
-        <p:nvSpPr>
-          <p:cNvPr id="16" name="CasellaDiTesto 15"/>
-          <p:cNvSpPr txBox="1"/>
-          <p:nvPr/>
-        </p:nvSpPr>
-        <p:spPr>
-          <a:xfrm>
-            <a:off x="1976651" y="4267200"/>
-            <a:ext cx="6858000" cy="1323439"/>
-          </a:xfrm>
-          <a:prstGeom prst="rect">
-            <a:avLst/>
-          </a:prstGeom>
-          <a:noFill/>
-        </p:spPr>
-        <p:txBody>
-          <a:bodyPr wrap="square" rtlCol="0">
-            <a:spAutoFit/>
-          </a:bodyPr>
-          <a:lstStyle/>
-          <a:p>
-            <a:pPr algn="just"/>
-            <a:r>
-              <a:rPr lang="it-IT" sz="2000" dirty="0" smtClean="0"/>
-              <a:t>THE LAST LINE REFERS TO THE UPPERMOST LAYER.  </a:t>
-            </a:r>
-          </a:p>
-          <a:p>
-            <a:pPr algn="just"/>
-            <a:endParaRPr lang="it-IT" sz="2000" dirty="0"/>
-          </a:p>
-          <a:p>
-            <a:pPr algn="just"/>
-            <a:r>
-              <a:rPr lang="it-IT" sz="2000" dirty="0" smtClean="0"/>
-              <a:t>THIS DEPTH IS ALWAYS GRATER THAN </a:t>
-            </a:r>
-            <a:r>
-              <a:rPr lang="it-IT" sz="2000" i="1" dirty="0" smtClean="0">
-                <a:solidFill>
-                  <a:srgbClr val="0070C0"/>
-                </a:solidFill>
-              </a:rPr>
-              <a:t>0m</a:t>
-            </a:r>
-          </a:p>
-          <a:p>
-            <a:pPr algn="just"/>
-            <a:endParaRPr lang="it-IT" sz="2000" dirty="0"/>
-          </a:p>
-        </p:txBody>
-      </p:sp>
+      <p:pic>
+        <p:nvPicPr>
+          <p:cNvPr id="4" name="Immagine 3"/>
+          <p:cNvPicPr>
+            <a:picLocks noChangeAspect="1"/>
+          </p:cNvPicPr>
+          <p:nvPr/>
+        </p:nvPicPr>
+        <p:blipFill>
+          <a:blip r:embed="rId2">
+            <a:extLst>
+              <a:ext uri="{28A0092B-C50C-407E-A947-70E740481C1C}">
+                <a14:useLocalDpi xmlns:a14="http://schemas.microsoft.com/office/drawing/2010/main" val="0"/>
+              </a:ext>
+            </a:extLst>
+          </a:blip>
+          <a:stretch>
+            <a:fillRect/>
+          </a:stretch>
+        </p:blipFill>
+        <p:spPr>
+          <a:xfrm>
+            <a:off x="3101787" y="1535869"/>
+            <a:ext cx="2940423" cy="4615575"/>
+          </a:xfrm>
+          <a:prstGeom prst="rect">
+            <a:avLst/>
+          </a:prstGeom>
+        </p:spPr>
+      </p:pic>
     </p:spTree>
     <p:extLst>
       <p:ext uri="{BB962C8B-B14F-4D97-AF65-F5344CB8AC3E}">
-        <p14:creationId xmlns:p14="http://schemas.microsoft.com/office/powerpoint/2010/main" val="1606213145"/>
+        <p14:creationId xmlns:p14="http://schemas.microsoft.com/office/powerpoint/2010/main" val="187457067"/>
       </p:ext>
     </p:extLst>
   </p:cSld>
@@ -10026,144 +10011,22 @@
             </a:br>
             <a:r>
               <a:rPr lang="it-IT" sz="2000" dirty="0" smtClean="0"/>
-              <a:t>THE TOP BOUNDARY CONDITION</a:t>
+              <a:t>THE INITIAL CONDITION</a:t>
             </a:r>
             <a:endParaRPr lang="en-GB" sz="2000" dirty="0"/>
           </a:p>
         </p:txBody>
       </p:sp>
-      <p:pic>
-        <p:nvPicPr>
-          <p:cNvPr id="15" name="Segnaposto contenuto 4"/>
-          <p:cNvPicPr>
-            <a:picLocks noChangeAspect="1"/>
-          </p:cNvPicPr>
-          <p:nvPr/>
-        </p:nvPicPr>
-        <p:blipFill>
-          <a:blip r:embed="rId2">
-            <a:extLst>
-              <a:ext uri="{28A0092B-C50C-407E-A947-70E740481C1C}">
-                <a14:useLocalDpi xmlns:a14="http://schemas.microsoft.com/office/drawing/2010/main" val="0"/>
-              </a:ext>
-            </a:extLst>
-          </a:blip>
-          <a:stretch>
-            <a:fillRect/>
-          </a:stretch>
-        </p:blipFill>
-        <p:spPr>
-          <a:xfrm>
-            <a:off x="533400" y="1371600"/>
-            <a:ext cx="4495800" cy="4720590"/>
-          </a:xfrm>
-          <a:prstGeom prst="rect">
-            <a:avLst/>
-          </a:prstGeom>
-        </p:spPr>
-      </p:pic>
-      <p:sp>
-        <p:nvSpPr>
-          <p:cNvPr id="16" name="Rettangolo 15"/>
-          <p:cNvSpPr/>
-          <p:nvPr/>
-        </p:nvSpPr>
-        <p:spPr>
-          <a:xfrm>
-            <a:off x="3276600" y="3048000"/>
-            <a:ext cx="1981200" cy="3084493"/>
-          </a:xfrm>
-          <a:prstGeom prst="rect">
-            <a:avLst/>
-          </a:prstGeom>
-          <a:noFill/>
-          <a:ln w="50800">
-            <a:solidFill>
-              <a:srgbClr val="00B050"/>
-            </a:solidFill>
-          </a:ln>
-        </p:spPr>
-        <p:style>
-          <a:lnRef idx="2">
-            <a:schemeClr val="accent1">
-              <a:shade val="50000"/>
-            </a:schemeClr>
-          </a:lnRef>
-          <a:fillRef idx="1">
-            <a:schemeClr val="accent1"/>
-          </a:fillRef>
-          <a:effectRef idx="0">
-            <a:schemeClr val="accent1"/>
-          </a:effectRef>
-          <a:fontRef idx="minor">
-            <a:schemeClr val="lt1"/>
-          </a:fontRef>
-        </p:style>
-        <p:txBody>
-          <a:bodyPr rtlCol="0" anchor="ctr"/>
-          <a:lstStyle/>
-          <a:p>
-            <a:pPr algn="ctr"/>
-            <a:endParaRPr lang="it-IT" dirty="0"/>
-          </a:p>
-        </p:txBody>
-      </p:sp>
-      <p:sp>
-        <p:nvSpPr>
-          <p:cNvPr id="17" name="Rettangolo 16"/>
-          <p:cNvSpPr/>
-          <p:nvPr/>
-        </p:nvSpPr>
-        <p:spPr>
-          <a:xfrm>
-            <a:off x="5791200" y="1828800"/>
-            <a:ext cx="3124200" cy="1219200"/>
-          </a:xfrm>
-          <a:prstGeom prst="rect">
-            <a:avLst/>
-          </a:prstGeom>
-          <a:noFill/>
-          <a:ln w="50800">
-            <a:solidFill>
-              <a:srgbClr val="00B050"/>
-            </a:solidFill>
-          </a:ln>
-        </p:spPr>
-        <p:style>
-          <a:lnRef idx="2">
-            <a:schemeClr val="accent1">
-              <a:shade val="50000"/>
-            </a:schemeClr>
-          </a:lnRef>
-          <a:fillRef idx="1">
-            <a:schemeClr val="accent1"/>
-          </a:fillRef>
-          <a:effectRef idx="0">
-            <a:schemeClr val="accent1"/>
-          </a:effectRef>
-          <a:fontRef idx="minor">
-            <a:schemeClr val="lt1"/>
-          </a:fontRef>
-        </p:style>
-        <p:txBody>
-          <a:bodyPr rtlCol="0" anchor="ctr"/>
-          <a:lstStyle/>
-          <a:p>
-            <a:pPr algn="ctr"/>
-            <a:endParaRPr lang="it-IT" dirty="0"/>
-          </a:p>
-        </p:txBody>
-      </p:sp>
-      <p:sp>
-        <p:nvSpPr>
-          <p:cNvPr id="18" name="CasellaDiTesto 17"/>
+      <p:sp>
+        <p:nvSpPr>
+          <p:cNvPr id="15" name="CasellaDiTesto 14"/>
           <p:cNvSpPr txBox="1"/>
           <p:nvPr/>
         </p:nvSpPr>
         <p:spPr>
           <a:xfrm>
-            <a:off x="5970490" y="2203551"/>
-            <a:ext cx="3041176" cy="400110"/>
+            <a:off x="228600" y="1905000"/>
+            <a:ext cx="7315200" cy="1692771"/>
           </a:xfrm>
           <a:prstGeom prst="rect">
             <a:avLst/>
@@ -10176,54 +10039,103 @@
           </a:bodyPr>
           <a:lstStyle/>
           <a:p>
+            <a:pPr algn="just"/>
             <a:r>
               <a:rPr lang="it-IT" sz="2000" dirty="0" smtClean="0"/>
-              <a:t>RAINFALL HEIGHT [mm]</a:t>
-            </a:r>
+              <a:t>THE FIRST LINE REFERS TO THE DEEPEST LAYER.</a:t>
+            </a:r>
+          </a:p>
+          <a:p>
+            <a:pPr algn="just"/>
+            <a:endParaRPr lang="it-IT" sz="2000" dirty="0" smtClean="0"/>
+          </a:p>
+          <a:p>
+            <a:pPr algn="just"/>
+            <a:r>
+              <a:rPr lang="it-IT" sz="2000" dirty="0" smtClean="0"/>
+              <a:t>THE DEPTH OF THE DEEPEST LAYER IS ALWAYS SMALLER THAN  </a:t>
+            </a:r>
+            <a:r>
+              <a:rPr lang="it-IT" sz="2000" i="1" dirty="0" err="1" smtClean="0">
+                <a:solidFill>
+                  <a:srgbClr val="0070C0"/>
+                </a:solidFill>
+              </a:rPr>
+              <a:t>spaceBottom</a:t>
+            </a:r>
+            <a:endParaRPr lang="it-IT" sz="2000" i="1" dirty="0" smtClean="0">
+              <a:solidFill>
+                <a:srgbClr val="0070C0"/>
+              </a:solidFill>
+            </a:endParaRPr>
+          </a:p>
+          <a:p>
+            <a:pPr algn="just"/>
+            <a:endParaRPr lang="it-IT" sz="2400" i="1" dirty="0">
+              <a:solidFill>
+                <a:srgbClr val="0070C0"/>
+              </a:solidFill>
+            </a:endParaRPr>
+          </a:p>
+        </p:txBody>
+      </p:sp>
+      <p:sp>
+        <p:nvSpPr>
+          <p:cNvPr id="16" name="CasellaDiTesto 15"/>
+          <p:cNvSpPr txBox="1"/>
+          <p:nvPr/>
+        </p:nvSpPr>
+        <p:spPr>
+          <a:xfrm>
+            <a:off x="1976651" y="4267200"/>
+            <a:ext cx="6858000" cy="1323439"/>
+          </a:xfrm>
+          <a:prstGeom prst="rect">
+            <a:avLst/>
+          </a:prstGeom>
+          <a:noFill/>
+        </p:spPr>
+        <p:txBody>
+          <a:bodyPr wrap="square" rtlCol="0">
+            <a:spAutoFit/>
+          </a:bodyPr>
+          <a:lstStyle/>
+          <a:p>
+            <a:pPr algn="just"/>
+            <a:r>
+              <a:rPr lang="it-IT" sz="2000" dirty="0" smtClean="0"/>
+              <a:t>THE LAST LINE REFERS TO THE UPPERMOST LAYER.  </a:t>
+            </a:r>
+          </a:p>
+          <a:p>
+            <a:pPr algn="just"/>
             <a:endParaRPr lang="it-IT" sz="2000" dirty="0"/>
           </a:p>
-        </p:txBody>
-      </p:sp>
-      <p:cxnSp>
-        <p:nvCxnSpPr>
-          <p:cNvPr id="19" name="Connettore 2 18"/>
-          <p:cNvCxnSpPr/>
-          <p:nvPr/>
-        </p:nvCxnSpPr>
-        <p:spPr>
-          <a:xfrm flipH="1">
-            <a:off x="5257800" y="2403901"/>
-            <a:ext cx="533400" cy="609600"/>
-          </a:xfrm>
-          <a:prstGeom prst="straightConnector1">
-            <a:avLst/>
-          </a:prstGeom>
-          <a:ln w="57150">
-            <a:solidFill>
-              <a:srgbClr val="00B050"/>
-            </a:solidFill>
-            <a:tailEnd type="arrow"/>
-          </a:ln>
-        </p:spPr>
-        <p:style>
-          <a:lnRef idx="1">
-            <a:schemeClr val="accent1"/>
-          </a:lnRef>
-          <a:fillRef idx="0">
-            <a:schemeClr val="accent1"/>
-          </a:fillRef>
-          <a:effectRef idx="0">
-            <a:schemeClr val="accent1"/>
-          </a:effectRef>
-          <a:fontRef idx="minor">
-            <a:schemeClr val="tx1"/>
-          </a:fontRef>
-        </p:style>
-      </p:cxnSp>
+          <a:p>
+            <a:pPr algn="just"/>
+            <a:r>
+              <a:rPr lang="it-IT" sz="2000" dirty="0" smtClean="0"/>
+              <a:t>THIS DEPTH IS ALWAYS GRATER THAN </a:t>
+            </a:r>
+            <a:r>
+              <a:rPr lang="it-IT" sz="2000" i="1" dirty="0" smtClean="0">
+                <a:solidFill>
+                  <a:srgbClr val="0070C0"/>
+                </a:solidFill>
+              </a:rPr>
+              <a:t>0m</a:t>
+            </a:r>
+          </a:p>
+          <a:p>
+            <a:pPr algn="just"/>
+            <a:endParaRPr lang="it-IT" sz="2000" dirty="0"/>
+          </a:p>
+        </p:txBody>
+      </p:sp>
     </p:spTree>
     <p:extLst>
       <p:ext uri="{BB962C8B-B14F-4D97-AF65-F5344CB8AC3E}">
-        <p14:creationId xmlns:p14="http://schemas.microsoft.com/office/powerpoint/2010/main" val="2231745101"/>
+        <p14:creationId xmlns:p14="http://schemas.microsoft.com/office/powerpoint/2010/main" val="1606213145"/>
       </p:ext>
     </p:extLst>
   </p:cSld>
@@ -10424,135 +10336,24 @@
               <a:rPr lang="it-IT" sz="2000" dirty="0" smtClean="0"/>
               <a:t>FOR</a:t>
             </a:r>
-          </a:p>
-          <a:p>
-            <a:pPr algn="ctr"/>
+            <a:r>
+              <a:rPr lang="it-IT" sz="2000" dirty="0"/>
+              <a:t/>
+            </a:r>
+            <a:br>
+              <a:rPr lang="it-IT" sz="2000" dirty="0"/>
+            </a:br>
             <a:r>
               <a:rPr lang="it-IT" sz="2000" dirty="0" smtClean="0"/>
-              <a:t>THE BOTTOM BOUNDARY CONDITION</a:t>
+              <a:t>THE SOURCE/SINK TERM</a:t>
             </a:r>
             <a:endParaRPr lang="en-GB" sz="2000" dirty="0"/>
           </a:p>
         </p:txBody>
       </p:sp>
-      <p:sp>
-        <p:nvSpPr>
-          <p:cNvPr id="17" name="Rettangolo 16"/>
-          <p:cNvSpPr/>
-          <p:nvPr/>
-        </p:nvSpPr>
-        <p:spPr>
-          <a:xfrm>
-            <a:off x="5791200" y="1828800"/>
-            <a:ext cx="3124200" cy="1219200"/>
-          </a:xfrm>
-          <a:prstGeom prst="rect">
-            <a:avLst/>
-          </a:prstGeom>
-          <a:noFill/>
-          <a:ln w="50800">
-            <a:solidFill>
-              <a:srgbClr val="00B050"/>
-            </a:solidFill>
-          </a:ln>
-        </p:spPr>
-        <p:style>
-          <a:lnRef idx="2">
-            <a:schemeClr val="accent1">
-              <a:shade val="50000"/>
-            </a:schemeClr>
-          </a:lnRef>
-          <a:fillRef idx="1">
-            <a:schemeClr val="accent1"/>
-          </a:fillRef>
-          <a:effectRef idx="0">
-            <a:schemeClr val="accent1"/>
-          </a:effectRef>
-          <a:fontRef idx="minor">
-            <a:schemeClr val="lt1"/>
-          </a:fontRef>
-        </p:style>
-        <p:txBody>
-          <a:bodyPr rtlCol="0" anchor="ctr"/>
-          <a:lstStyle/>
-          <a:p>
-            <a:pPr algn="ctr"/>
-            <a:endParaRPr lang="it-IT" dirty="0"/>
-          </a:p>
-        </p:txBody>
-      </p:sp>
-      <p:sp>
-        <p:nvSpPr>
-          <p:cNvPr id="18" name="CasellaDiTesto 17"/>
-          <p:cNvSpPr txBox="1"/>
-          <p:nvPr/>
-        </p:nvSpPr>
-        <p:spPr>
-          <a:xfrm>
-            <a:off x="5886499" y="1990161"/>
-            <a:ext cx="3041176" cy="1323439"/>
-          </a:xfrm>
-          <a:prstGeom prst="rect">
-            <a:avLst/>
-          </a:prstGeom>
-          <a:noFill/>
-        </p:spPr>
-        <p:txBody>
-          <a:bodyPr wrap="square" rtlCol="0">
-            <a:spAutoFit/>
-          </a:bodyPr>
-          <a:lstStyle/>
-          <a:p>
-            <a:r>
-              <a:rPr lang="it-IT" sz="2000" dirty="0" smtClean="0"/>
-              <a:t>WATER PRESSURE AT THE BOTTOM OF THE DOMAIN  [m]</a:t>
-            </a:r>
-            <a:endParaRPr lang="it-IT" sz="2000" dirty="0"/>
-          </a:p>
-          <a:p>
-            <a:endParaRPr lang="it-IT" sz="2000" dirty="0"/>
-          </a:p>
-        </p:txBody>
-      </p:sp>
-      <p:cxnSp>
-        <p:nvCxnSpPr>
-          <p:cNvPr id="19" name="Connettore 2 18"/>
-          <p:cNvCxnSpPr/>
-          <p:nvPr/>
-        </p:nvCxnSpPr>
-        <p:spPr>
-          <a:xfrm flipH="1">
-            <a:off x="5257800" y="2403901"/>
-            <a:ext cx="533400" cy="609600"/>
-          </a:xfrm>
-          <a:prstGeom prst="straightConnector1">
-            <a:avLst/>
-          </a:prstGeom>
-          <a:ln w="57150">
-            <a:solidFill>
-              <a:srgbClr val="00B050"/>
-            </a:solidFill>
-            <a:tailEnd type="arrow"/>
-          </a:ln>
-        </p:spPr>
-        <p:style>
-          <a:lnRef idx="1">
-            <a:schemeClr val="accent1"/>
-          </a:lnRef>
-          <a:fillRef idx="0">
-            <a:schemeClr val="accent1"/>
-          </a:fillRef>
-          <a:effectRef idx="0">
-            <a:schemeClr val="accent1"/>
-          </a:effectRef>
-          <a:fontRef idx="minor">
-            <a:schemeClr val="tx1"/>
-          </a:fontRef>
-        </p:style>
-      </p:cxnSp>
       <p:pic>
         <p:nvPicPr>
-          <p:cNvPr id="10" name="Segnaposto contenuto 4"/>
+          <p:cNvPr id="3" name="Immagine 2"/>
           <p:cNvPicPr>
             <a:picLocks noChangeAspect="1"/>
           </p:cNvPicPr>
@@ -10572,64 +10373,18 @@
         </p:blipFill>
         <p:spPr>
           <a:xfrm>
-            <a:off x="685800" y="1828800"/>
-            <a:ext cx="4257833" cy="4025261"/>
+            <a:off x="3623337" y="1389597"/>
+            <a:ext cx="2221651" cy="4921572"/>
           </a:xfrm>
           <a:prstGeom prst="rect">
             <a:avLst/>
           </a:prstGeom>
         </p:spPr>
       </p:pic>
-      <p:sp>
-        <p:nvSpPr>
-          <p:cNvPr id="16" name="Rettangolo 15"/>
-          <p:cNvSpPr/>
-          <p:nvPr/>
-        </p:nvSpPr>
-        <p:spPr>
-          <a:xfrm>
-            <a:off x="3276600" y="3048000"/>
-            <a:ext cx="1981200" cy="3084493"/>
-          </a:xfrm>
-          <a:prstGeom prst="rect">
-            <a:avLst/>
-          </a:prstGeom>
-          <a:noFill/>
-          <a:ln w="50800">
-            <a:solidFill>
-              <a:srgbClr val="00B050"/>
-            </a:solidFill>
-          </a:ln>
-        </p:spPr>
-        <p:style>
-          <a:lnRef idx="2">
-            <a:schemeClr val="accent1">
-              <a:shade val="50000"/>
-            </a:schemeClr>
-          </a:lnRef>
-          <a:fillRef idx="1">
-            <a:schemeClr val="accent1"/>
-          </a:fillRef>
-          <a:effectRef idx="0">
-            <a:schemeClr val="accent1"/>
-          </a:effectRef>
-          <a:fontRef idx="minor">
-            <a:schemeClr val="lt1"/>
-          </a:fontRef>
-        </p:style>
-        <p:txBody>
-          <a:bodyPr rtlCol="0" anchor="ctr"/>
-          <a:lstStyle/>
-          <a:p>
-            <a:pPr algn="ctr"/>
-            <a:endParaRPr lang="it-IT" dirty="0"/>
-          </a:p>
-        </p:txBody>
-      </p:sp>
     </p:spTree>
     <p:extLst>
       <p:ext uri="{BB962C8B-B14F-4D97-AF65-F5344CB8AC3E}">
-        <p14:creationId xmlns:p14="http://schemas.microsoft.com/office/powerpoint/2010/main" val="3893143138"/>
+        <p14:creationId xmlns:p14="http://schemas.microsoft.com/office/powerpoint/2010/main" val="1491247893"/>
       </p:ext>
     </p:extLst>
   </p:cSld>
@@ -10664,36 +10419,6 @@
           <a:chExt cx="0" cy="0"/>
         </a:xfrm>
       </p:grpSpPr>
-      <p:pic>
-        <p:nvPicPr>
-          <p:cNvPr id="3" name="Immagine 2"/>
-          <p:cNvPicPr>
-            <a:picLocks noChangeAspect="1"/>
-          </p:cNvPicPr>
-          <p:nvPr/>
-        </p:nvPicPr>
-        <p:blipFill>
-          <a:blip r:embed="rId2">
-            <a:extLst>
-              <a:ext uri="{28A0092B-C50C-407E-A947-70E740481C1C}">
-                <a14:useLocalDpi xmlns:a14="http://schemas.microsoft.com/office/drawing/2010/main" val="0"/>
-              </a:ext>
-            </a:extLst>
-          </a:blip>
-          <a:stretch>
-            <a:fillRect/>
-          </a:stretch>
-        </p:blipFill>
-        <p:spPr>
-          <a:xfrm>
-            <a:off x="660820" y="3396165"/>
-            <a:ext cx="5130380" cy="2185831"/>
-          </a:xfrm>
-          <a:prstGeom prst="rect">
-            <a:avLst/>
-          </a:prstGeom>
-        </p:spPr>
-      </p:pic>
       <p:sp>
         <p:nvSpPr>
           <p:cNvPr id="154" name="Shape 154"/>
@@ -10834,7 +10559,7 @@
         <p:spPr>
           <a:xfrm>
             <a:off x="1708712" y="524867"/>
-            <a:ext cx="5726575" cy="400110"/>
+            <a:ext cx="5726575" cy="707886"/>
           </a:xfrm>
           <a:prstGeom prst="rect">
             <a:avLst/>
@@ -10850,7 +10575,26 @@
             <a:pPr algn="ctr"/>
             <a:r>
               <a:rPr lang="it-IT" sz="2000" dirty="0" smtClean="0"/>
-              <a:t>WATER PRESSURE OUTPUT FILE</a:t>
+              <a:t>INPUT </a:t>
+            </a:r>
+            <a:r>
+              <a:rPr lang="it-IT" sz="2000" dirty="0"/>
+              <a:t>FILE </a:t>
+            </a:r>
+            <a:r>
+              <a:rPr lang="it-IT" sz="2000" dirty="0" smtClean="0"/>
+              <a:t>FOR</a:t>
+            </a:r>
+            <a:r>
+              <a:rPr lang="it-IT" sz="2000" dirty="0"/>
+              <a:t/>
+            </a:r>
+            <a:br>
+              <a:rPr lang="it-IT" sz="2000" dirty="0"/>
+            </a:br>
+            <a:r>
+              <a:rPr lang="it-IT" sz="2000" dirty="0" smtClean="0"/>
+              <a:t>THE SOURCE/SINK TERM</a:t>
             </a:r>
             <a:endParaRPr lang="en-GB" sz="2000" dirty="0"/>
           </a:p>
@@ -10858,14 +10602,14 @@
       </p:sp>
       <p:sp>
         <p:nvSpPr>
-          <p:cNvPr id="11" name="CasellaDiTesto 10"/>
+          <p:cNvPr id="15" name="CasellaDiTesto 14"/>
           <p:cNvSpPr txBox="1"/>
           <p:nvPr/>
         </p:nvSpPr>
         <p:spPr>
           <a:xfrm>
-            <a:off x="484188" y="1111626"/>
-            <a:ext cx="4038600" cy="707886"/>
+            <a:off x="228600" y="1905000"/>
+            <a:ext cx="7315200" cy="1692771"/>
           </a:xfrm>
           <a:prstGeom prst="rect">
             <a:avLst/>
@@ -10881,150 +10625,53 @@
             <a:pPr algn="just"/>
             <a:r>
               <a:rPr lang="it-IT" sz="2000" dirty="0" smtClean="0"/>
-              <a:t>TIME AT WHICH THE SOLUTION IS COMPUTED</a:t>
-            </a:r>
-            <a:endParaRPr lang="it-IT" sz="2000" dirty="0"/>
-          </a:p>
-        </p:txBody>
-      </p:sp>
-      <p:sp>
-        <p:nvSpPr>
-          <p:cNvPr id="12" name="Rettangolo 11"/>
-          <p:cNvSpPr/>
-          <p:nvPr/>
-        </p:nvSpPr>
-        <p:spPr>
-          <a:xfrm>
-            <a:off x="398069" y="3135729"/>
-            <a:ext cx="3537419" cy="569893"/>
-          </a:xfrm>
-          <a:prstGeom prst="rect">
-            <a:avLst/>
-          </a:prstGeom>
-          <a:noFill/>
-          <a:ln w="50800">
-            <a:solidFill>
-              <a:srgbClr val="00B050"/>
-            </a:solidFill>
-          </a:ln>
-        </p:spPr>
-        <p:style>
-          <a:lnRef idx="2">
-            <a:schemeClr val="accent1">
-              <a:shade val="50000"/>
-            </a:schemeClr>
-          </a:lnRef>
-          <a:fillRef idx="1">
-            <a:schemeClr val="accent1"/>
-          </a:fillRef>
-          <a:effectRef idx="0">
-            <a:schemeClr val="accent1"/>
-          </a:effectRef>
-          <a:fontRef idx="minor">
-            <a:schemeClr val="lt1"/>
-          </a:fontRef>
-        </p:style>
-        <p:txBody>
-          <a:bodyPr rtlCol="0" anchor="ctr"/>
-          <a:lstStyle/>
-          <a:p>
-            <a:pPr algn="ctr"/>
-            <a:endParaRPr lang="it-IT" dirty="0"/>
-          </a:p>
-        </p:txBody>
-      </p:sp>
-      <p:sp>
-        <p:nvSpPr>
-          <p:cNvPr id="13" name="Rettangolo 12"/>
-          <p:cNvSpPr/>
-          <p:nvPr/>
-        </p:nvSpPr>
-        <p:spPr>
-          <a:xfrm>
-            <a:off x="331788" y="1111626"/>
-            <a:ext cx="4191000" cy="1219200"/>
-          </a:xfrm>
-          <a:prstGeom prst="rect">
-            <a:avLst/>
-          </a:prstGeom>
-          <a:noFill/>
-          <a:ln w="50800">
-            <a:solidFill>
-              <a:srgbClr val="00B050"/>
-            </a:solidFill>
-          </a:ln>
-        </p:spPr>
-        <p:style>
-          <a:lnRef idx="2">
-            <a:schemeClr val="accent1">
-              <a:shade val="50000"/>
-            </a:schemeClr>
-          </a:lnRef>
-          <a:fillRef idx="1">
-            <a:schemeClr val="accent1"/>
-          </a:fillRef>
-          <a:effectRef idx="0">
-            <a:schemeClr val="accent1"/>
-          </a:effectRef>
-          <a:fontRef idx="minor">
-            <a:schemeClr val="lt1"/>
-          </a:fontRef>
-        </p:style>
-        <p:txBody>
-          <a:bodyPr rtlCol="0" anchor="ctr"/>
-          <a:lstStyle/>
-          <a:p>
-            <a:pPr algn="ctr"/>
-            <a:endParaRPr lang="it-IT" dirty="0"/>
-          </a:p>
-        </p:txBody>
-      </p:sp>
-      <p:cxnSp>
-        <p:nvCxnSpPr>
-          <p:cNvPr id="20" name="Connettore 2 19"/>
-          <p:cNvCxnSpPr/>
-          <p:nvPr/>
-        </p:nvCxnSpPr>
-        <p:spPr>
-          <a:xfrm>
-            <a:off x="1703388" y="2407026"/>
-            <a:ext cx="0" cy="609600"/>
-          </a:xfrm>
-          <a:prstGeom prst="straightConnector1">
-            <a:avLst/>
-          </a:prstGeom>
-          <a:ln w="57150">
-            <a:solidFill>
-              <a:srgbClr val="00B050"/>
-            </a:solidFill>
-            <a:tailEnd type="arrow"/>
-          </a:ln>
-        </p:spPr>
-        <p:style>
-          <a:lnRef idx="1">
-            <a:schemeClr val="accent1"/>
-          </a:lnRef>
-          <a:fillRef idx="0">
-            <a:schemeClr val="accent1"/>
-          </a:fillRef>
-          <a:effectRef idx="0">
-            <a:schemeClr val="accent1"/>
-          </a:effectRef>
-          <a:fontRef idx="minor">
-            <a:schemeClr val="tx1"/>
-          </a:fontRef>
-        </p:style>
-      </p:cxnSp>
-      <p:sp>
-        <p:nvSpPr>
-          <p:cNvPr id="21" name="CasellaDiTesto 20"/>
+              <a:t>THE FIRST LINE REFERS TO THE DEEPEST LAYER.</a:t>
+            </a:r>
+          </a:p>
+          <a:p>
+            <a:pPr algn="just"/>
+            <a:endParaRPr lang="it-IT" sz="2000" dirty="0" smtClean="0"/>
+          </a:p>
+          <a:p>
+            <a:pPr algn="just"/>
+            <a:r>
+              <a:rPr lang="it-IT" sz="2000" dirty="0" smtClean="0"/>
+              <a:t>THE DEPTH OF THE DEEPEST LAYER IS ALWAYS SMALLER THAN  </a:t>
+            </a:r>
+            <a:r>
+              <a:rPr lang="it-IT" sz="2000" i="1" dirty="0" err="1" smtClean="0">
+                <a:solidFill>
+                  <a:srgbClr val="0070C0"/>
+                </a:solidFill>
+              </a:rPr>
+              <a:t>spaceBottom</a:t>
+            </a:r>
+            <a:endParaRPr lang="it-IT" sz="2000" i="1" dirty="0" smtClean="0">
+              <a:solidFill>
+                <a:srgbClr val="0070C0"/>
+              </a:solidFill>
+            </a:endParaRPr>
+          </a:p>
+          <a:p>
+            <a:pPr algn="just"/>
+            <a:endParaRPr lang="it-IT" sz="2400" i="1" dirty="0">
+              <a:solidFill>
+                <a:srgbClr val="0070C0"/>
+              </a:solidFill>
+            </a:endParaRPr>
+          </a:p>
+        </p:txBody>
+      </p:sp>
+      <p:sp>
+        <p:nvSpPr>
+          <p:cNvPr id="16" name="CasellaDiTesto 15"/>
           <p:cNvSpPr txBox="1"/>
           <p:nvPr/>
         </p:nvSpPr>
         <p:spPr>
           <a:xfrm>
-            <a:off x="439264" y="5979458"/>
-            <a:ext cx="2403143" cy="400110"/>
+            <a:off x="1976651" y="4267200"/>
+            <a:ext cx="6858000" cy="1323439"/>
           </a:xfrm>
           <a:prstGeom prst="rect">
             <a:avLst/>
@@ -11037,304 +10684,41 @@
           </a:bodyPr>
           <a:lstStyle/>
           <a:p>
+            <a:pPr algn="just"/>
             <a:r>
               <a:rPr lang="it-IT" sz="2000" dirty="0" smtClean="0"/>
-              <a:t>DEPTH [m]</a:t>
-            </a:r>
+              <a:t>THE LAST LINE REFERS TO THE UPPERMOST LAYER.  </a:t>
+            </a:r>
+          </a:p>
+          <a:p>
+            <a:pPr algn="just"/>
             <a:endParaRPr lang="it-IT" sz="2000" dirty="0"/>
           </a:p>
-        </p:txBody>
-      </p:sp>
-      <p:sp>
-        <p:nvSpPr>
-          <p:cNvPr id="22" name="CasellaDiTesto 21"/>
-          <p:cNvSpPr txBox="1"/>
-          <p:nvPr/>
-        </p:nvSpPr>
-        <p:spPr>
-          <a:xfrm>
-            <a:off x="4665270" y="5997406"/>
-            <a:ext cx="2900915" cy="400110"/>
-          </a:xfrm>
-          <a:prstGeom prst="rect">
-            <a:avLst/>
-          </a:prstGeom>
-          <a:noFill/>
-        </p:spPr>
-        <p:txBody>
-          <a:bodyPr wrap="square" rtlCol="0">
-            <a:spAutoFit/>
-          </a:bodyPr>
-          <a:lstStyle/>
-          <a:p>
+          <a:p>
+            <a:pPr algn="just"/>
             <a:r>
               <a:rPr lang="it-IT" sz="2000" dirty="0" smtClean="0"/>
-              <a:t>WATER PRESSURE [m]</a:t>
-            </a:r>
+              <a:t>THIS DEPTH IS ALWAYS GRATER THAN </a:t>
+            </a:r>
+            <a:r>
+              <a:rPr lang="it-IT" sz="2000" i="1" dirty="0" smtClean="0">
+                <a:solidFill>
+                  <a:srgbClr val="0070C0"/>
+                </a:solidFill>
+              </a:rPr>
+              <a:t>0m</a:t>
+            </a:r>
+          </a:p>
+          <a:p>
+            <a:pPr algn="just"/>
             <a:endParaRPr lang="it-IT" sz="2000" dirty="0"/>
           </a:p>
         </p:txBody>
       </p:sp>
-      <p:sp>
-        <p:nvSpPr>
-          <p:cNvPr id="23" name="Rettangolo 22"/>
-          <p:cNvSpPr/>
-          <p:nvPr/>
-        </p:nvSpPr>
-        <p:spPr>
-          <a:xfrm>
-            <a:off x="3930181" y="5912226"/>
-            <a:ext cx="3537419" cy="569893"/>
-          </a:xfrm>
-          <a:prstGeom prst="rect">
-            <a:avLst/>
-          </a:prstGeom>
-          <a:noFill/>
-          <a:ln w="50800">
-            <a:solidFill>
-              <a:srgbClr val="0070C0"/>
-            </a:solidFill>
-          </a:ln>
-        </p:spPr>
-        <p:style>
-          <a:lnRef idx="2">
-            <a:schemeClr val="accent1">
-              <a:shade val="50000"/>
-            </a:schemeClr>
-          </a:lnRef>
-          <a:fillRef idx="1">
-            <a:schemeClr val="accent1"/>
-          </a:fillRef>
-          <a:effectRef idx="0">
-            <a:schemeClr val="accent1"/>
-          </a:effectRef>
-          <a:fontRef idx="minor">
-            <a:schemeClr val="lt1"/>
-          </a:fontRef>
-        </p:style>
-        <p:txBody>
-          <a:bodyPr rtlCol="0" anchor="ctr"/>
-          <a:lstStyle/>
-          <a:p>
-            <a:pPr algn="ctr"/>
-            <a:endParaRPr lang="it-IT" dirty="0"/>
-          </a:p>
-        </p:txBody>
-      </p:sp>
-      <p:sp>
-        <p:nvSpPr>
-          <p:cNvPr id="24" name="Rettangolo 23"/>
-          <p:cNvSpPr/>
-          <p:nvPr/>
-        </p:nvSpPr>
-        <p:spPr>
-          <a:xfrm>
-            <a:off x="1981200" y="3778626"/>
-            <a:ext cx="4419600" cy="1803370"/>
-          </a:xfrm>
-          <a:prstGeom prst="rect">
-            <a:avLst/>
-          </a:prstGeom>
-          <a:noFill/>
-          <a:ln w="50800">
-            <a:solidFill>
-              <a:srgbClr val="0070C0"/>
-            </a:solidFill>
-          </a:ln>
-        </p:spPr>
-        <p:style>
-          <a:lnRef idx="2">
-            <a:schemeClr val="accent1">
-              <a:shade val="50000"/>
-            </a:schemeClr>
-          </a:lnRef>
-          <a:fillRef idx="1">
-            <a:schemeClr val="accent1"/>
-          </a:fillRef>
-          <a:effectRef idx="0">
-            <a:schemeClr val="accent1"/>
-          </a:effectRef>
-          <a:fontRef idx="minor">
-            <a:schemeClr val="lt1"/>
-          </a:fontRef>
-        </p:style>
-        <p:txBody>
-          <a:bodyPr rtlCol="0" anchor="ctr"/>
-          <a:lstStyle/>
-          <a:p>
-            <a:pPr algn="ctr"/>
-            <a:endParaRPr lang="it-IT" dirty="0"/>
-          </a:p>
-        </p:txBody>
-      </p:sp>
-      <p:cxnSp>
-        <p:nvCxnSpPr>
-          <p:cNvPr id="25" name="Connettore 2 24"/>
-          <p:cNvCxnSpPr/>
-          <p:nvPr/>
-        </p:nvCxnSpPr>
-        <p:spPr>
-          <a:xfrm>
-            <a:off x="5867400" y="5455026"/>
-            <a:ext cx="0" cy="424033"/>
-          </a:xfrm>
-          <a:prstGeom prst="straightConnector1">
-            <a:avLst/>
-          </a:prstGeom>
-          <a:ln w="57150">
-            <a:solidFill>
-              <a:srgbClr val="0070C0"/>
-            </a:solidFill>
-            <a:tailEnd type="arrow"/>
-          </a:ln>
-        </p:spPr>
-        <p:style>
-          <a:lnRef idx="1">
-            <a:schemeClr val="accent1"/>
-          </a:lnRef>
-          <a:fillRef idx="0">
-            <a:schemeClr val="accent1"/>
-          </a:fillRef>
-          <a:effectRef idx="0">
-            <a:schemeClr val="accent1"/>
-          </a:effectRef>
-          <a:fontRef idx="minor">
-            <a:schemeClr val="tx1"/>
-          </a:fontRef>
-        </p:style>
-      </p:cxnSp>
-      <p:sp>
-        <p:nvSpPr>
-          <p:cNvPr id="26" name="Rettangolo 25"/>
-          <p:cNvSpPr/>
-          <p:nvPr/>
-        </p:nvSpPr>
-        <p:spPr>
-          <a:xfrm>
-            <a:off x="-15922" y="5879059"/>
-            <a:ext cx="3537419" cy="569893"/>
-          </a:xfrm>
-          <a:prstGeom prst="rect">
-            <a:avLst/>
-          </a:prstGeom>
-          <a:noFill/>
-          <a:ln w="50800">
-            <a:solidFill>
-              <a:srgbClr val="FF0000"/>
-            </a:solidFill>
-          </a:ln>
-        </p:spPr>
-        <p:style>
-          <a:lnRef idx="2">
-            <a:schemeClr val="accent1">
-              <a:shade val="50000"/>
-            </a:schemeClr>
-          </a:lnRef>
-          <a:fillRef idx="1">
-            <a:schemeClr val="accent1"/>
-          </a:fillRef>
-          <a:effectRef idx="0">
-            <a:schemeClr val="accent1"/>
-          </a:effectRef>
-          <a:fontRef idx="minor">
-            <a:schemeClr val="lt1"/>
-          </a:fontRef>
-        </p:style>
-        <p:txBody>
-          <a:bodyPr rtlCol="0" anchor="ctr"/>
-          <a:lstStyle/>
-          <a:p>
-            <a:pPr algn="ctr"/>
-            <a:endParaRPr lang="it-IT" dirty="0"/>
-          </a:p>
-        </p:txBody>
-      </p:sp>
-      <p:sp>
-        <p:nvSpPr>
-          <p:cNvPr id="27" name="Rettangolo 26"/>
-          <p:cNvSpPr/>
-          <p:nvPr/>
-        </p:nvSpPr>
-        <p:spPr>
-          <a:xfrm>
-            <a:off x="376516" y="3778626"/>
-            <a:ext cx="1616497" cy="1803370"/>
-          </a:xfrm>
-          <a:prstGeom prst="rect">
-            <a:avLst/>
-          </a:prstGeom>
-          <a:noFill/>
-          <a:ln w="50800">
-            <a:solidFill>
-              <a:srgbClr val="FF0000"/>
-            </a:solidFill>
-          </a:ln>
-        </p:spPr>
-        <p:style>
-          <a:lnRef idx="2">
-            <a:schemeClr val="accent1">
-              <a:shade val="50000"/>
-            </a:schemeClr>
-          </a:lnRef>
-          <a:fillRef idx="1">
-            <a:schemeClr val="accent1"/>
-          </a:fillRef>
-          <a:effectRef idx="0">
-            <a:schemeClr val="accent1"/>
-          </a:effectRef>
-          <a:fontRef idx="minor">
-            <a:schemeClr val="lt1"/>
-          </a:fontRef>
-        </p:style>
-        <p:txBody>
-          <a:bodyPr rtlCol="0" anchor="ctr"/>
-          <a:lstStyle/>
-          <a:p>
-            <a:pPr algn="ctr"/>
-            <a:endParaRPr lang="it-IT" dirty="0"/>
-          </a:p>
-        </p:txBody>
-      </p:sp>
-      <p:cxnSp>
-        <p:nvCxnSpPr>
-          <p:cNvPr id="28" name="Connettore 2 27"/>
-          <p:cNvCxnSpPr/>
-          <p:nvPr/>
-        </p:nvCxnSpPr>
-        <p:spPr>
-          <a:xfrm>
-            <a:off x="1371600" y="5345659"/>
-            <a:ext cx="0" cy="609600"/>
-          </a:xfrm>
-          <a:prstGeom prst="straightConnector1">
-            <a:avLst/>
-          </a:prstGeom>
-          <a:ln w="57150">
-            <a:solidFill>
-              <a:srgbClr val="FF0000"/>
-            </a:solidFill>
-            <a:tailEnd type="arrow"/>
-          </a:ln>
-        </p:spPr>
-        <p:style>
-          <a:lnRef idx="1">
-            <a:schemeClr val="accent1"/>
-          </a:lnRef>
-          <a:fillRef idx="0">
-            <a:schemeClr val="accent1"/>
-          </a:fillRef>
-          <a:effectRef idx="0">
-            <a:schemeClr val="accent1"/>
-          </a:effectRef>
-          <a:fontRef idx="minor">
-            <a:schemeClr val="tx1"/>
-          </a:fontRef>
-        </p:style>
-      </p:cxnSp>
     </p:spTree>
     <p:extLst>
       <p:ext uri="{BB962C8B-B14F-4D97-AF65-F5344CB8AC3E}">
-        <p14:creationId xmlns:p14="http://schemas.microsoft.com/office/powerpoint/2010/main" val="3867650883"/>
+        <p14:creationId xmlns:p14="http://schemas.microsoft.com/office/powerpoint/2010/main" val="688381796"/>
       </p:ext>
     </p:extLst>
   </p:cSld>
@@ -11369,36 +10753,6 @@
           <a:chExt cx="0" cy="0"/>
         </a:xfrm>
       </p:grpSpPr>
-      <p:pic>
-        <p:nvPicPr>
-          <p:cNvPr id="4" name="Immagine 3"/>
-          <p:cNvPicPr>
-            <a:picLocks noChangeAspect="1"/>
-          </p:cNvPicPr>
-          <p:nvPr/>
-        </p:nvPicPr>
-        <p:blipFill>
-          <a:blip r:embed="rId2">
-            <a:extLst>
-              <a:ext uri="{28A0092B-C50C-407E-A947-70E740481C1C}">
-                <a14:useLocalDpi xmlns:a14="http://schemas.microsoft.com/office/drawing/2010/main" val="0"/>
-              </a:ext>
-            </a:extLst>
-          </a:blip>
-          <a:stretch>
-            <a:fillRect/>
-          </a:stretch>
-        </p:blipFill>
-        <p:spPr>
-          <a:xfrm>
-            <a:off x="468985" y="3140210"/>
-            <a:ext cx="4746844" cy="2216426"/>
-          </a:xfrm>
-          <a:prstGeom prst="rect">
-            <a:avLst/>
-          </a:prstGeom>
-        </p:spPr>
-      </p:pic>
       <p:sp>
         <p:nvSpPr>
           <p:cNvPr id="154" name="Shape 154"/>
@@ -11539,7 +10893,7 @@
         <p:spPr>
           <a:xfrm>
             <a:off x="1708712" y="524867"/>
-            <a:ext cx="5726575" cy="400110"/>
+            <a:ext cx="5726575" cy="707886"/>
           </a:xfrm>
           <a:prstGeom prst="rect">
             <a:avLst/>
@@ -11555,53 +10909,71 @@
             <a:pPr algn="ctr"/>
             <a:r>
               <a:rPr lang="it-IT" sz="2000" dirty="0" smtClean="0"/>
-              <a:t>WATER CONTENT OUTPUT FILE</a:t>
+              <a:t>INPUT </a:t>
+            </a:r>
+            <a:r>
+              <a:rPr lang="it-IT" sz="2000" dirty="0"/>
+              <a:t>FILE </a:t>
+            </a:r>
+            <a:r>
+              <a:rPr lang="it-IT" sz="2000" dirty="0" smtClean="0"/>
+              <a:t>FOR</a:t>
+            </a:r>
+            <a:r>
+              <a:rPr lang="it-IT" sz="2000" dirty="0"/>
+              <a:t/>
+            </a:r>
+            <a:br>
+              <a:rPr lang="it-IT" sz="2000" dirty="0"/>
+            </a:br>
+            <a:r>
+              <a:rPr lang="it-IT" sz="2000" dirty="0" smtClean="0"/>
+              <a:t>THE TOP BOUNDARY CONDITION</a:t>
             </a:r>
             <a:endParaRPr lang="en-GB" sz="2000" dirty="0"/>
           </a:p>
         </p:txBody>
       </p:sp>
-      <p:sp>
-        <p:nvSpPr>
-          <p:cNvPr id="11" name="CasellaDiTesto 10"/>
-          <p:cNvSpPr txBox="1"/>
-          <p:nvPr/>
-        </p:nvSpPr>
-        <p:spPr>
-          <a:xfrm>
-            <a:off x="1039987" y="1039910"/>
-            <a:ext cx="4038600" cy="707886"/>
-          </a:xfrm>
-          <a:prstGeom prst="rect">
-            <a:avLst/>
-          </a:prstGeom>
-          <a:noFill/>
-        </p:spPr>
-        <p:txBody>
-          <a:bodyPr wrap="square" rtlCol="0">
-            <a:spAutoFit/>
-          </a:bodyPr>
-          <a:lstStyle/>
-          <a:p>
-            <a:pPr algn="just"/>
-            <a:r>
-              <a:rPr lang="it-IT" sz="2000" dirty="0" smtClean="0"/>
-              <a:t>TIME AT WHICH THE SOLUTION IS COMPUTED</a:t>
-            </a:r>
-            <a:endParaRPr lang="it-IT" sz="2000" dirty="0"/>
-          </a:p>
-        </p:txBody>
-      </p:sp>
-      <p:sp>
-        <p:nvSpPr>
-          <p:cNvPr id="12" name="Rettangolo 11"/>
+      <p:pic>
+        <p:nvPicPr>
+          <p:cNvPr id="15" name="Segnaposto contenuto 4"/>
+          <p:cNvPicPr>
+            <a:picLocks noChangeAspect="1"/>
+          </p:cNvPicPr>
+          <p:nvPr/>
+        </p:nvPicPr>
+        <p:blipFill>
+          <a:blip r:embed="rId2">
+            <a:extLst>
+              <a:ext uri="{28A0092B-C50C-407E-A947-70E740481C1C}">
+                <a14:useLocalDpi xmlns:a14="http://schemas.microsoft.com/office/drawing/2010/main" val="0"/>
+              </a:ext>
+            </a:extLst>
+          </a:blip>
+          <a:stretch>
+            <a:fillRect/>
+          </a:stretch>
+        </p:blipFill>
+        <p:spPr>
+          <a:xfrm>
+            <a:off x="533400" y="1371600"/>
+            <a:ext cx="4495800" cy="4720590"/>
+          </a:xfrm>
+          <a:prstGeom prst="rect">
+            <a:avLst/>
+          </a:prstGeom>
+        </p:spPr>
+      </p:pic>
+      <p:sp>
+        <p:nvSpPr>
+          <p:cNvPr id="16" name="Rettangolo 15"/>
           <p:cNvSpPr/>
           <p:nvPr/>
         </p:nvSpPr>
         <p:spPr>
           <a:xfrm>
-            <a:off x="321968" y="2868710"/>
-            <a:ext cx="3537419" cy="569893"/>
+            <a:off x="3276600" y="3048000"/>
+            <a:ext cx="1981200" cy="3084493"/>
           </a:xfrm>
           <a:prstGeom prst="rect">
             <a:avLst/>
@@ -11640,14 +11012,14 @@
       </p:sp>
       <p:sp>
         <p:nvSpPr>
-          <p:cNvPr id="13" name="Rettangolo 12"/>
+          <p:cNvPr id="17" name="Rettangolo 16"/>
           <p:cNvSpPr/>
           <p:nvPr/>
         </p:nvSpPr>
         <p:spPr>
           <a:xfrm>
-            <a:off x="887587" y="1039910"/>
-            <a:ext cx="4191000" cy="1219200"/>
+            <a:off x="5791200" y="1828800"/>
+            <a:ext cx="3124200" cy="1219200"/>
           </a:xfrm>
           <a:prstGeom prst="rect">
             <a:avLst/>
@@ -11684,16 +11056,46 @@
           </a:p>
         </p:txBody>
       </p:sp>
+      <p:sp>
+        <p:nvSpPr>
+          <p:cNvPr id="18" name="CasellaDiTesto 17"/>
+          <p:cNvSpPr txBox="1"/>
+          <p:nvPr/>
+        </p:nvSpPr>
+        <p:spPr>
+          <a:xfrm>
+            <a:off x="5970490" y="2203551"/>
+            <a:ext cx="3041176" cy="400110"/>
+          </a:xfrm>
+          <a:prstGeom prst="rect">
+            <a:avLst/>
+          </a:prstGeom>
+          <a:noFill/>
+        </p:spPr>
+        <p:txBody>
+          <a:bodyPr wrap="square" rtlCol="0">
+            <a:spAutoFit/>
+          </a:bodyPr>
+          <a:lstStyle/>
+          <a:p>
+            <a:r>
+              <a:rPr lang="it-IT" sz="2000" dirty="0" smtClean="0"/>
+              <a:t>RAINFALL HEIGHT [mm]</a:t>
+            </a:r>
+            <a:endParaRPr lang="it-IT" sz="2000" dirty="0"/>
+          </a:p>
+        </p:txBody>
+      </p:sp>
       <p:cxnSp>
         <p:nvCxnSpPr>
-          <p:cNvPr id="20" name="Connettore 2 19"/>
+          <p:cNvPr id="19" name="Connettore 2 18"/>
           <p:cNvCxnSpPr/>
           <p:nvPr/>
         </p:nvCxnSpPr>
         <p:spPr>
-          <a:xfrm>
-            <a:off x="2259187" y="2335310"/>
-            <a:ext cx="0" cy="609600"/>
+          <a:xfrm flipH="1">
+            <a:off x="5257800" y="2403901"/>
+            <a:ext cx="533400" cy="609600"/>
           </a:xfrm>
           <a:prstGeom prst="straightConnector1">
             <a:avLst/>
@@ -11720,330 +11122,10 @@
           </a:fontRef>
         </p:style>
       </p:cxnSp>
-      <p:sp>
-        <p:nvSpPr>
-          <p:cNvPr id="21" name="CasellaDiTesto 20"/>
-          <p:cNvSpPr txBox="1"/>
-          <p:nvPr/>
-        </p:nvSpPr>
-        <p:spPr>
-          <a:xfrm>
-            <a:off x="439264" y="5943600"/>
-            <a:ext cx="2403143" cy="400110"/>
-          </a:xfrm>
-          <a:prstGeom prst="rect">
-            <a:avLst/>
-          </a:prstGeom>
-          <a:noFill/>
-        </p:spPr>
-        <p:txBody>
-          <a:bodyPr wrap="square" rtlCol="0">
-            <a:spAutoFit/>
-          </a:bodyPr>
-          <a:lstStyle/>
-          <a:p>
-            <a:r>
-              <a:rPr lang="it-IT" sz="2000" dirty="0" smtClean="0"/>
-              <a:t>DEPTH [m]</a:t>
-            </a:r>
-            <a:endParaRPr lang="it-IT" sz="2000" dirty="0"/>
-          </a:p>
-        </p:txBody>
-      </p:sp>
-      <p:sp>
-        <p:nvSpPr>
-          <p:cNvPr id="22" name="CasellaDiTesto 21"/>
-          <p:cNvSpPr txBox="1"/>
-          <p:nvPr/>
-        </p:nvSpPr>
-        <p:spPr>
-          <a:xfrm>
-            <a:off x="4352361" y="5907761"/>
-            <a:ext cx="3200400" cy="400110"/>
-          </a:xfrm>
-          <a:prstGeom prst="rect">
-            <a:avLst/>
-          </a:prstGeom>
-          <a:noFill/>
-        </p:spPr>
-        <p:txBody>
-          <a:bodyPr wrap="square" rtlCol="0">
-            <a:spAutoFit/>
-          </a:bodyPr>
-          <a:lstStyle/>
-          <a:p>
-            <a:r>
-              <a:rPr lang="it-IT" sz="2000" smtClean="0"/>
-              <a:t>WATER CONTENT </a:t>
-            </a:r>
-            <a:r>
-              <a:rPr lang="it-IT" sz="2000" dirty="0" smtClean="0"/>
-              <a:t>[-]</a:t>
-            </a:r>
-            <a:endParaRPr lang="it-IT" sz="2000" dirty="0"/>
-          </a:p>
-        </p:txBody>
-      </p:sp>
-      <p:sp>
-        <p:nvSpPr>
-          <p:cNvPr id="23" name="Rettangolo 22"/>
-          <p:cNvSpPr/>
-          <p:nvPr/>
-        </p:nvSpPr>
-        <p:spPr>
-          <a:xfrm>
-            <a:off x="3930181" y="5786723"/>
-            <a:ext cx="3537419" cy="569893"/>
-          </a:xfrm>
-          <a:prstGeom prst="rect">
-            <a:avLst/>
-          </a:prstGeom>
-          <a:noFill/>
-          <a:ln w="50800">
-            <a:solidFill>
-              <a:srgbClr val="0070C0"/>
-            </a:solidFill>
-          </a:ln>
-        </p:spPr>
-        <p:style>
-          <a:lnRef idx="2">
-            <a:schemeClr val="accent1">
-              <a:shade val="50000"/>
-            </a:schemeClr>
-          </a:lnRef>
-          <a:fillRef idx="1">
-            <a:schemeClr val="accent1"/>
-          </a:fillRef>
-          <a:effectRef idx="0">
-            <a:schemeClr val="accent1"/>
-          </a:effectRef>
-          <a:fontRef idx="minor">
-            <a:schemeClr val="lt1"/>
-          </a:fontRef>
-        </p:style>
-        <p:txBody>
-          <a:bodyPr rtlCol="0" anchor="ctr"/>
-          <a:lstStyle/>
-          <a:p>
-            <a:pPr algn="ctr"/>
-            <a:endParaRPr lang="it-IT" dirty="0"/>
-          </a:p>
-        </p:txBody>
-      </p:sp>
-      <p:sp>
-        <p:nvSpPr>
-          <p:cNvPr id="24" name="Rettangolo 23"/>
-          <p:cNvSpPr/>
-          <p:nvPr/>
-        </p:nvSpPr>
-        <p:spPr>
-          <a:xfrm>
-            <a:off x="1981200" y="3510319"/>
-            <a:ext cx="4419600" cy="1868507"/>
-          </a:xfrm>
-          <a:prstGeom prst="rect">
-            <a:avLst/>
-          </a:prstGeom>
-          <a:noFill/>
-          <a:ln w="50800">
-            <a:solidFill>
-              <a:srgbClr val="0070C0"/>
-            </a:solidFill>
-          </a:ln>
-        </p:spPr>
-        <p:style>
-          <a:lnRef idx="2">
-            <a:schemeClr val="accent1">
-              <a:shade val="50000"/>
-            </a:schemeClr>
-          </a:lnRef>
-          <a:fillRef idx="1">
-            <a:schemeClr val="accent1"/>
-          </a:fillRef>
-          <a:effectRef idx="0">
-            <a:schemeClr val="accent1"/>
-          </a:effectRef>
-          <a:fontRef idx="minor">
-            <a:schemeClr val="lt1"/>
-          </a:fontRef>
-        </p:style>
-        <p:txBody>
-          <a:bodyPr rtlCol="0" anchor="ctr"/>
-          <a:lstStyle/>
-          <a:p>
-            <a:pPr algn="ctr"/>
-            <a:endParaRPr lang="it-IT" dirty="0"/>
-          </a:p>
-        </p:txBody>
-      </p:sp>
-      <p:cxnSp>
-        <p:nvCxnSpPr>
-          <p:cNvPr id="25" name="Connettore 2 24"/>
-          <p:cNvCxnSpPr/>
-          <p:nvPr/>
-        </p:nvCxnSpPr>
-        <p:spPr>
-          <a:xfrm>
-            <a:off x="5867400" y="5455026"/>
-            <a:ext cx="0" cy="424033"/>
-          </a:xfrm>
-          <a:prstGeom prst="straightConnector1">
-            <a:avLst/>
-          </a:prstGeom>
-          <a:ln w="57150">
-            <a:solidFill>
-              <a:srgbClr val="0070C0"/>
-            </a:solidFill>
-            <a:tailEnd type="arrow"/>
-          </a:ln>
-        </p:spPr>
-        <p:style>
-          <a:lnRef idx="1">
-            <a:schemeClr val="accent1"/>
-          </a:lnRef>
-          <a:fillRef idx="0">
-            <a:schemeClr val="accent1"/>
-          </a:fillRef>
-          <a:effectRef idx="0">
-            <a:schemeClr val="accent1"/>
-          </a:effectRef>
-          <a:fontRef idx="minor">
-            <a:schemeClr val="tx1"/>
-          </a:fontRef>
-        </p:style>
-      </p:cxnSp>
-      <p:sp>
-        <p:nvSpPr>
-          <p:cNvPr id="26" name="Rettangolo 25"/>
-          <p:cNvSpPr/>
-          <p:nvPr/>
-        </p:nvSpPr>
-        <p:spPr>
-          <a:xfrm>
-            <a:off x="-15922" y="5807343"/>
-            <a:ext cx="3537419" cy="569893"/>
-          </a:xfrm>
-          <a:prstGeom prst="rect">
-            <a:avLst/>
-          </a:prstGeom>
-          <a:noFill/>
-          <a:ln w="50800">
-            <a:solidFill>
-              <a:srgbClr val="FF0000"/>
-            </a:solidFill>
-          </a:ln>
-        </p:spPr>
-        <p:style>
-          <a:lnRef idx="2">
-            <a:schemeClr val="accent1">
-              <a:shade val="50000"/>
-            </a:schemeClr>
-          </a:lnRef>
-          <a:fillRef idx="1">
-            <a:schemeClr val="accent1"/>
-          </a:fillRef>
-          <a:effectRef idx="0">
-            <a:schemeClr val="accent1"/>
-          </a:effectRef>
-          <a:fontRef idx="minor">
-            <a:schemeClr val="lt1"/>
-          </a:fontRef>
-        </p:style>
-        <p:txBody>
-          <a:bodyPr rtlCol="0" anchor="ctr"/>
-          <a:lstStyle/>
-          <a:p>
-            <a:pPr algn="ctr"/>
-            <a:endParaRPr lang="it-IT" dirty="0"/>
-          </a:p>
-        </p:txBody>
-      </p:sp>
-      <p:cxnSp>
-        <p:nvCxnSpPr>
-          <p:cNvPr id="28" name="Connettore 2 27"/>
-          <p:cNvCxnSpPr/>
-          <p:nvPr/>
-        </p:nvCxnSpPr>
-        <p:spPr>
-          <a:xfrm>
-            <a:off x="1371600" y="5345659"/>
-            <a:ext cx="0" cy="609600"/>
-          </a:xfrm>
-          <a:prstGeom prst="straightConnector1">
-            <a:avLst/>
-          </a:prstGeom>
-          <a:ln w="57150">
-            <a:solidFill>
-              <a:srgbClr val="FF0000"/>
-            </a:solidFill>
-            <a:tailEnd type="arrow"/>
-          </a:ln>
-        </p:spPr>
-        <p:style>
-          <a:lnRef idx="1">
-            <a:schemeClr val="accent1"/>
-          </a:lnRef>
-          <a:fillRef idx="0">
-            <a:schemeClr val="accent1"/>
-          </a:fillRef>
-          <a:effectRef idx="0">
-            <a:schemeClr val="accent1"/>
-          </a:effectRef>
-          <a:fontRef idx="minor">
-            <a:schemeClr val="tx1"/>
-          </a:fontRef>
-        </p:style>
-      </p:cxnSp>
-      <p:sp>
-        <p:nvSpPr>
-          <p:cNvPr id="27" name="Rettangolo 26"/>
-          <p:cNvSpPr/>
-          <p:nvPr/>
-        </p:nvSpPr>
-        <p:spPr>
-          <a:xfrm>
-            <a:off x="304800" y="3510320"/>
-            <a:ext cx="1616497" cy="1835340"/>
-          </a:xfrm>
-          <a:prstGeom prst="rect">
-            <a:avLst/>
-          </a:prstGeom>
-          <a:noFill/>
-          <a:ln w="50800">
-            <a:solidFill>
-              <a:srgbClr val="FF0000"/>
-            </a:solidFill>
-          </a:ln>
-        </p:spPr>
-        <p:style>
-          <a:lnRef idx="2">
-            <a:schemeClr val="accent1">
-              <a:shade val="50000"/>
-            </a:schemeClr>
-          </a:lnRef>
-          <a:fillRef idx="1">
-            <a:schemeClr val="accent1"/>
-          </a:fillRef>
-          <a:effectRef idx="0">
-            <a:schemeClr val="accent1"/>
-          </a:effectRef>
-          <a:fontRef idx="minor">
-            <a:schemeClr val="lt1"/>
-          </a:fontRef>
-        </p:style>
-        <p:txBody>
-          <a:bodyPr rtlCol="0" anchor="ctr"/>
-          <a:lstStyle/>
-          <a:p>
-            <a:pPr algn="ctr"/>
-            <a:endParaRPr lang="it-IT" dirty="0"/>
-          </a:p>
-        </p:txBody>
-      </p:sp>
     </p:spTree>
     <p:extLst>
       <p:ext uri="{BB962C8B-B14F-4D97-AF65-F5344CB8AC3E}">
-        <p14:creationId xmlns:p14="http://schemas.microsoft.com/office/powerpoint/2010/main" val="1826655048"/>
+        <p14:creationId xmlns:p14="http://schemas.microsoft.com/office/powerpoint/2010/main" val="2231745101"/>
       </p:ext>
     </p:extLst>
   </p:cSld>
@@ -12564,6 +11646,1826 @@
           <a:chExt cx="0" cy="0"/>
         </a:xfrm>
       </p:grpSpPr>
+      <p:sp>
+        <p:nvSpPr>
+          <p:cNvPr id="154" name="Shape 154"/>
+          <p:cNvSpPr/>
+          <p:nvPr/>
+        </p:nvSpPr>
+        <p:spPr>
+          <a:xfrm>
+            <a:off x="0" y="-8930"/>
+            <a:ext cx="7563445" cy="349131"/>
+          </a:xfrm>
+          <a:prstGeom prst="rect">
+            <a:avLst/>
+          </a:prstGeom>
+          <a:ln w="12700">
+            <a:miter lim="400000"/>
+          </a:ln>
+          <a:extLst>
+            <a:ext uri="{C572A759-6A51-4108-AA02-DFA0A04FC94B}">
+              <ma14:wrappingTextBoxFlag xmlns="" xmlns:ma14="http://schemas.microsoft.com/office/mac/drawingml/2011/main" val="1"/>
+            </a:ext>
+          </a:extLst>
+        </p:spPr>
+        <p:txBody>
+          <a:bodyPr lIns="35717" tIns="35717" rIns="35717" bIns="35717">
+            <a:spAutoFit/>
+          </a:bodyPr>
+          <a:lstStyle>
+            <a:lvl1pPr algn="l" defTabSz="647700">
+              <a:tabLst>
+                <a:tab pos="355600" algn="l"/>
+                <a:tab pos="711200" algn="l"/>
+                <a:tab pos="1079500" algn="l"/>
+                <a:tab pos="1435100" algn="l"/>
+                <a:tab pos="1790700" algn="l"/>
+                <a:tab pos="2159000" algn="l"/>
+                <a:tab pos="2514600" algn="l"/>
+                <a:tab pos="2870200" algn="l"/>
+                <a:tab pos="3238500" algn="l"/>
+                <a:tab pos="3594100" algn="l"/>
+                <a:tab pos="3949700" algn="l"/>
+                <a:tab pos="4318000" algn="l"/>
+              </a:tabLst>
+              <a:defRPr sz="1800">
+                <a:solidFill>
+                  <a:srgbClr val="F1FEF6"/>
+                </a:solidFill>
+                <a:latin typeface="Lucida Bright"/>
+                <a:ea typeface="Lucida Bright"/>
+                <a:cs typeface="Lucida Bright"/>
+                <a:sym typeface="Lucida Bright"/>
+              </a:defRPr>
+            </a:lvl1pPr>
+          </a:lstStyle>
+          <a:p>
+            <a:pPr algn="just"/>
+            <a:r>
+              <a:rPr lang="en-US" dirty="0" smtClean="0"/>
+              <a:t>Solving Richards’ equation with OMS console</a:t>
+            </a:r>
+            <a:endParaRPr lang="en-US" dirty="0"/>
+          </a:p>
+        </p:txBody>
+      </p:sp>
+      <p:sp>
+        <p:nvSpPr>
+          <p:cNvPr id="14" name="Shape 154"/>
+          <p:cNvSpPr/>
+          <p:nvPr/>
+        </p:nvSpPr>
+        <p:spPr>
+          <a:xfrm>
+            <a:off x="1049289" y="6508869"/>
+            <a:ext cx="2354957" cy="349131"/>
+          </a:xfrm>
+          <a:prstGeom prst="rect">
+            <a:avLst/>
+          </a:prstGeom>
+          <a:ln w="12700">
+            <a:miter lim="400000"/>
+          </a:ln>
+          <a:extLst>
+            <a:ext uri="{C572A759-6A51-4108-AA02-DFA0A04FC94B}">
+              <ma14:wrappingTextBoxFlag xmlns="" xmlns:ma14="http://schemas.microsoft.com/office/mac/drawingml/2011/main" val="1"/>
+            </a:ext>
+          </a:extLst>
+        </p:spPr>
+        <p:txBody>
+          <a:bodyPr wrap="square" lIns="35717" tIns="35717" rIns="35717" bIns="35717">
+            <a:spAutoFit/>
+          </a:bodyPr>
+          <a:lstStyle>
+            <a:lvl1pPr algn="l" defTabSz="647700">
+              <a:tabLst>
+                <a:tab pos="355600" algn="l"/>
+                <a:tab pos="711200" algn="l"/>
+                <a:tab pos="1079500" algn="l"/>
+                <a:tab pos="1435100" algn="l"/>
+                <a:tab pos="1790700" algn="l"/>
+                <a:tab pos="2159000" algn="l"/>
+                <a:tab pos="2514600" algn="l"/>
+                <a:tab pos="2870200" algn="l"/>
+                <a:tab pos="3238500" algn="l"/>
+                <a:tab pos="3594100" algn="l"/>
+                <a:tab pos="3949700" algn="l"/>
+                <a:tab pos="4318000" algn="l"/>
+              </a:tabLst>
+              <a:defRPr sz="1800">
+                <a:solidFill>
+                  <a:srgbClr val="F1FEF6"/>
+                </a:solidFill>
+                <a:latin typeface="Lucida Bright"/>
+                <a:ea typeface="Lucida Bright"/>
+                <a:cs typeface="Lucida Bright"/>
+                <a:sym typeface="Lucida Bright"/>
+              </a:defRPr>
+            </a:lvl1pPr>
+          </a:lstStyle>
+          <a:p>
+            <a:r>
+              <a:rPr lang="it-IT" dirty="0"/>
+              <a:t> </a:t>
+            </a:r>
+            <a:r>
+              <a:rPr lang="it-IT" dirty="0" smtClean="0"/>
+              <a:t>&amp;  N. Tubini</a:t>
+            </a:r>
+            <a:endParaRPr dirty="0"/>
+          </a:p>
+        </p:txBody>
+      </p:sp>
+      <p:sp>
+        <p:nvSpPr>
+          <p:cNvPr id="2" name="CasellaDiTesto 1"/>
+          <p:cNvSpPr txBox="1"/>
+          <p:nvPr/>
+        </p:nvSpPr>
+        <p:spPr>
+          <a:xfrm>
+            <a:off x="1708712" y="524867"/>
+            <a:ext cx="5726575" cy="707886"/>
+          </a:xfrm>
+          <a:prstGeom prst="rect">
+            <a:avLst/>
+          </a:prstGeom>
+          <a:noFill/>
+        </p:spPr>
+        <p:txBody>
+          <a:bodyPr wrap="square" rtlCol="0">
+            <a:spAutoFit/>
+          </a:bodyPr>
+          <a:lstStyle/>
+          <a:p>
+            <a:pPr algn="ctr"/>
+            <a:r>
+              <a:rPr lang="it-IT" sz="2000" dirty="0" smtClean="0"/>
+              <a:t>INPUT </a:t>
+            </a:r>
+            <a:r>
+              <a:rPr lang="it-IT" sz="2000" dirty="0"/>
+              <a:t>FILE </a:t>
+            </a:r>
+            <a:r>
+              <a:rPr lang="it-IT" sz="2000" dirty="0" smtClean="0"/>
+              <a:t>FOR</a:t>
+            </a:r>
+          </a:p>
+          <a:p>
+            <a:pPr algn="ctr"/>
+            <a:r>
+              <a:rPr lang="it-IT" sz="2000" dirty="0" smtClean="0"/>
+              <a:t>THE BOTTOM BOUNDARY CONDITION</a:t>
+            </a:r>
+            <a:endParaRPr lang="en-GB" sz="2000" dirty="0"/>
+          </a:p>
+        </p:txBody>
+      </p:sp>
+      <p:sp>
+        <p:nvSpPr>
+          <p:cNvPr id="17" name="Rettangolo 16"/>
+          <p:cNvSpPr/>
+          <p:nvPr/>
+        </p:nvSpPr>
+        <p:spPr>
+          <a:xfrm>
+            <a:off x="5791200" y="1828800"/>
+            <a:ext cx="3124200" cy="1219200"/>
+          </a:xfrm>
+          <a:prstGeom prst="rect">
+            <a:avLst/>
+          </a:prstGeom>
+          <a:noFill/>
+          <a:ln w="50800">
+            <a:solidFill>
+              <a:srgbClr val="00B050"/>
+            </a:solidFill>
+          </a:ln>
+        </p:spPr>
+        <p:style>
+          <a:lnRef idx="2">
+            <a:schemeClr val="accent1">
+              <a:shade val="50000"/>
+            </a:schemeClr>
+          </a:lnRef>
+          <a:fillRef idx="1">
+            <a:schemeClr val="accent1"/>
+          </a:fillRef>
+          <a:effectRef idx="0">
+            <a:schemeClr val="accent1"/>
+          </a:effectRef>
+          <a:fontRef idx="minor">
+            <a:schemeClr val="lt1"/>
+          </a:fontRef>
+        </p:style>
+        <p:txBody>
+          <a:bodyPr rtlCol="0" anchor="ctr"/>
+          <a:lstStyle/>
+          <a:p>
+            <a:pPr algn="ctr"/>
+            <a:endParaRPr lang="it-IT" dirty="0"/>
+          </a:p>
+        </p:txBody>
+      </p:sp>
+      <p:sp>
+        <p:nvSpPr>
+          <p:cNvPr id="18" name="CasellaDiTesto 17"/>
+          <p:cNvSpPr txBox="1"/>
+          <p:nvPr/>
+        </p:nvSpPr>
+        <p:spPr>
+          <a:xfrm>
+            <a:off x="5886499" y="1990161"/>
+            <a:ext cx="3041176" cy="1323439"/>
+          </a:xfrm>
+          <a:prstGeom prst="rect">
+            <a:avLst/>
+          </a:prstGeom>
+          <a:noFill/>
+        </p:spPr>
+        <p:txBody>
+          <a:bodyPr wrap="square" rtlCol="0">
+            <a:spAutoFit/>
+          </a:bodyPr>
+          <a:lstStyle/>
+          <a:p>
+            <a:r>
+              <a:rPr lang="it-IT" sz="2000" dirty="0" smtClean="0"/>
+              <a:t>WATER PRESSURE AT THE BOTTOM OF THE DOMAIN  [m]</a:t>
+            </a:r>
+            <a:endParaRPr lang="it-IT" sz="2000" dirty="0"/>
+          </a:p>
+          <a:p>
+            <a:endParaRPr lang="it-IT" sz="2000" dirty="0"/>
+          </a:p>
+        </p:txBody>
+      </p:sp>
+      <p:cxnSp>
+        <p:nvCxnSpPr>
+          <p:cNvPr id="19" name="Connettore 2 18"/>
+          <p:cNvCxnSpPr/>
+          <p:nvPr/>
+        </p:nvCxnSpPr>
+        <p:spPr>
+          <a:xfrm flipH="1">
+            <a:off x="5257800" y="2403901"/>
+            <a:ext cx="533400" cy="609600"/>
+          </a:xfrm>
+          <a:prstGeom prst="straightConnector1">
+            <a:avLst/>
+          </a:prstGeom>
+          <a:ln w="57150">
+            <a:solidFill>
+              <a:srgbClr val="00B050"/>
+            </a:solidFill>
+            <a:tailEnd type="arrow"/>
+          </a:ln>
+        </p:spPr>
+        <p:style>
+          <a:lnRef idx="1">
+            <a:schemeClr val="accent1"/>
+          </a:lnRef>
+          <a:fillRef idx="0">
+            <a:schemeClr val="accent1"/>
+          </a:fillRef>
+          <a:effectRef idx="0">
+            <a:schemeClr val="accent1"/>
+          </a:effectRef>
+          <a:fontRef idx="minor">
+            <a:schemeClr val="tx1"/>
+          </a:fontRef>
+        </p:style>
+      </p:cxnSp>
+      <p:pic>
+        <p:nvPicPr>
+          <p:cNvPr id="10" name="Segnaposto contenuto 4"/>
+          <p:cNvPicPr>
+            <a:picLocks noChangeAspect="1"/>
+          </p:cNvPicPr>
+          <p:nvPr/>
+        </p:nvPicPr>
+        <p:blipFill>
+          <a:blip r:embed="rId2">
+            <a:extLst>
+              <a:ext uri="{28A0092B-C50C-407E-A947-70E740481C1C}">
+                <a14:useLocalDpi xmlns:a14="http://schemas.microsoft.com/office/drawing/2010/main" val="0"/>
+              </a:ext>
+            </a:extLst>
+          </a:blip>
+          <a:stretch>
+            <a:fillRect/>
+          </a:stretch>
+        </p:blipFill>
+        <p:spPr>
+          <a:xfrm>
+            <a:off x="685800" y="1828800"/>
+            <a:ext cx="4257833" cy="4025261"/>
+          </a:xfrm>
+          <a:prstGeom prst="rect">
+            <a:avLst/>
+          </a:prstGeom>
+        </p:spPr>
+      </p:pic>
+      <p:sp>
+        <p:nvSpPr>
+          <p:cNvPr id="16" name="Rettangolo 15"/>
+          <p:cNvSpPr/>
+          <p:nvPr/>
+        </p:nvSpPr>
+        <p:spPr>
+          <a:xfrm>
+            <a:off x="3276600" y="3048000"/>
+            <a:ext cx="1981200" cy="3084493"/>
+          </a:xfrm>
+          <a:prstGeom prst="rect">
+            <a:avLst/>
+          </a:prstGeom>
+          <a:noFill/>
+          <a:ln w="50800">
+            <a:solidFill>
+              <a:srgbClr val="00B050"/>
+            </a:solidFill>
+          </a:ln>
+        </p:spPr>
+        <p:style>
+          <a:lnRef idx="2">
+            <a:schemeClr val="accent1">
+              <a:shade val="50000"/>
+            </a:schemeClr>
+          </a:lnRef>
+          <a:fillRef idx="1">
+            <a:schemeClr val="accent1"/>
+          </a:fillRef>
+          <a:effectRef idx="0">
+            <a:schemeClr val="accent1"/>
+          </a:effectRef>
+          <a:fontRef idx="minor">
+            <a:schemeClr val="lt1"/>
+          </a:fontRef>
+        </p:style>
+        <p:txBody>
+          <a:bodyPr rtlCol="0" anchor="ctr"/>
+          <a:lstStyle/>
+          <a:p>
+            <a:pPr algn="ctr"/>
+            <a:endParaRPr lang="it-IT" dirty="0"/>
+          </a:p>
+        </p:txBody>
+      </p:sp>
+    </p:spTree>
+    <p:extLst>
+      <p:ext uri="{BB962C8B-B14F-4D97-AF65-F5344CB8AC3E}">
+        <p14:creationId xmlns:p14="http://schemas.microsoft.com/office/powerpoint/2010/main" val="3893143138"/>
+      </p:ext>
+    </p:extLst>
+  </p:cSld>
+  <p:clrMapOvr>
+    <a:masterClrMapping/>
+  </p:clrMapOvr>
+  <p:transition spd="med"/>
+  <p:timing>
+    <p:tnLst>
+      <p:par>
+        <p:cTn id="1" dur="indefinite" restart="never" nodeType="tmRoot"/>
+      </p:par>
+    </p:tnLst>
+  </p:timing>
+</p:sld>
+</file>
+
+<file path=ppt/slides/slide31.xml><?xml version="1.0" encoding="utf-8"?>
+<p:sld xmlns:a="http://schemas.openxmlformats.org/drawingml/2006/main" xmlns:r="http://schemas.openxmlformats.org/officeDocument/2006/relationships" xmlns:p="http://schemas.openxmlformats.org/presentationml/2006/main">
+  <p:cSld>
+    <p:spTree>
+      <p:nvGrpSpPr>
+        <p:cNvPr id="1" name=""/>
+        <p:cNvGrpSpPr/>
+        <p:nvPr/>
+      </p:nvGrpSpPr>
+      <p:grpSpPr>
+        <a:xfrm>
+          <a:off x="0" y="0"/>
+          <a:ext cx="0" cy="0"/>
+          <a:chOff x="0" y="0"/>
+          <a:chExt cx="0" cy="0"/>
+        </a:xfrm>
+      </p:grpSpPr>
+      <p:pic>
+        <p:nvPicPr>
+          <p:cNvPr id="3" name="Immagine 2"/>
+          <p:cNvPicPr>
+            <a:picLocks noChangeAspect="1"/>
+          </p:cNvPicPr>
+          <p:nvPr/>
+        </p:nvPicPr>
+        <p:blipFill>
+          <a:blip r:embed="rId2">
+            <a:extLst>
+              <a:ext uri="{28A0092B-C50C-407E-A947-70E740481C1C}">
+                <a14:useLocalDpi xmlns:a14="http://schemas.microsoft.com/office/drawing/2010/main" val="0"/>
+              </a:ext>
+            </a:extLst>
+          </a:blip>
+          <a:stretch>
+            <a:fillRect/>
+          </a:stretch>
+        </p:blipFill>
+        <p:spPr>
+          <a:xfrm>
+            <a:off x="660820" y="3396165"/>
+            <a:ext cx="5130380" cy="2185831"/>
+          </a:xfrm>
+          <a:prstGeom prst="rect">
+            <a:avLst/>
+          </a:prstGeom>
+        </p:spPr>
+      </p:pic>
+      <p:sp>
+        <p:nvSpPr>
+          <p:cNvPr id="154" name="Shape 154"/>
+          <p:cNvSpPr/>
+          <p:nvPr/>
+        </p:nvSpPr>
+        <p:spPr>
+          <a:xfrm>
+            <a:off x="0" y="-8930"/>
+            <a:ext cx="7563445" cy="349131"/>
+          </a:xfrm>
+          <a:prstGeom prst="rect">
+            <a:avLst/>
+          </a:prstGeom>
+          <a:ln w="12700">
+            <a:miter lim="400000"/>
+          </a:ln>
+          <a:extLst>
+            <a:ext uri="{C572A759-6A51-4108-AA02-DFA0A04FC94B}">
+              <ma14:wrappingTextBoxFlag xmlns="" xmlns:ma14="http://schemas.microsoft.com/office/mac/drawingml/2011/main" val="1"/>
+            </a:ext>
+          </a:extLst>
+        </p:spPr>
+        <p:txBody>
+          <a:bodyPr lIns="35717" tIns="35717" rIns="35717" bIns="35717">
+            <a:spAutoFit/>
+          </a:bodyPr>
+          <a:lstStyle>
+            <a:lvl1pPr algn="l" defTabSz="647700">
+              <a:tabLst>
+                <a:tab pos="355600" algn="l"/>
+                <a:tab pos="711200" algn="l"/>
+                <a:tab pos="1079500" algn="l"/>
+                <a:tab pos="1435100" algn="l"/>
+                <a:tab pos="1790700" algn="l"/>
+                <a:tab pos="2159000" algn="l"/>
+                <a:tab pos="2514600" algn="l"/>
+                <a:tab pos="2870200" algn="l"/>
+                <a:tab pos="3238500" algn="l"/>
+                <a:tab pos="3594100" algn="l"/>
+                <a:tab pos="3949700" algn="l"/>
+                <a:tab pos="4318000" algn="l"/>
+              </a:tabLst>
+              <a:defRPr sz="1800">
+                <a:solidFill>
+                  <a:srgbClr val="F1FEF6"/>
+                </a:solidFill>
+                <a:latin typeface="Lucida Bright"/>
+                <a:ea typeface="Lucida Bright"/>
+                <a:cs typeface="Lucida Bright"/>
+                <a:sym typeface="Lucida Bright"/>
+              </a:defRPr>
+            </a:lvl1pPr>
+          </a:lstStyle>
+          <a:p>
+            <a:pPr algn="just"/>
+            <a:r>
+              <a:rPr lang="en-US" dirty="0" smtClean="0"/>
+              <a:t>Solving Richards’ equation with OMS console</a:t>
+            </a:r>
+            <a:endParaRPr lang="en-US" dirty="0"/>
+          </a:p>
+        </p:txBody>
+      </p:sp>
+      <p:sp>
+        <p:nvSpPr>
+          <p:cNvPr id="14" name="Shape 154"/>
+          <p:cNvSpPr/>
+          <p:nvPr/>
+        </p:nvSpPr>
+        <p:spPr>
+          <a:xfrm>
+            <a:off x="1049289" y="6508869"/>
+            <a:ext cx="2354957" cy="349131"/>
+          </a:xfrm>
+          <a:prstGeom prst="rect">
+            <a:avLst/>
+          </a:prstGeom>
+          <a:ln w="12700">
+            <a:miter lim="400000"/>
+          </a:ln>
+          <a:extLst>
+            <a:ext uri="{C572A759-6A51-4108-AA02-DFA0A04FC94B}">
+              <ma14:wrappingTextBoxFlag xmlns="" xmlns:ma14="http://schemas.microsoft.com/office/mac/drawingml/2011/main" val="1"/>
+            </a:ext>
+          </a:extLst>
+        </p:spPr>
+        <p:txBody>
+          <a:bodyPr wrap="square" lIns="35717" tIns="35717" rIns="35717" bIns="35717">
+            <a:spAutoFit/>
+          </a:bodyPr>
+          <a:lstStyle>
+            <a:lvl1pPr algn="l" defTabSz="647700">
+              <a:tabLst>
+                <a:tab pos="355600" algn="l"/>
+                <a:tab pos="711200" algn="l"/>
+                <a:tab pos="1079500" algn="l"/>
+                <a:tab pos="1435100" algn="l"/>
+                <a:tab pos="1790700" algn="l"/>
+                <a:tab pos="2159000" algn="l"/>
+                <a:tab pos="2514600" algn="l"/>
+                <a:tab pos="2870200" algn="l"/>
+                <a:tab pos="3238500" algn="l"/>
+                <a:tab pos="3594100" algn="l"/>
+                <a:tab pos="3949700" algn="l"/>
+                <a:tab pos="4318000" algn="l"/>
+              </a:tabLst>
+              <a:defRPr sz="1800">
+                <a:solidFill>
+                  <a:srgbClr val="F1FEF6"/>
+                </a:solidFill>
+                <a:latin typeface="Lucida Bright"/>
+                <a:ea typeface="Lucida Bright"/>
+                <a:cs typeface="Lucida Bright"/>
+                <a:sym typeface="Lucida Bright"/>
+              </a:defRPr>
+            </a:lvl1pPr>
+          </a:lstStyle>
+          <a:p>
+            <a:r>
+              <a:rPr lang="it-IT" dirty="0"/>
+              <a:t> </a:t>
+            </a:r>
+            <a:r>
+              <a:rPr lang="it-IT" dirty="0" smtClean="0"/>
+              <a:t>&amp;  N. Tubini</a:t>
+            </a:r>
+            <a:endParaRPr dirty="0"/>
+          </a:p>
+        </p:txBody>
+      </p:sp>
+      <p:sp>
+        <p:nvSpPr>
+          <p:cNvPr id="2" name="CasellaDiTesto 1"/>
+          <p:cNvSpPr txBox="1"/>
+          <p:nvPr/>
+        </p:nvSpPr>
+        <p:spPr>
+          <a:xfrm>
+            <a:off x="1708712" y="524867"/>
+            <a:ext cx="5726575" cy="400110"/>
+          </a:xfrm>
+          <a:prstGeom prst="rect">
+            <a:avLst/>
+          </a:prstGeom>
+          <a:noFill/>
+        </p:spPr>
+        <p:txBody>
+          <a:bodyPr wrap="square" rtlCol="0">
+            <a:spAutoFit/>
+          </a:bodyPr>
+          <a:lstStyle/>
+          <a:p>
+            <a:pPr algn="ctr"/>
+            <a:r>
+              <a:rPr lang="it-IT" sz="2000" dirty="0" smtClean="0"/>
+              <a:t>WATER PRESSURE OUTPUT FILE</a:t>
+            </a:r>
+            <a:endParaRPr lang="en-GB" sz="2000" dirty="0"/>
+          </a:p>
+        </p:txBody>
+      </p:sp>
+      <p:sp>
+        <p:nvSpPr>
+          <p:cNvPr id="11" name="CasellaDiTesto 10"/>
+          <p:cNvSpPr txBox="1"/>
+          <p:nvPr/>
+        </p:nvSpPr>
+        <p:spPr>
+          <a:xfrm>
+            <a:off x="484188" y="1111626"/>
+            <a:ext cx="4038600" cy="707886"/>
+          </a:xfrm>
+          <a:prstGeom prst="rect">
+            <a:avLst/>
+          </a:prstGeom>
+          <a:noFill/>
+        </p:spPr>
+        <p:txBody>
+          <a:bodyPr wrap="square" rtlCol="0">
+            <a:spAutoFit/>
+          </a:bodyPr>
+          <a:lstStyle/>
+          <a:p>
+            <a:pPr algn="just"/>
+            <a:r>
+              <a:rPr lang="it-IT" sz="2000" dirty="0" smtClean="0"/>
+              <a:t>TIME AT WHICH THE SOLUTION IS COMPUTED</a:t>
+            </a:r>
+            <a:endParaRPr lang="it-IT" sz="2000" dirty="0"/>
+          </a:p>
+        </p:txBody>
+      </p:sp>
+      <p:sp>
+        <p:nvSpPr>
+          <p:cNvPr id="12" name="Rettangolo 11"/>
+          <p:cNvSpPr/>
+          <p:nvPr/>
+        </p:nvSpPr>
+        <p:spPr>
+          <a:xfrm>
+            <a:off x="398069" y="3135729"/>
+            <a:ext cx="3537419" cy="569893"/>
+          </a:xfrm>
+          <a:prstGeom prst="rect">
+            <a:avLst/>
+          </a:prstGeom>
+          <a:noFill/>
+          <a:ln w="50800">
+            <a:solidFill>
+              <a:srgbClr val="00B050"/>
+            </a:solidFill>
+          </a:ln>
+        </p:spPr>
+        <p:style>
+          <a:lnRef idx="2">
+            <a:schemeClr val="accent1">
+              <a:shade val="50000"/>
+            </a:schemeClr>
+          </a:lnRef>
+          <a:fillRef idx="1">
+            <a:schemeClr val="accent1"/>
+          </a:fillRef>
+          <a:effectRef idx="0">
+            <a:schemeClr val="accent1"/>
+          </a:effectRef>
+          <a:fontRef idx="minor">
+            <a:schemeClr val="lt1"/>
+          </a:fontRef>
+        </p:style>
+        <p:txBody>
+          <a:bodyPr rtlCol="0" anchor="ctr"/>
+          <a:lstStyle/>
+          <a:p>
+            <a:pPr algn="ctr"/>
+            <a:endParaRPr lang="it-IT" dirty="0"/>
+          </a:p>
+        </p:txBody>
+      </p:sp>
+      <p:sp>
+        <p:nvSpPr>
+          <p:cNvPr id="13" name="Rettangolo 12"/>
+          <p:cNvSpPr/>
+          <p:nvPr/>
+        </p:nvSpPr>
+        <p:spPr>
+          <a:xfrm>
+            <a:off x="331788" y="1111626"/>
+            <a:ext cx="4191000" cy="1219200"/>
+          </a:xfrm>
+          <a:prstGeom prst="rect">
+            <a:avLst/>
+          </a:prstGeom>
+          <a:noFill/>
+          <a:ln w="50800">
+            <a:solidFill>
+              <a:srgbClr val="00B050"/>
+            </a:solidFill>
+          </a:ln>
+        </p:spPr>
+        <p:style>
+          <a:lnRef idx="2">
+            <a:schemeClr val="accent1">
+              <a:shade val="50000"/>
+            </a:schemeClr>
+          </a:lnRef>
+          <a:fillRef idx="1">
+            <a:schemeClr val="accent1"/>
+          </a:fillRef>
+          <a:effectRef idx="0">
+            <a:schemeClr val="accent1"/>
+          </a:effectRef>
+          <a:fontRef idx="minor">
+            <a:schemeClr val="lt1"/>
+          </a:fontRef>
+        </p:style>
+        <p:txBody>
+          <a:bodyPr rtlCol="0" anchor="ctr"/>
+          <a:lstStyle/>
+          <a:p>
+            <a:pPr algn="ctr"/>
+            <a:endParaRPr lang="it-IT" dirty="0"/>
+          </a:p>
+        </p:txBody>
+      </p:sp>
+      <p:cxnSp>
+        <p:nvCxnSpPr>
+          <p:cNvPr id="20" name="Connettore 2 19"/>
+          <p:cNvCxnSpPr/>
+          <p:nvPr/>
+        </p:nvCxnSpPr>
+        <p:spPr>
+          <a:xfrm>
+            <a:off x="1703388" y="2407026"/>
+            <a:ext cx="0" cy="609600"/>
+          </a:xfrm>
+          <a:prstGeom prst="straightConnector1">
+            <a:avLst/>
+          </a:prstGeom>
+          <a:ln w="57150">
+            <a:solidFill>
+              <a:srgbClr val="00B050"/>
+            </a:solidFill>
+            <a:tailEnd type="arrow"/>
+          </a:ln>
+        </p:spPr>
+        <p:style>
+          <a:lnRef idx="1">
+            <a:schemeClr val="accent1"/>
+          </a:lnRef>
+          <a:fillRef idx="0">
+            <a:schemeClr val="accent1"/>
+          </a:fillRef>
+          <a:effectRef idx="0">
+            <a:schemeClr val="accent1"/>
+          </a:effectRef>
+          <a:fontRef idx="minor">
+            <a:schemeClr val="tx1"/>
+          </a:fontRef>
+        </p:style>
+      </p:cxnSp>
+      <p:sp>
+        <p:nvSpPr>
+          <p:cNvPr id="21" name="CasellaDiTesto 20"/>
+          <p:cNvSpPr txBox="1"/>
+          <p:nvPr/>
+        </p:nvSpPr>
+        <p:spPr>
+          <a:xfrm>
+            <a:off x="439264" y="5979458"/>
+            <a:ext cx="2403143" cy="400110"/>
+          </a:xfrm>
+          <a:prstGeom prst="rect">
+            <a:avLst/>
+          </a:prstGeom>
+          <a:noFill/>
+        </p:spPr>
+        <p:txBody>
+          <a:bodyPr wrap="square" rtlCol="0">
+            <a:spAutoFit/>
+          </a:bodyPr>
+          <a:lstStyle/>
+          <a:p>
+            <a:r>
+              <a:rPr lang="it-IT" sz="2000" dirty="0" smtClean="0"/>
+              <a:t>DEPTH [m]</a:t>
+            </a:r>
+            <a:endParaRPr lang="it-IT" sz="2000" dirty="0"/>
+          </a:p>
+        </p:txBody>
+      </p:sp>
+      <p:sp>
+        <p:nvSpPr>
+          <p:cNvPr id="22" name="CasellaDiTesto 21"/>
+          <p:cNvSpPr txBox="1"/>
+          <p:nvPr/>
+        </p:nvSpPr>
+        <p:spPr>
+          <a:xfrm>
+            <a:off x="4665270" y="5997406"/>
+            <a:ext cx="2900915" cy="400110"/>
+          </a:xfrm>
+          <a:prstGeom prst="rect">
+            <a:avLst/>
+          </a:prstGeom>
+          <a:noFill/>
+        </p:spPr>
+        <p:txBody>
+          <a:bodyPr wrap="square" rtlCol="0">
+            <a:spAutoFit/>
+          </a:bodyPr>
+          <a:lstStyle/>
+          <a:p>
+            <a:r>
+              <a:rPr lang="it-IT" sz="2000" dirty="0" smtClean="0"/>
+              <a:t>WATER PRESSURE [m]</a:t>
+            </a:r>
+            <a:endParaRPr lang="it-IT" sz="2000" dirty="0"/>
+          </a:p>
+        </p:txBody>
+      </p:sp>
+      <p:sp>
+        <p:nvSpPr>
+          <p:cNvPr id="23" name="Rettangolo 22"/>
+          <p:cNvSpPr/>
+          <p:nvPr/>
+        </p:nvSpPr>
+        <p:spPr>
+          <a:xfrm>
+            <a:off x="3930181" y="5912226"/>
+            <a:ext cx="3537419" cy="569893"/>
+          </a:xfrm>
+          <a:prstGeom prst="rect">
+            <a:avLst/>
+          </a:prstGeom>
+          <a:noFill/>
+          <a:ln w="50800">
+            <a:solidFill>
+              <a:srgbClr val="0070C0"/>
+            </a:solidFill>
+          </a:ln>
+        </p:spPr>
+        <p:style>
+          <a:lnRef idx="2">
+            <a:schemeClr val="accent1">
+              <a:shade val="50000"/>
+            </a:schemeClr>
+          </a:lnRef>
+          <a:fillRef idx="1">
+            <a:schemeClr val="accent1"/>
+          </a:fillRef>
+          <a:effectRef idx="0">
+            <a:schemeClr val="accent1"/>
+          </a:effectRef>
+          <a:fontRef idx="minor">
+            <a:schemeClr val="lt1"/>
+          </a:fontRef>
+        </p:style>
+        <p:txBody>
+          <a:bodyPr rtlCol="0" anchor="ctr"/>
+          <a:lstStyle/>
+          <a:p>
+            <a:pPr algn="ctr"/>
+            <a:endParaRPr lang="it-IT" dirty="0"/>
+          </a:p>
+        </p:txBody>
+      </p:sp>
+      <p:sp>
+        <p:nvSpPr>
+          <p:cNvPr id="24" name="Rettangolo 23"/>
+          <p:cNvSpPr/>
+          <p:nvPr/>
+        </p:nvSpPr>
+        <p:spPr>
+          <a:xfrm>
+            <a:off x="1981200" y="3778626"/>
+            <a:ext cx="4419600" cy="1803370"/>
+          </a:xfrm>
+          <a:prstGeom prst="rect">
+            <a:avLst/>
+          </a:prstGeom>
+          <a:noFill/>
+          <a:ln w="50800">
+            <a:solidFill>
+              <a:srgbClr val="0070C0"/>
+            </a:solidFill>
+          </a:ln>
+        </p:spPr>
+        <p:style>
+          <a:lnRef idx="2">
+            <a:schemeClr val="accent1">
+              <a:shade val="50000"/>
+            </a:schemeClr>
+          </a:lnRef>
+          <a:fillRef idx="1">
+            <a:schemeClr val="accent1"/>
+          </a:fillRef>
+          <a:effectRef idx="0">
+            <a:schemeClr val="accent1"/>
+          </a:effectRef>
+          <a:fontRef idx="minor">
+            <a:schemeClr val="lt1"/>
+          </a:fontRef>
+        </p:style>
+        <p:txBody>
+          <a:bodyPr rtlCol="0" anchor="ctr"/>
+          <a:lstStyle/>
+          <a:p>
+            <a:pPr algn="ctr"/>
+            <a:endParaRPr lang="it-IT" dirty="0"/>
+          </a:p>
+        </p:txBody>
+      </p:sp>
+      <p:cxnSp>
+        <p:nvCxnSpPr>
+          <p:cNvPr id="25" name="Connettore 2 24"/>
+          <p:cNvCxnSpPr/>
+          <p:nvPr/>
+        </p:nvCxnSpPr>
+        <p:spPr>
+          <a:xfrm>
+            <a:off x="5867400" y="5581996"/>
+            <a:ext cx="0" cy="297063"/>
+          </a:xfrm>
+          <a:prstGeom prst="straightConnector1">
+            <a:avLst/>
+          </a:prstGeom>
+          <a:ln w="57150">
+            <a:solidFill>
+              <a:srgbClr val="0070C0"/>
+            </a:solidFill>
+            <a:tailEnd type="arrow"/>
+          </a:ln>
+        </p:spPr>
+        <p:style>
+          <a:lnRef idx="1">
+            <a:schemeClr val="accent1"/>
+          </a:lnRef>
+          <a:fillRef idx="0">
+            <a:schemeClr val="accent1"/>
+          </a:fillRef>
+          <a:effectRef idx="0">
+            <a:schemeClr val="accent1"/>
+          </a:effectRef>
+          <a:fontRef idx="minor">
+            <a:schemeClr val="tx1"/>
+          </a:fontRef>
+        </p:style>
+      </p:cxnSp>
+      <p:sp>
+        <p:nvSpPr>
+          <p:cNvPr id="26" name="Rettangolo 25"/>
+          <p:cNvSpPr/>
+          <p:nvPr/>
+        </p:nvSpPr>
+        <p:spPr>
+          <a:xfrm>
+            <a:off x="342659" y="5861130"/>
+            <a:ext cx="1710258" cy="569893"/>
+          </a:xfrm>
+          <a:prstGeom prst="rect">
+            <a:avLst/>
+          </a:prstGeom>
+          <a:noFill/>
+          <a:ln w="50800">
+            <a:solidFill>
+              <a:srgbClr val="FF0000"/>
+            </a:solidFill>
+          </a:ln>
+        </p:spPr>
+        <p:style>
+          <a:lnRef idx="2">
+            <a:schemeClr val="accent1">
+              <a:shade val="50000"/>
+            </a:schemeClr>
+          </a:lnRef>
+          <a:fillRef idx="1">
+            <a:schemeClr val="accent1"/>
+          </a:fillRef>
+          <a:effectRef idx="0">
+            <a:schemeClr val="accent1"/>
+          </a:effectRef>
+          <a:fontRef idx="minor">
+            <a:schemeClr val="lt1"/>
+          </a:fontRef>
+        </p:style>
+        <p:txBody>
+          <a:bodyPr rtlCol="0" anchor="ctr"/>
+          <a:lstStyle/>
+          <a:p>
+            <a:pPr algn="ctr"/>
+            <a:endParaRPr lang="it-IT" dirty="0"/>
+          </a:p>
+        </p:txBody>
+      </p:sp>
+      <p:sp>
+        <p:nvSpPr>
+          <p:cNvPr id="27" name="Rettangolo 26"/>
+          <p:cNvSpPr/>
+          <p:nvPr/>
+        </p:nvSpPr>
+        <p:spPr>
+          <a:xfrm>
+            <a:off x="376516" y="3778626"/>
+            <a:ext cx="1616497" cy="1803370"/>
+          </a:xfrm>
+          <a:prstGeom prst="rect">
+            <a:avLst/>
+          </a:prstGeom>
+          <a:noFill/>
+          <a:ln w="50800">
+            <a:solidFill>
+              <a:srgbClr val="FF0000"/>
+            </a:solidFill>
+          </a:ln>
+        </p:spPr>
+        <p:style>
+          <a:lnRef idx="2">
+            <a:schemeClr val="accent1">
+              <a:shade val="50000"/>
+            </a:schemeClr>
+          </a:lnRef>
+          <a:fillRef idx="1">
+            <a:schemeClr val="accent1"/>
+          </a:fillRef>
+          <a:effectRef idx="0">
+            <a:schemeClr val="accent1"/>
+          </a:effectRef>
+          <a:fontRef idx="minor">
+            <a:schemeClr val="lt1"/>
+          </a:fontRef>
+        </p:style>
+        <p:txBody>
+          <a:bodyPr rtlCol="0" anchor="ctr"/>
+          <a:lstStyle/>
+          <a:p>
+            <a:pPr algn="ctr"/>
+            <a:endParaRPr lang="it-IT" dirty="0"/>
+          </a:p>
+        </p:txBody>
+      </p:sp>
+      <p:cxnSp>
+        <p:nvCxnSpPr>
+          <p:cNvPr id="28" name="Connettore 2 27"/>
+          <p:cNvCxnSpPr/>
+          <p:nvPr/>
+        </p:nvCxnSpPr>
+        <p:spPr>
+          <a:xfrm>
+            <a:off x="1371600" y="5560814"/>
+            <a:ext cx="0" cy="304800"/>
+          </a:xfrm>
+          <a:prstGeom prst="straightConnector1">
+            <a:avLst/>
+          </a:prstGeom>
+          <a:ln w="57150">
+            <a:solidFill>
+              <a:srgbClr val="FF0000"/>
+            </a:solidFill>
+            <a:tailEnd type="arrow"/>
+          </a:ln>
+        </p:spPr>
+        <p:style>
+          <a:lnRef idx="1">
+            <a:schemeClr val="accent1"/>
+          </a:lnRef>
+          <a:fillRef idx="0">
+            <a:schemeClr val="accent1"/>
+          </a:fillRef>
+          <a:effectRef idx="0">
+            <a:schemeClr val="accent1"/>
+          </a:effectRef>
+          <a:fontRef idx="minor">
+            <a:schemeClr val="tx1"/>
+          </a:fontRef>
+        </p:style>
+      </p:cxnSp>
+    </p:spTree>
+    <p:extLst>
+      <p:ext uri="{BB962C8B-B14F-4D97-AF65-F5344CB8AC3E}">
+        <p14:creationId xmlns:p14="http://schemas.microsoft.com/office/powerpoint/2010/main" val="3867650883"/>
+      </p:ext>
+    </p:extLst>
+  </p:cSld>
+  <p:clrMapOvr>
+    <a:masterClrMapping/>
+  </p:clrMapOvr>
+  <p:transition spd="med"/>
+  <p:timing>
+    <p:tnLst>
+      <p:par>
+        <p:cTn id="1" dur="indefinite" restart="never" nodeType="tmRoot"/>
+      </p:par>
+    </p:tnLst>
+  </p:timing>
+</p:sld>
+</file>
+
+<file path=ppt/slides/slide32.xml><?xml version="1.0" encoding="utf-8"?>
+<p:sld xmlns:a="http://schemas.openxmlformats.org/drawingml/2006/main" xmlns:r="http://schemas.openxmlformats.org/officeDocument/2006/relationships" xmlns:p="http://schemas.openxmlformats.org/presentationml/2006/main">
+  <p:cSld>
+    <p:spTree>
+      <p:nvGrpSpPr>
+        <p:cNvPr id="1" name=""/>
+        <p:cNvGrpSpPr/>
+        <p:nvPr/>
+      </p:nvGrpSpPr>
+      <p:grpSpPr>
+        <a:xfrm>
+          <a:off x="0" y="0"/>
+          <a:ext cx="0" cy="0"/>
+          <a:chOff x="0" y="0"/>
+          <a:chExt cx="0" cy="0"/>
+        </a:xfrm>
+      </p:grpSpPr>
+      <p:pic>
+        <p:nvPicPr>
+          <p:cNvPr id="4" name="Immagine 3"/>
+          <p:cNvPicPr>
+            <a:picLocks noChangeAspect="1"/>
+          </p:cNvPicPr>
+          <p:nvPr/>
+        </p:nvPicPr>
+        <p:blipFill>
+          <a:blip r:embed="rId2">
+            <a:extLst>
+              <a:ext uri="{28A0092B-C50C-407E-A947-70E740481C1C}">
+                <a14:useLocalDpi xmlns:a14="http://schemas.microsoft.com/office/drawing/2010/main" val="0"/>
+              </a:ext>
+            </a:extLst>
+          </a:blip>
+          <a:stretch>
+            <a:fillRect/>
+          </a:stretch>
+        </p:blipFill>
+        <p:spPr>
+          <a:xfrm>
+            <a:off x="468985" y="3140210"/>
+            <a:ext cx="4746844" cy="2216426"/>
+          </a:xfrm>
+          <a:prstGeom prst="rect">
+            <a:avLst/>
+          </a:prstGeom>
+        </p:spPr>
+      </p:pic>
+      <p:sp>
+        <p:nvSpPr>
+          <p:cNvPr id="154" name="Shape 154"/>
+          <p:cNvSpPr/>
+          <p:nvPr/>
+        </p:nvSpPr>
+        <p:spPr>
+          <a:xfrm>
+            <a:off x="0" y="-8930"/>
+            <a:ext cx="7563445" cy="349131"/>
+          </a:xfrm>
+          <a:prstGeom prst="rect">
+            <a:avLst/>
+          </a:prstGeom>
+          <a:ln w="12700">
+            <a:miter lim="400000"/>
+          </a:ln>
+          <a:extLst>
+            <a:ext uri="{C572A759-6A51-4108-AA02-DFA0A04FC94B}">
+              <ma14:wrappingTextBoxFlag xmlns="" xmlns:ma14="http://schemas.microsoft.com/office/mac/drawingml/2011/main" val="1"/>
+            </a:ext>
+          </a:extLst>
+        </p:spPr>
+        <p:txBody>
+          <a:bodyPr lIns="35717" tIns="35717" rIns="35717" bIns="35717">
+            <a:spAutoFit/>
+          </a:bodyPr>
+          <a:lstStyle>
+            <a:lvl1pPr algn="l" defTabSz="647700">
+              <a:tabLst>
+                <a:tab pos="355600" algn="l"/>
+                <a:tab pos="711200" algn="l"/>
+                <a:tab pos="1079500" algn="l"/>
+                <a:tab pos="1435100" algn="l"/>
+                <a:tab pos="1790700" algn="l"/>
+                <a:tab pos="2159000" algn="l"/>
+                <a:tab pos="2514600" algn="l"/>
+                <a:tab pos="2870200" algn="l"/>
+                <a:tab pos="3238500" algn="l"/>
+                <a:tab pos="3594100" algn="l"/>
+                <a:tab pos="3949700" algn="l"/>
+                <a:tab pos="4318000" algn="l"/>
+              </a:tabLst>
+              <a:defRPr sz="1800">
+                <a:solidFill>
+                  <a:srgbClr val="F1FEF6"/>
+                </a:solidFill>
+                <a:latin typeface="Lucida Bright"/>
+                <a:ea typeface="Lucida Bright"/>
+                <a:cs typeface="Lucida Bright"/>
+                <a:sym typeface="Lucida Bright"/>
+              </a:defRPr>
+            </a:lvl1pPr>
+          </a:lstStyle>
+          <a:p>
+            <a:pPr algn="just"/>
+            <a:r>
+              <a:rPr lang="en-US" dirty="0" smtClean="0"/>
+              <a:t>Solving Richards’ equation with OMS console</a:t>
+            </a:r>
+            <a:endParaRPr lang="en-US" dirty="0"/>
+          </a:p>
+        </p:txBody>
+      </p:sp>
+      <p:sp>
+        <p:nvSpPr>
+          <p:cNvPr id="14" name="Shape 154"/>
+          <p:cNvSpPr/>
+          <p:nvPr/>
+        </p:nvSpPr>
+        <p:spPr>
+          <a:xfrm>
+            <a:off x="1049289" y="6508869"/>
+            <a:ext cx="2354957" cy="349131"/>
+          </a:xfrm>
+          <a:prstGeom prst="rect">
+            <a:avLst/>
+          </a:prstGeom>
+          <a:ln w="12700">
+            <a:miter lim="400000"/>
+          </a:ln>
+          <a:extLst>
+            <a:ext uri="{C572A759-6A51-4108-AA02-DFA0A04FC94B}">
+              <ma14:wrappingTextBoxFlag xmlns="" xmlns:ma14="http://schemas.microsoft.com/office/mac/drawingml/2011/main" val="1"/>
+            </a:ext>
+          </a:extLst>
+        </p:spPr>
+        <p:txBody>
+          <a:bodyPr wrap="square" lIns="35717" tIns="35717" rIns="35717" bIns="35717">
+            <a:spAutoFit/>
+          </a:bodyPr>
+          <a:lstStyle>
+            <a:lvl1pPr algn="l" defTabSz="647700">
+              <a:tabLst>
+                <a:tab pos="355600" algn="l"/>
+                <a:tab pos="711200" algn="l"/>
+                <a:tab pos="1079500" algn="l"/>
+                <a:tab pos="1435100" algn="l"/>
+                <a:tab pos="1790700" algn="l"/>
+                <a:tab pos="2159000" algn="l"/>
+                <a:tab pos="2514600" algn="l"/>
+                <a:tab pos="2870200" algn="l"/>
+                <a:tab pos="3238500" algn="l"/>
+                <a:tab pos="3594100" algn="l"/>
+                <a:tab pos="3949700" algn="l"/>
+                <a:tab pos="4318000" algn="l"/>
+              </a:tabLst>
+              <a:defRPr sz="1800">
+                <a:solidFill>
+                  <a:srgbClr val="F1FEF6"/>
+                </a:solidFill>
+                <a:latin typeface="Lucida Bright"/>
+                <a:ea typeface="Lucida Bright"/>
+                <a:cs typeface="Lucida Bright"/>
+                <a:sym typeface="Lucida Bright"/>
+              </a:defRPr>
+            </a:lvl1pPr>
+          </a:lstStyle>
+          <a:p>
+            <a:r>
+              <a:rPr lang="it-IT" dirty="0"/>
+              <a:t> </a:t>
+            </a:r>
+            <a:r>
+              <a:rPr lang="it-IT" dirty="0" smtClean="0"/>
+              <a:t>&amp;  N. Tubini</a:t>
+            </a:r>
+            <a:endParaRPr dirty="0"/>
+          </a:p>
+        </p:txBody>
+      </p:sp>
+      <p:sp>
+        <p:nvSpPr>
+          <p:cNvPr id="2" name="CasellaDiTesto 1"/>
+          <p:cNvSpPr txBox="1"/>
+          <p:nvPr/>
+        </p:nvSpPr>
+        <p:spPr>
+          <a:xfrm>
+            <a:off x="1708712" y="524867"/>
+            <a:ext cx="5726575" cy="400110"/>
+          </a:xfrm>
+          <a:prstGeom prst="rect">
+            <a:avLst/>
+          </a:prstGeom>
+          <a:noFill/>
+        </p:spPr>
+        <p:txBody>
+          <a:bodyPr wrap="square" rtlCol="0">
+            <a:spAutoFit/>
+          </a:bodyPr>
+          <a:lstStyle/>
+          <a:p>
+            <a:pPr algn="ctr"/>
+            <a:r>
+              <a:rPr lang="it-IT" sz="2000" dirty="0" smtClean="0"/>
+              <a:t>WATER CONTENT OUTPUT FILE</a:t>
+            </a:r>
+            <a:endParaRPr lang="en-GB" sz="2000" dirty="0"/>
+          </a:p>
+        </p:txBody>
+      </p:sp>
+      <p:sp>
+        <p:nvSpPr>
+          <p:cNvPr id="11" name="CasellaDiTesto 10"/>
+          <p:cNvSpPr txBox="1"/>
+          <p:nvPr/>
+        </p:nvSpPr>
+        <p:spPr>
+          <a:xfrm>
+            <a:off x="1039987" y="1039910"/>
+            <a:ext cx="4038600" cy="707886"/>
+          </a:xfrm>
+          <a:prstGeom prst="rect">
+            <a:avLst/>
+          </a:prstGeom>
+          <a:noFill/>
+        </p:spPr>
+        <p:txBody>
+          <a:bodyPr wrap="square" rtlCol="0">
+            <a:spAutoFit/>
+          </a:bodyPr>
+          <a:lstStyle/>
+          <a:p>
+            <a:pPr algn="just"/>
+            <a:r>
+              <a:rPr lang="it-IT" sz="2000" dirty="0" smtClean="0"/>
+              <a:t>TIME AT WHICH THE SOLUTION IS COMPUTED</a:t>
+            </a:r>
+            <a:endParaRPr lang="it-IT" sz="2000" dirty="0"/>
+          </a:p>
+        </p:txBody>
+      </p:sp>
+      <p:sp>
+        <p:nvSpPr>
+          <p:cNvPr id="12" name="Rettangolo 11"/>
+          <p:cNvSpPr/>
+          <p:nvPr/>
+        </p:nvSpPr>
+        <p:spPr>
+          <a:xfrm>
+            <a:off x="321968" y="2868710"/>
+            <a:ext cx="3537419" cy="569893"/>
+          </a:xfrm>
+          <a:prstGeom prst="rect">
+            <a:avLst/>
+          </a:prstGeom>
+          <a:noFill/>
+          <a:ln w="50800">
+            <a:solidFill>
+              <a:srgbClr val="00B050"/>
+            </a:solidFill>
+          </a:ln>
+        </p:spPr>
+        <p:style>
+          <a:lnRef idx="2">
+            <a:schemeClr val="accent1">
+              <a:shade val="50000"/>
+            </a:schemeClr>
+          </a:lnRef>
+          <a:fillRef idx="1">
+            <a:schemeClr val="accent1"/>
+          </a:fillRef>
+          <a:effectRef idx="0">
+            <a:schemeClr val="accent1"/>
+          </a:effectRef>
+          <a:fontRef idx="minor">
+            <a:schemeClr val="lt1"/>
+          </a:fontRef>
+        </p:style>
+        <p:txBody>
+          <a:bodyPr rtlCol="0" anchor="ctr"/>
+          <a:lstStyle/>
+          <a:p>
+            <a:pPr algn="ctr"/>
+            <a:endParaRPr lang="it-IT" dirty="0"/>
+          </a:p>
+        </p:txBody>
+      </p:sp>
+      <p:sp>
+        <p:nvSpPr>
+          <p:cNvPr id="13" name="Rettangolo 12"/>
+          <p:cNvSpPr/>
+          <p:nvPr/>
+        </p:nvSpPr>
+        <p:spPr>
+          <a:xfrm>
+            <a:off x="887587" y="1039910"/>
+            <a:ext cx="4191000" cy="1219200"/>
+          </a:xfrm>
+          <a:prstGeom prst="rect">
+            <a:avLst/>
+          </a:prstGeom>
+          <a:noFill/>
+          <a:ln w="50800">
+            <a:solidFill>
+              <a:srgbClr val="00B050"/>
+            </a:solidFill>
+          </a:ln>
+        </p:spPr>
+        <p:style>
+          <a:lnRef idx="2">
+            <a:schemeClr val="accent1">
+              <a:shade val="50000"/>
+            </a:schemeClr>
+          </a:lnRef>
+          <a:fillRef idx="1">
+            <a:schemeClr val="accent1"/>
+          </a:fillRef>
+          <a:effectRef idx="0">
+            <a:schemeClr val="accent1"/>
+          </a:effectRef>
+          <a:fontRef idx="minor">
+            <a:schemeClr val="lt1"/>
+          </a:fontRef>
+        </p:style>
+        <p:txBody>
+          <a:bodyPr rtlCol="0" anchor="ctr"/>
+          <a:lstStyle/>
+          <a:p>
+            <a:pPr algn="ctr"/>
+            <a:endParaRPr lang="it-IT" dirty="0"/>
+          </a:p>
+        </p:txBody>
+      </p:sp>
+      <p:cxnSp>
+        <p:nvCxnSpPr>
+          <p:cNvPr id="20" name="Connettore 2 19"/>
+          <p:cNvCxnSpPr/>
+          <p:nvPr/>
+        </p:nvCxnSpPr>
+        <p:spPr>
+          <a:xfrm>
+            <a:off x="2259187" y="2335310"/>
+            <a:ext cx="0" cy="609600"/>
+          </a:xfrm>
+          <a:prstGeom prst="straightConnector1">
+            <a:avLst/>
+          </a:prstGeom>
+          <a:ln w="57150">
+            <a:solidFill>
+              <a:srgbClr val="00B050"/>
+            </a:solidFill>
+            <a:tailEnd type="arrow"/>
+          </a:ln>
+        </p:spPr>
+        <p:style>
+          <a:lnRef idx="1">
+            <a:schemeClr val="accent1"/>
+          </a:lnRef>
+          <a:fillRef idx="0">
+            <a:schemeClr val="accent1"/>
+          </a:fillRef>
+          <a:effectRef idx="0">
+            <a:schemeClr val="accent1"/>
+          </a:effectRef>
+          <a:fontRef idx="minor">
+            <a:schemeClr val="tx1"/>
+          </a:fontRef>
+        </p:style>
+      </p:cxnSp>
+      <p:sp>
+        <p:nvSpPr>
+          <p:cNvPr id="21" name="CasellaDiTesto 20"/>
+          <p:cNvSpPr txBox="1"/>
+          <p:nvPr/>
+        </p:nvSpPr>
+        <p:spPr>
+          <a:xfrm>
+            <a:off x="439264" y="5943600"/>
+            <a:ext cx="2403143" cy="400110"/>
+          </a:xfrm>
+          <a:prstGeom prst="rect">
+            <a:avLst/>
+          </a:prstGeom>
+          <a:noFill/>
+        </p:spPr>
+        <p:txBody>
+          <a:bodyPr wrap="square" rtlCol="0">
+            <a:spAutoFit/>
+          </a:bodyPr>
+          <a:lstStyle/>
+          <a:p>
+            <a:r>
+              <a:rPr lang="it-IT" sz="2000" dirty="0" smtClean="0"/>
+              <a:t>DEPTH [m]</a:t>
+            </a:r>
+            <a:endParaRPr lang="it-IT" sz="2000" dirty="0"/>
+          </a:p>
+        </p:txBody>
+      </p:sp>
+      <p:sp>
+        <p:nvSpPr>
+          <p:cNvPr id="22" name="CasellaDiTesto 21"/>
+          <p:cNvSpPr txBox="1"/>
+          <p:nvPr/>
+        </p:nvSpPr>
+        <p:spPr>
+          <a:xfrm>
+            <a:off x="4352361" y="5907761"/>
+            <a:ext cx="3200400" cy="400110"/>
+          </a:xfrm>
+          <a:prstGeom prst="rect">
+            <a:avLst/>
+          </a:prstGeom>
+          <a:noFill/>
+        </p:spPr>
+        <p:txBody>
+          <a:bodyPr wrap="square" rtlCol="0">
+            <a:spAutoFit/>
+          </a:bodyPr>
+          <a:lstStyle/>
+          <a:p>
+            <a:r>
+              <a:rPr lang="it-IT" sz="2000" smtClean="0"/>
+              <a:t>WATER CONTENT </a:t>
+            </a:r>
+            <a:r>
+              <a:rPr lang="it-IT" sz="2000" dirty="0" smtClean="0"/>
+              <a:t>[-]</a:t>
+            </a:r>
+            <a:endParaRPr lang="it-IT" sz="2000" dirty="0"/>
+          </a:p>
+        </p:txBody>
+      </p:sp>
+      <p:sp>
+        <p:nvSpPr>
+          <p:cNvPr id="23" name="Rettangolo 22"/>
+          <p:cNvSpPr/>
+          <p:nvPr/>
+        </p:nvSpPr>
+        <p:spPr>
+          <a:xfrm>
+            <a:off x="3930181" y="5786723"/>
+            <a:ext cx="3537419" cy="569893"/>
+          </a:xfrm>
+          <a:prstGeom prst="rect">
+            <a:avLst/>
+          </a:prstGeom>
+          <a:noFill/>
+          <a:ln w="50800">
+            <a:solidFill>
+              <a:srgbClr val="0070C0"/>
+            </a:solidFill>
+          </a:ln>
+        </p:spPr>
+        <p:style>
+          <a:lnRef idx="2">
+            <a:schemeClr val="accent1">
+              <a:shade val="50000"/>
+            </a:schemeClr>
+          </a:lnRef>
+          <a:fillRef idx="1">
+            <a:schemeClr val="accent1"/>
+          </a:fillRef>
+          <a:effectRef idx="0">
+            <a:schemeClr val="accent1"/>
+          </a:effectRef>
+          <a:fontRef idx="minor">
+            <a:schemeClr val="lt1"/>
+          </a:fontRef>
+        </p:style>
+        <p:txBody>
+          <a:bodyPr rtlCol="0" anchor="ctr"/>
+          <a:lstStyle/>
+          <a:p>
+            <a:pPr algn="ctr"/>
+            <a:endParaRPr lang="it-IT" dirty="0"/>
+          </a:p>
+        </p:txBody>
+      </p:sp>
+      <p:sp>
+        <p:nvSpPr>
+          <p:cNvPr id="24" name="Rettangolo 23"/>
+          <p:cNvSpPr/>
+          <p:nvPr/>
+        </p:nvSpPr>
+        <p:spPr>
+          <a:xfrm>
+            <a:off x="1981200" y="3510319"/>
+            <a:ext cx="4419600" cy="1868507"/>
+          </a:xfrm>
+          <a:prstGeom prst="rect">
+            <a:avLst/>
+          </a:prstGeom>
+          <a:noFill/>
+          <a:ln w="50800">
+            <a:solidFill>
+              <a:srgbClr val="0070C0"/>
+            </a:solidFill>
+          </a:ln>
+        </p:spPr>
+        <p:style>
+          <a:lnRef idx="2">
+            <a:schemeClr val="accent1">
+              <a:shade val="50000"/>
+            </a:schemeClr>
+          </a:lnRef>
+          <a:fillRef idx="1">
+            <a:schemeClr val="accent1"/>
+          </a:fillRef>
+          <a:effectRef idx="0">
+            <a:schemeClr val="accent1"/>
+          </a:effectRef>
+          <a:fontRef idx="minor">
+            <a:schemeClr val="lt1"/>
+          </a:fontRef>
+        </p:style>
+        <p:txBody>
+          <a:bodyPr rtlCol="0" anchor="ctr"/>
+          <a:lstStyle/>
+          <a:p>
+            <a:pPr algn="ctr"/>
+            <a:endParaRPr lang="it-IT" dirty="0"/>
+          </a:p>
+        </p:txBody>
+      </p:sp>
+      <p:cxnSp>
+        <p:nvCxnSpPr>
+          <p:cNvPr id="25" name="Connettore 2 24"/>
+          <p:cNvCxnSpPr/>
+          <p:nvPr/>
+        </p:nvCxnSpPr>
+        <p:spPr>
+          <a:xfrm>
+            <a:off x="5867400" y="5426350"/>
+            <a:ext cx="0" cy="309277"/>
+          </a:xfrm>
+          <a:prstGeom prst="straightConnector1">
+            <a:avLst/>
+          </a:prstGeom>
+          <a:ln w="57150">
+            <a:solidFill>
+              <a:srgbClr val="0070C0"/>
+            </a:solidFill>
+            <a:tailEnd type="arrow"/>
+          </a:ln>
+        </p:spPr>
+        <p:style>
+          <a:lnRef idx="1">
+            <a:schemeClr val="accent1"/>
+          </a:lnRef>
+          <a:fillRef idx="0">
+            <a:schemeClr val="accent1"/>
+          </a:fillRef>
+          <a:effectRef idx="0">
+            <a:schemeClr val="accent1"/>
+          </a:effectRef>
+          <a:fontRef idx="minor">
+            <a:schemeClr val="tx1"/>
+          </a:fontRef>
+        </p:style>
+      </p:cxnSp>
+      <p:sp>
+        <p:nvSpPr>
+          <p:cNvPr id="26" name="Rettangolo 25"/>
+          <p:cNvSpPr/>
+          <p:nvPr/>
+        </p:nvSpPr>
+        <p:spPr>
+          <a:xfrm>
+            <a:off x="360587" y="5807343"/>
+            <a:ext cx="1578639" cy="569893"/>
+          </a:xfrm>
+          <a:prstGeom prst="rect">
+            <a:avLst/>
+          </a:prstGeom>
+          <a:noFill/>
+          <a:ln w="50800">
+            <a:solidFill>
+              <a:srgbClr val="FF0000"/>
+            </a:solidFill>
+          </a:ln>
+        </p:spPr>
+        <p:style>
+          <a:lnRef idx="2">
+            <a:schemeClr val="accent1">
+              <a:shade val="50000"/>
+            </a:schemeClr>
+          </a:lnRef>
+          <a:fillRef idx="1">
+            <a:schemeClr val="accent1"/>
+          </a:fillRef>
+          <a:effectRef idx="0">
+            <a:schemeClr val="accent1"/>
+          </a:effectRef>
+          <a:fontRef idx="minor">
+            <a:schemeClr val="lt1"/>
+          </a:fontRef>
+        </p:style>
+        <p:txBody>
+          <a:bodyPr rtlCol="0" anchor="ctr"/>
+          <a:lstStyle/>
+          <a:p>
+            <a:pPr algn="ctr"/>
+            <a:endParaRPr lang="it-IT" dirty="0"/>
+          </a:p>
+        </p:txBody>
+      </p:sp>
+      <p:cxnSp>
+        <p:nvCxnSpPr>
+          <p:cNvPr id="28" name="Connettore 2 27"/>
+          <p:cNvCxnSpPr/>
+          <p:nvPr/>
+        </p:nvCxnSpPr>
+        <p:spPr>
+          <a:xfrm>
+            <a:off x="1371600" y="5417382"/>
+            <a:ext cx="0" cy="304800"/>
+          </a:xfrm>
+          <a:prstGeom prst="straightConnector1">
+            <a:avLst/>
+          </a:prstGeom>
+          <a:ln w="57150">
+            <a:solidFill>
+              <a:srgbClr val="FF0000"/>
+            </a:solidFill>
+            <a:tailEnd type="arrow"/>
+          </a:ln>
+        </p:spPr>
+        <p:style>
+          <a:lnRef idx="1">
+            <a:schemeClr val="accent1"/>
+          </a:lnRef>
+          <a:fillRef idx="0">
+            <a:schemeClr val="accent1"/>
+          </a:fillRef>
+          <a:effectRef idx="0">
+            <a:schemeClr val="accent1"/>
+          </a:effectRef>
+          <a:fontRef idx="minor">
+            <a:schemeClr val="tx1"/>
+          </a:fontRef>
+        </p:style>
+      </p:cxnSp>
+      <p:sp>
+        <p:nvSpPr>
+          <p:cNvPr id="27" name="Rettangolo 26"/>
+          <p:cNvSpPr/>
+          <p:nvPr/>
+        </p:nvSpPr>
+        <p:spPr>
+          <a:xfrm>
+            <a:off x="304800" y="3510320"/>
+            <a:ext cx="1616497" cy="1835340"/>
+          </a:xfrm>
+          <a:prstGeom prst="rect">
+            <a:avLst/>
+          </a:prstGeom>
+          <a:noFill/>
+          <a:ln w="50800">
+            <a:solidFill>
+              <a:srgbClr val="FF0000"/>
+            </a:solidFill>
+          </a:ln>
+        </p:spPr>
+        <p:style>
+          <a:lnRef idx="2">
+            <a:schemeClr val="accent1">
+              <a:shade val="50000"/>
+            </a:schemeClr>
+          </a:lnRef>
+          <a:fillRef idx="1">
+            <a:schemeClr val="accent1"/>
+          </a:fillRef>
+          <a:effectRef idx="0">
+            <a:schemeClr val="accent1"/>
+          </a:effectRef>
+          <a:fontRef idx="minor">
+            <a:schemeClr val="lt1"/>
+          </a:fontRef>
+        </p:style>
+        <p:txBody>
+          <a:bodyPr rtlCol="0" anchor="ctr"/>
+          <a:lstStyle/>
+          <a:p>
+            <a:pPr algn="ctr"/>
+            <a:endParaRPr lang="it-IT" dirty="0"/>
+          </a:p>
+        </p:txBody>
+      </p:sp>
+    </p:spTree>
+    <p:extLst>
+      <p:ext uri="{BB962C8B-B14F-4D97-AF65-F5344CB8AC3E}">
+        <p14:creationId xmlns:p14="http://schemas.microsoft.com/office/powerpoint/2010/main" val="1826655048"/>
+      </p:ext>
+    </p:extLst>
+  </p:cSld>
+  <p:clrMapOvr>
+    <a:masterClrMapping/>
+  </p:clrMapOvr>
+  <p:transition spd="med"/>
+  <p:timing>
+    <p:tnLst>
+      <p:par>
+        <p:cTn id="1" dur="indefinite" restart="never" nodeType="tmRoot"/>
+      </p:par>
+    </p:tnLst>
+  </p:timing>
+</p:sld>
+</file>
+
+<file path=ppt/slides/slide33.xml><?xml version="1.0" encoding="utf-8"?>
+<p:sld xmlns:a="http://schemas.openxmlformats.org/drawingml/2006/main" xmlns:r="http://schemas.openxmlformats.org/officeDocument/2006/relationships" xmlns:p="http://schemas.openxmlformats.org/presentationml/2006/main">
+  <p:cSld>
+    <p:spTree>
+      <p:nvGrpSpPr>
+        <p:cNvPr id="1" name=""/>
+        <p:cNvGrpSpPr/>
+        <p:nvPr/>
+      </p:nvGrpSpPr>
+      <p:grpSpPr>
+        <a:xfrm>
+          <a:off x="0" y="0"/>
+          <a:ext cx="0" cy="0"/>
+          <a:chOff x="0" y="0"/>
+          <a:chExt cx="0" cy="0"/>
+        </a:xfrm>
+      </p:grpSpPr>
       <p:pic>
         <p:nvPicPr>
           <p:cNvPr id="390" name="image.png"/>
@@ -12618,7 +13520,7 @@
           <a:lstStyle/>
           <a:p>
             <a:fld id="{86CB4B4D-7CA3-9044-876B-883B54F8677D}" type="slidenum">
-              <a:t>30</a:t>
+              <a:t>33</a:t>
             </a:fld>
             <a:endParaRPr/>
           </a:p>

</xml_diff>